<commit_message>
issue #6 and #11; can assign throttle to any axis now, sense detection limit can be set in config file if the default 150 is inconvenient Add  pp_rebindkey mapping to allow copy  ... and then e.g. paste into the Cry console
</commit_message>
<xml_diff>
--- a/doc/SCJMapper_QGuide.pptx
+++ b/doc/SCJMapper_QGuide.pptx
@@ -317,7 +317,7 @@
           <a:p>
             <a:fld id="{1BA50D42-C9CD-4801-B293-61D1F53EC57E}" type="datetimeFigureOut">
               <a:rPr lang="de-DE" smtClean="0"/>
-              <a:t>30.06.2014</a:t>
+              <a:t>03.07.2014</a:t>
             </a:fld>
             <a:endParaRPr lang="de-DE"/>
           </a:p>
@@ -482,7 +482,7 @@
           <a:p>
             <a:fld id="{1BA50D42-C9CD-4801-B293-61D1F53EC57E}" type="datetimeFigureOut">
               <a:rPr lang="de-DE" smtClean="0"/>
-              <a:t>30.06.2014</a:t>
+              <a:t>03.07.2014</a:t>
             </a:fld>
             <a:endParaRPr lang="de-DE"/>
           </a:p>
@@ -657,7 +657,7 @@
           <a:p>
             <a:fld id="{1BA50D42-C9CD-4801-B293-61D1F53EC57E}" type="datetimeFigureOut">
               <a:rPr lang="de-DE" smtClean="0"/>
-              <a:t>30.06.2014</a:t>
+              <a:t>03.07.2014</a:t>
             </a:fld>
             <a:endParaRPr lang="de-DE"/>
           </a:p>
@@ -822,7 +822,7 @@
           <a:p>
             <a:fld id="{1BA50D42-C9CD-4801-B293-61D1F53EC57E}" type="datetimeFigureOut">
               <a:rPr lang="de-DE" smtClean="0"/>
-              <a:t>30.06.2014</a:t>
+              <a:t>03.07.2014</a:t>
             </a:fld>
             <a:endParaRPr lang="de-DE"/>
           </a:p>
@@ -1063,7 +1063,7 @@
           <a:p>
             <a:fld id="{1BA50D42-C9CD-4801-B293-61D1F53EC57E}" type="datetimeFigureOut">
               <a:rPr lang="de-DE" smtClean="0"/>
-              <a:t>30.06.2014</a:t>
+              <a:t>03.07.2014</a:t>
             </a:fld>
             <a:endParaRPr lang="de-DE"/>
           </a:p>
@@ -1346,7 +1346,7 @@
           <a:p>
             <a:fld id="{1BA50D42-C9CD-4801-B293-61D1F53EC57E}" type="datetimeFigureOut">
               <a:rPr lang="de-DE" smtClean="0"/>
-              <a:t>30.06.2014</a:t>
+              <a:t>03.07.2014</a:t>
             </a:fld>
             <a:endParaRPr lang="de-DE"/>
           </a:p>
@@ -1763,7 +1763,7 @@
           <a:p>
             <a:fld id="{1BA50D42-C9CD-4801-B293-61D1F53EC57E}" type="datetimeFigureOut">
               <a:rPr lang="de-DE" smtClean="0"/>
-              <a:t>30.06.2014</a:t>
+              <a:t>03.07.2014</a:t>
             </a:fld>
             <a:endParaRPr lang="de-DE"/>
           </a:p>
@@ -1876,7 +1876,7 @@
           <a:p>
             <a:fld id="{1BA50D42-C9CD-4801-B293-61D1F53EC57E}" type="datetimeFigureOut">
               <a:rPr lang="de-DE" smtClean="0"/>
-              <a:t>30.06.2014</a:t>
+              <a:t>03.07.2014</a:t>
             </a:fld>
             <a:endParaRPr lang="de-DE"/>
           </a:p>
@@ -1966,7 +1966,7 @@
           <a:p>
             <a:fld id="{1BA50D42-C9CD-4801-B293-61D1F53EC57E}" type="datetimeFigureOut">
               <a:rPr lang="de-DE" smtClean="0"/>
-              <a:t>30.06.2014</a:t>
+              <a:t>03.07.2014</a:t>
             </a:fld>
             <a:endParaRPr lang="de-DE"/>
           </a:p>
@@ -2238,7 +2238,7 @@
           <a:p>
             <a:fld id="{1BA50D42-C9CD-4801-B293-61D1F53EC57E}" type="datetimeFigureOut">
               <a:rPr lang="de-DE" smtClean="0"/>
-              <a:t>30.06.2014</a:t>
+              <a:t>03.07.2014</a:t>
             </a:fld>
             <a:endParaRPr lang="de-DE"/>
           </a:p>
@@ -2486,7 +2486,7 @@
           <a:p>
             <a:fld id="{1BA50D42-C9CD-4801-B293-61D1F53EC57E}" type="datetimeFigureOut">
               <a:rPr lang="de-DE" smtClean="0"/>
-              <a:t>30.06.2014</a:t>
+              <a:t>03.07.2014</a:t>
             </a:fld>
             <a:endParaRPr lang="de-DE"/>
           </a:p>
@@ -2694,7 +2694,7 @@
           <a:p>
             <a:fld id="{1BA50D42-C9CD-4801-B293-61D1F53EC57E}" type="datetimeFigureOut">
               <a:rPr lang="de-DE" smtClean="0"/>
-              <a:t>30.06.2014</a:t>
+              <a:t>03.07.2014</a:t>
             </a:fld>
             <a:endParaRPr lang="de-DE"/>
           </a:p>
@@ -3090,11 +3090,7 @@
             </a:br>
             <a:r>
               <a:rPr lang="en-US" sz="4000" dirty="0" smtClean="0"/>
-              <a:t>Quick Reference Guide  V </a:t>
-            </a:r>
-            <a:r>
-              <a:rPr lang="en-US" sz="4000" dirty="0" smtClean="0"/>
-              <a:t>2.0</a:t>
+              <a:t>Quick Reference Guide  V 2.0</a:t>
             </a:r>
             <a:endParaRPr lang="en-US" sz="4000" dirty="0"/>
           </a:p>
@@ -3124,11 +3120,7 @@
           <a:p>
             <a:r>
               <a:rPr lang="en-US" sz="900" dirty="0" smtClean="0"/>
-              <a:t>20140630 </a:t>
-            </a:r>
-            <a:r>
-              <a:rPr lang="en-US" sz="900" dirty="0" smtClean="0"/>
-              <a:t>– Cassini</a:t>
+              <a:t>20140630 – Cassini</a:t>
             </a:r>
           </a:p>
           <a:p>
@@ -3448,11 +3440,7 @@
           <a:p>
             <a:r>
               <a:rPr lang="en-US" sz="1200" dirty="0" smtClean="0"/>
-              <a:t>Start typin</a:t>
-            </a:r>
-            <a:r>
-              <a:rPr lang="en-US" sz="1200" dirty="0" smtClean="0"/>
-              <a:t>g and the tree is reduced to the actions and controls that contain the characters typed </a:t>
+              <a:t>Start typing and the tree is reduced to the actions and controls that contain the characters typed </a:t>
             </a:r>
           </a:p>
           <a:p>
@@ -3471,14 +3459,12 @@
               <a:rPr lang="en-US" sz="1200" dirty="0" smtClean="0"/>
               <a:t>’ to see my throttles only</a:t>
             </a:r>
-            <a:endParaRPr lang="en-US" sz="1200" dirty="0" smtClean="0"/>
           </a:p>
           <a:p>
             <a:r>
               <a:rPr lang="en-US" sz="1200" dirty="0" smtClean="0"/>
               <a:t>Try button and you get all your assigned buttons only etc.</a:t>
             </a:r>
-            <a:endParaRPr lang="en-US" sz="1200" dirty="0" smtClean="0"/>
           </a:p>
           <a:p>
             <a:endParaRPr lang="en-US" sz="1200" dirty="0"/>
@@ -3746,15 +3732,7 @@
             </a:pPr>
             <a:r>
               <a:rPr lang="en-US" sz="1200" dirty="0" smtClean="0"/>
-              <a:t>RESET DEFAULTS    loads the </a:t>
-            </a:r>
-            <a:r>
-              <a:rPr lang="en-US" sz="1200" dirty="0" smtClean="0"/>
-              <a:t>Joystick actions mapped with wha</a:t>
-            </a:r>
-            <a:r>
-              <a:rPr lang="en-US" sz="1200" dirty="0" smtClean="0"/>
-              <a:t>t CIG is providing</a:t>
+              <a:t>RESET DEFAULTS    loads the Joystick actions mapped with what CIG is providing</a:t>
             </a:r>
           </a:p>
           <a:p>
@@ -3838,11 +3816,7 @@
             </a:r>
             <a:r>
               <a:rPr lang="en-US" sz="1200" dirty="0" smtClean="0"/>
-              <a:t> you may chose one of those – however </a:t>
-            </a:r>
-            <a:r>
-              <a:rPr lang="en-US" sz="1200" dirty="0" smtClean="0"/>
-              <a:t>using the </a:t>
+              <a:t> you may chose one of those – however using the </a:t>
             </a:r>
             <a:r>
               <a:rPr lang="en-US" sz="1200" b="1" dirty="0" err="1" smtClean="0"/>
@@ -3859,7 +3833,6 @@
               <a:rPr lang="en-US" sz="1200" dirty="0" smtClean="0"/>
               <a:t>(This may be work in progress by CIG…)</a:t>
             </a:r>
-            <a:endParaRPr lang="en-US" sz="1200" dirty="0" smtClean="0"/>
           </a:p>
         </p:txBody>
       </p:sp>
@@ -4150,7 +4123,6 @@
               <a:rPr lang="en-US" sz="700" dirty="0" smtClean="0"/>
               <a:t>)</a:t>
             </a:r>
-            <a:endParaRPr lang="en-US" sz="700" dirty="0" smtClean="0"/>
           </a:p>
           <a:p>
             <a:endParaRPr lang="en-US" sz="1200" dirty="0"/>
@@ -4158,15 +4130,7 @@
           <a:p>
             <a:r>
               <a:rPr lang="en-US" sz="1200" dirty="0" smtClean="0"/>
-              <a:t>From here you may first </a:t>
-            </a:r>
-            <a:r>
-              <a:rPr lang="en-US" sz="1200" dirty="0" smtClean="0"/>
-              <a:t>chose a map, then ‘</a:t>
-            </a:r>
-            <a:r>
-              <a:rPr lang="en-US" sz="1200" dirty="0" smtClean="0"/>
-              <a:t>Load’ the </a:t>
+              <a:t>From here you may first chose a map, then ‘Load’ the </a:t>
             </a:r>
             <a:r>
               <a:rPr lang="en-US" sz="1200" dirty="0" err="1" smtClean="0"/>
@@ -4684,7 +4648,6 @@
               <a:rPr lang="en-US" sz="700" dirty="0" smtClean="0"/>
               <a:t>)</a:t>
             </a:r>
-            <a:endParaRPr lang="en-US" sz="700" dirty="0" smtClean="0"/>
           </a:p>
           <a:p>
             <a:endParaRPr lang="en-US" sz="1200" dirty="0"/>
@@ -4737,7 +4700,6 @@
               <a:rPr lang="en-US" sz="1200" dirty="0" smtClean="0"/>
               <a:t>Lowercase only, no spaces, tabs allowed else you see the red flag ..</a:t>
             </a:r>
-            <a:endParaRPr lang="en-US" sz="1200" dirty="0" smtClean="0"/>
           </a:p>
           <a:p>
             <a:endParaRPr lang="en-US" sz="1200" dirty="0" smtClean="0"/>
@@ -7754,19 +7716,7 @@
           <a:p>
             <a:r>
               <a:rPr lang="en-US" dirty="0" smtClean="0"/>
-              <a:t>Updating from V </a:t>
-            </a:r>
-            <a:r>
-              <a:rPr lang="en-US" dirty="0" smtClean="0"/>
-              <a:t>1.x </a:t>
-            </a:r>
-            <a:r>
-              <a:rPr lang="en-US" dirty="0" smtClean="0"/>
-              <a:t>to V </a:t>
-            </a:r>
-            <a:r>
-              <a:rPr lang="en-US" dirty="0" smtClean="0"/>
-              <a:t>2.0:</a:t>
+              <a:t>Updating from V 1.x to V 2.0:</a:t>
             </a:r>
             <a:endParaRPr lang="de-CH" dirty="0"/>
           </a:p>
@@ -7791,11 +7741,7 @@
           <a:p>
             <a:r>
               <a:rPr lang="en-US" sz="2400" dirty="0" smtClean="0"/>
-              <a:t>As the action list </a:t>
-            </a:r>
-            <a:r>
-              <a:rPr lang="en-US" sz="2400" dirty="0" smtClean="0"/>
-              <a:t>taken from the game assets (</a:t>
+              <a:t>As the action list taken from the game assets (</a:t>
             </a:r>
             <a:r>
               <a:rPr lang="en-US" sz="2400" dirty="0" err="1" smtClean="0"/>
@@ -7810,11 +7756,7 @@
             </a:br>
             <a:r>
               <a:rPr lang="en-US" sz="2400" dirty="0" smtClean="0"/>
-              <a:t>You </a:t>
-            </a:r>
-            <a:r>
-              <a:rPr lang="en-US" sz="2400" dirty="0" smtClean="0"/>
-              <a:t>have to </a:t>
+              <a:t>You have to </a:t>
             </a:r>
             <a:r>
               <a:rPr lang="en-US" sz="2400" dirty="0" smtClean="0">
@@ -7822,23 +7764,7 @@
                   <a:srgbClr val="FF0000"/>
                 </a:solidFill>
               </a:rPr>
-              <a:t>manually remove the </a:t>
-            </a:r>
-            <a:r>
-              <a:rPr lang="en-US" sz="2400" dirty="0" smtClean="0">
-                <a:solidFill>
-                  <a:srgbClr val="FF0000"/>
-                </a:solidFill>
-              </a:rPr>
-              <a:t>‘defaultProfile.xml’ </a:t>
-            </a:r>
-            <a:r>
-              <a:rPr lang="en-US" sz="2400" dirty="0" smtClean="0">
-                <a:solidFill>
-                  <a:srgbClr val="FF0000"/>
-                </a:solidFill>
-              </a:rPr>
-              <a:t>file if it exists in the same folder as the program file</a:t>
+              <a:t>manually remove the ‘defaultProfile.xml’ file if it exists in the same folder as the program file</a:t>
             </a:r>
             <a:r>
               <a:rPr lang="en-US" sz="2400" dirty="0" smtClean="0"/>
@@ -7849,32 +7775,16 @@
             </a:br>
             <a:r>
               <a:rPr lang="en-US" sz="2400" dirty="0" smtClean="0"/>
-              <a:t>If the program finds it there it is taken before the </a:t>
-            </a:r>
+              <a:t>If the program finds it there it is taken before the one from the game (which is may be not what you wanted)</a:t>
+            </a:r>
+          </a:p>
+          <a:p>
+            <a:endParaRPr lang="en-US" sz="2400" dirty="0" smtClean="0"/>
+          </a:p>
+          <a:p>
             <a:r>
               <a:rPr lang="en-US" sz="2400" dirty="0" smtClean="0"/>
-              <a:t>one from the game</a:t>
-            </a:r>
-            <a:r>
-              <a:rPr lang="en-US" sz="2400" dirty="0" smtClean="0"/>
-              <a:t> </a:t>
-            </a:r>
-            <a:r>
-              <a:rPr lang="en-US" sz="2400" dirty="0" smtClean="0"/>
-              <a:t>(which is may be not what you wanted)</a:t>
-            </a:r>
-          </a:p>
-          <a:p>
-            <a:endParaRPr lang="en-US" sz="2400" dirty="0" smtClean="0"/>
-          </a:p>
-          <a:p>
-            <a:r>
-              <a:rPr lang="en-US" sz="2400" dirty="0" smtClean="0"/>
-              <a:t>You may however use </a:t>
-            </a:r>
-            <a:r>
-              <a:rPr lang="en-US" sz="2400" dirty="0" smtClean="0"/>
-              <a:t>this priority for any purpose</a:t>
+              <a:t>You may however use this priority for any purpose</a:t>
             </a:r>
             <a:br>
               <a:rPr lang="en-US" sz="2400" dirty="0" smtClean="0"/>
@@ -7998,11 +7908,7 @@
             </a:r>
             <a:r>
               <a:rPr lang="en-US" sz="1500" dirty="0" smtClean="0"/>
-              <a:t> C:\</a:t>
-            </a:r>
-            <a:r>
-              <a:rPr lang="en-US" sz="1500" dirty="0" smtClean="0"/>
-              <a:t>maps\layout_my_joystick</a:t>
+              <a:t> C:\maps\layout_my_joystick</a:t>
             </a:r>
           </a:p>
           <a:p>
@@ -9257,15 +9163,7 @@
             </a:r>
             <a:r>
               <a:rPr lang="en-US" sz="1200" dirty="0" smtClean="0"/>
-              <a:t> Joystick </a:t>
-            </a:r>
-            <a:r>
-              <a:rPr lang="en-US" sz="1200" dirty="0" smtClean="0"/>
-              <a:t>to capture </a:t>
-            </a:r>
-            <a:r>
-              <a:rPr lang="en-US" sz="1200" dirty="0" smtClean="0"/>
-              <a:t>the image</a:t>
+              <a:t> Joystick to capture the image</a:t>
             </a:r>
           </a:p>
           <a:p>
@@ -9545,15 +9443,7 @@
                   <a:schemeClr val="tx1"/>
                 </a:solidFill>
               </a:rPr>
-              <a:t>However no damage is done! This mapping is only valid until you exit the </a:t>
-            </a:r>
-            <a:r>
-              <a:rPr lang="en-US" sz="1400" dirty="0" smtClean="0">
-                <a:solidFill>
-                  <a:schemeClr val="tx1"/>
-                </a:solidFill>
-              </a:rPr>
-              <a:t>game or type </a:t>
+              <a:t>However no damage is done! This mapping is only valid until you exit the game or type </a:t>
             </a:r>
             <a:r>
               <a:rPr lang="en-US" sz="1200" i="1" dirty="0" err="1" smtClean="0">
@@ -9571,11 +9461,6 @@
               </a:rPr>
               <a:t>   without a name</a:t>
             </a:r>
-            <a:endParaRPr lang="en-US" sz="1400" dirty="0" smtClean="0">
-              <a:solidFill>
-                <a:schemeClr val="tx1"/>
-              </a:solidFill>
-            </a:endParaRPr>
           </a:p>
           <a:p>
             <a:endParaRPr lang="en-US" sz="1400" dirty="0"/>
@@ -9596,11 +9481,7 @@
             </a:r>
             <a:r>
               <a:rPr lang="en-US" sz="1400" b="1" i="1" dirty="0" smtClean="0"/>
-              <a:t> – </a:t>
-            </a:r>
-            <a:r>
-              <a:rPr lang="en-US" sz="1400" b="1" i="1" dirty="0" smtClean="0"/>
-              <a:t>js1_y   </a:t>
+              <a:t> – js1_y   </a:t>
             </a:r>
             <a:r>
               <a:rPr lang="en-US" sz="1400" dirty="0" smtClean="0"/>
@@ -9612,21 +9493,8 @@
             </a:r>
             <a:r>
               <a:rPr lang="en-US" sz="1400" dirty="0" smtClean="0"/>
-              <a:t> (joystick per default) is rebound to the joystick </a:t>
-            </a:r>
-            <a:r>
-              <a:rPr lang="en-US" sz="1400" dirty="0" smtClean="0"/>
-              <a:t>1 (green) </a:t>
-            </a:r>
-            <a:r>
-              <a:rPr lang="en-US" sz="1400" dirty="0" smtClean="0"/>
-              <a:t>and there the Y-axis control</a:t>
-            </a:r>
-            <a:r>
-              <a:rPr lang="en-US" sz="1400" dirty="0" smtClean="0"/>
-              <a:t>.</a:t>
-            </a:r>
-            <a:endParaRPr lang="en-US" sz="1400" dirty="0" smtClean="0"/>
+              <a:t> (joystick per default) is rebound to the joystick 1 (green) and there the Y-axis control.</a:t>
+            </a:r>
           </a:p>
           <a:p>
             <a:r>
@@ -9790,7 +9658,7 @@
       </p:grpSpPr>
       <p:pic>
         <p:nvPicPr>
-          <p:cNvPr id="7" name="Grafik 6"/>
+          <p:cNvPr id="3" name="Grafik 2"/>
           <p:cNvPicPr>
             <a:picLocks noChangeAspect="1"/>
           </p:cNvPicPr>
@@ -9804,8 +9672,8 @@
         </p:blipFill>
         <p:spPr>
           <a:xfrm>
-            <a:off x="1403648" y="1124744"/>
-            <a:ext cx="6197377" cy="5577639"/>
+            <a:off x="1401835" y="1124744"/>
+            <a:ext cx="6197376" cy="5577639"/>
           </a:xfrm>
           <a:prstGeom prst="rect">
             <a:avLst/>
@@ -9843,7 +9711,7 @@
         </p:nvSpPr>
         <p:spPr>
           <a:xfrm flipV="1">
-            <a:off x="3275856" y="4347051"/>
+            <a:off x="3275856" y="4293097"/>
             <a:ext cx="1944216" cy="864096"/>
           </a:xfrm>
           <a:prstGeom prst="rect">
@@ -9883,8 +9751,8 @@
         </p:nvSpPr>
         <p:spPr>
           <a:xfrm>
-            <a:off x="457200" y="1340768"/>
-            <a:ext cx="8227719" cy="2952329"/>
+            <a:off x="457200" y="1340769"/>
+            <a:ext cx="8227719" cy="2880320"/>
           </a:xfrm>
           <a:prstGeom prst="rect">
             <a:avLst/>
@@ -9948,8 +9816,45 @@
           </a:p>
           <a:p>
             <a:r>
+              <a:rPr lang="en-US" sz="1200" dirty="0" smtClean="0">
+                <a:solidFill>
+                  <a:schemeClr val="accent6">
+                    <a:lumMod val="75000"/>
+                  </a:schemeClr>
+                </a:solidFill>
+              </a:rPr>
+              <a:t>V2: To make any axis a Throttle axis – check the ‘Throttle’ box ! It is often the Z-Axis but the Rhino has it e.g. on js2_y.</a:t>
+            </a:r>
+          </a:p>
+          <a:p>
+            <a:r>
+              <a:rPr lang="en-US" sz="1200" dirty="0" smtClean="0">
+                <a:solidFill>
+                  <a:schemeClr val="accent6">
+                    <a:lumMod val="75000"/>
+                  </a:schemeClr>
+                </a:solidFill>
+              </a:rPr>
+              <a:t>If you do so the control assigned in changed to a throttle control (here js1_throttlez)</a:t>
+            </a:r>
+          </a:p>
+          <a:p>
+            <a:endParaRPr lang="en-US" sz="1200" dirty="0">
+              <a:solidFill>
+                <a:schemeClr val="accent6">
+                  <a:lumMod val="75000"/>
+                </a:schemeClr>
+              </a:solidFill>
+            </a:endParaRPr>
+          </a:p>
+          <a:p>
+            <a:r>
               <a:rPr lang="en-US" sz="1200" dirty="0" smtClean="0"/>
-              <a:t>To clear a mapping – select it in the </a:t>
+              <a:t>To </a:t>
+            </a:r>
+            <a:r>
+              <a:rPr lang="en-US" sz="1200" dirty="0" smtClean="0"/>
+              <a:t>clear a mapping – select it in the </a:t>
             </a:r>
             <a:r>
               <a:rPr lang="en-US" sz="1200" dirty="0" err="1" smtClean="0"/>
@@ -9972,7 +9877,11 @@
           <a:p>
             <a:r>
               <a:rPr lang="en-US" sz="1200" dirty="0" smtClean="0"/>
-              <a:t>You may use “Find 1</a:t>
+              <a:t>You </a:t>
+            </a:r>
+            <a:r>
+              <a:rPr lang="en-US" sz="1200" dirty="0" smtClean="0"/>
+              <a:t>may use “Find 1</a:t>
             </a:r>
             <a:r>
               <a:rPr lang="en-US" sz="1200" baseline="30000" dirty="0" smtClean="0"/>
@@ -9984,7 +9893,21 @@
             </a:r>
             <a:r>
               <a:rPr lang="en-US" sz="1200" dirty="0" smtClean="0"/>
-              <a:t>js_button47) </a:t>
+              <a:t>js1_z </a:t>
+            </a:r>
+            <a:r>
+              <a:rPr lang="en-US" sz="1200" dirty="0" smtClean="0">
+                <a:solidFill>
+                  <a:schemeClr val="accent6">
+                    <a:lumMod val="75000"/>
+                  </a:schemeClr>
+                </a:solidFill>
+              </a:rPr>
+              <a:t>or if checked as shown js1_throttlez</a:t>
+            </a:r>
+            <a:r>
+              <a:rPr lang="en-US" sz="1200" dirty="0" smtClean="0"/>
+              <a:t>) </a:t>
             </a:r>
             <a:r>
               <a:rPr lang="en-US" sz="1200" dirty="0" smtClean="0"/>
@@ -9993,6 +9916,48 @@
           </a:p>
           <a:p>
             <a:endParaRPr lang="en-US" sz="1200" dirty="0" smtClean="0"/>
+          </a:p>
+        </p:txBody>
+      </p:sp>
+      <p:sp>
+        <p:nvSpPr>
+          <p:cNvPr id="8" name="Ellipse 7"/>
+          <p:cNvSpPr/>
+          <p:nvPr/>
+        </p:nvSpPr>
+        <p:spPr>
+          <a:xfrm>
+            <a:off x="1643736" y="5397280"/>
+            <a:ext cx="288032" cy="288032"/>
+          </a:xfrm>
+          <a:prstGeom prst="ellipse">
+            <a:avLst/>
+          </a:prstGeom>
+          <a:noFill/>
+          <a:ln w="57150"/>
+        </p:spPr>
+        <p:style>
+          <a:lnRef idx="2">
+            <a:schemeClr val="accent2">
+              <a:shade val="50000"/>
+            </a:schemeClr>
+          </a:lnRef>
+          <a:fillRef idx="1">
+            <a:schemeClr val="accent2"/>
+          </a:fillRef>
+          <a:effectRef idx="0">
+            <a:schemeClr val="accent2"/>
+          </a:effectRef>
+          <a:fontRef idx="minor">
+            <a:schemeClr val="lt1"/>
+          </a:fontRef>
+        </p:style>
+        <p:txBody>
+          <a:bodyPr rtlCol="0" anchor="ctr"/>
+          <a:lstStyle/>
+          <a:p>
+            <a:pPr algn="ctr"/>
+            <a:endParaRPr lang="de-CH"/>
           </a:p>
         </p:txBody>
       </p:sp>

</xml_diff>

<commit_message>
Final V 2.1 doc update
</commit_message>
<xml_diff>
--- a/doc/SCJMapper_QGuide.pptx
+++ b/doc/SCJMapper_QGuide.pptx
@@ -18,7 +18,8 @@
     <p:sldId id="269" r:id="rId12"/>
     <p:sldId id="270" r:id="rId13"/>
     <p:sldId id="268" r:id="rId14"/>
-    <p:sldId id="266" r:id="rId15"/>
+    <p:sldId id="271" r:id="rId15"/>
+    <p:sldId id="266" r:id="rId16"/>
   </p:sldIdLst>
   <p:sldSz cx="9144000" cy="6858000" type="screen4x3"/>
   <p:notesSz cx="6858000" cy="9144000"/>
@@ -317,7 +318,7 @@
           <a:p>
             <a:fld id="{1BA50D42-C9CD-4801-B293-61D1F53EC57E}" type="datetimeFigureOut">
               <a:rPr lang="de-DE" smtClean="0"/>
-              <a:t>03.07.2014</a:t>
+              <a:t>09.07.2014</a:t>
             </a:fld>
             <a:endParaRPr lang="de-DE"/>
           </a:p>
@@ -482,7 +483,7 @@
           <a:p>
             <a:fld id="{1BA50D42-C9CD-4801-B293-61D1F53EC57E}" type="datetimeFigureOut">
               <a:rPr lang="de-DE" smtClean="0"/>
-              <a:t>03.07.2014</a:t>
+              <a:t>09.07.2014</a:t>
             </a:fld>
             <a:endParaRPr lang="de-DE"/>
           </a:p>
@@ -657,7 +658,7 @@
           <a:p>
             <a:fld id="{1BA50D42-C9CD-4801-B293-61D1F53EC57E}" type="datetimeFigureOut">
               <a:rPr lang="de-DE" smtClean="0"/>
-              <a:t>03.07.2014</a:t>
+              <a:t>09.07.2014</a:t>
             </a:fld>
             <a:endParaRPr lang="de-DE"/>
           </a:p>
@@ -822,7 +823,7 @@
           <a:p>
             <a:fld id="{1BA50D42-C9CD-4801-B293-61D1F53EC57E}" type="datetimeFigureOut">
               <a:rPr lang="de-DE" smtClean="0"/>
-              <a:t>03.07.2014</a:t>
+              <a:t>09.07.2014</a:t>
             </a:fld>
             <a:endParaRPr lang="de-DE"/>
           </a:p>
@@ -1063,7 +1064,7 @@
           <a:p>
             <a:fld id="{1BA50D42-C9CD-4801-B293-61D1F53EC57E}" type="datetimeFigureOut">
               <a:rPr lang="de-DE" smtClean="0"/>
-              <a:t>03.07.2014</a:t>
+              <a:t>09.07.2014</a:t>
             </a:fld>
             <a:endParaRPr lang="de-DE"/>
           </a:p>
@@ -1346,7 +1347,7 @@
           <a:p>
             <a:fld id="{1BA50D42-C9CD-4801-B293-61D1F53EC57E}" type="datetimeFigureOut">
               <a:rPr lang="de-DE" smtClean="0"/>
-              <a:t>03.07.2014</a:t>
+              <a:t>09.07.2014</a:t>
             </a:fld>
             <a:endParaRPr lang="de-DE"/>
           </a:p>
@@ -1763,7 +1764,7 @@
           <a:p>
             <a:fld id="{1BA50D42-C9CD-4801-B293-61D1F53EC57E}" type="datetimeFigureOut">
               <a:rPr lang="de-DE" smtClean="0"/>
-              <a:t>03.07.2014</a:t>
+              <a:t>09.07.2014</a:t>
             </a:fld>
             <a:endParaRPr lang="de-DE"/>
           </a:p>
@@ -1876,7 +1877,7 @@
           <a:p>
             <a:fld id="{1BA50D42-C9CD-4801-B293-61D1F53EC57E}" type="datetimeFigureOut">
               <a:rPr lang="de-DE" smtClean="0"/>
-              <a:t>03.07.2014</a:t>
+              <a:t>09.07.2014</a:t>
             </a:fld>
             <a:endParaRPr lang="de-DE"/>
           </a:p>
@@ -1966,7 +1967,7 @@
           <a:p>
             <a:fld id="{1BA50D42-C9CD-4801-B293-61D1F53EC57E}" type="datetimeFigureOut">
               <a:rPr lang="de-DE" smtClean="0"/>
-              <a:t>03.07.2014</a:t>
+              <a:t>09.07.2014</a:t>
             </a:fld>
             <a:endParaRPr lang="de-DE"/>
           </a:p>
@@ -2238,7 +2239,7 @@
           <a:p>
             <a:fld id="{1BA50D42-C9CD-4801-B293-61D1F53EC57E}" type="datetimeFigureOut">
               <a:rPr lang="de-DE" smtClean="0"/>
-              <a:t>03.07.2014</a:t>
+              <a:t>09.07.2014</a:t>
             </a:fld>
             <a:endParaRPr lang="de-DE"/>
           </a:p>
@@ -2486,7 +2487,7 @@
           <a:p>
             <a:fld id="{1BA50D42-C9CD-4801-B293-61D1F53EC57E}" type="datetimeFigureOut">
               <a:rPr lang="de-DE" smtClean="0"/>
-              <a:t>03.07.2014</a:t>
+              <a:t>09.07.2014</a:t>
             </a:fld>
             <a:endParaRPr lang="de-DE"/>
           </a:p>
@@ -2694,7 +2695,7 @@
           <a:p>
             <a:fld id="{1BA50D42-C9CD-4801-B293-61D1F53EC57E}" type="datetimeFigureOut">
               <a:rPr lang="de-DE" smtClean="0"/>
-              <a:t>03.07.2014</a:t>
+              <a:t>09.07.2014</a:t>
             </a:fld>
             <a:endParaRPr lang="de-DE"/>
           </a:p>
@@ -3064,6 +3065,30 @@
           <a:chExt cx="0" cy="0"/>
         </a:xfrm>
       </p:grpSpPr>
+      <p:pic>
+        <p:nvPicPr>
+          <p:cNvPr id="6" name="Grafik 5"/>
+          <p:cNvPicPr>
+            <a:picLocks noChangeAspect="1"/>
+          </p:cNvPicPr>
+          <p:nvPr/>
+        </p:nvPicPr>
+        <p:blipFill>
+          <a:blip r:embed="rId2"/>
+          <a:stretch>
+            <a:fillRect/>
+          </a:stretch>
+        </p:blipFill>
+        <p:spPr>
+          <a:xfrm>
+            <a:off x="5818773" y="3774638"/>
+            <a:ext cx="3219109" cy="2897198"/>
+          </a:xfrm>
+          <a:prstGeom prst="rect">
+            <a:avLst/>
+          </a:prstGeom>
+        </p:spPr>
+      </p:pic>
       <p:sp>
         <p:nvSpPr>
           <p:cNvPr id="2" name="Titel 1"/>
@@ -3090,7 +3115,11 @@
             </a:br>
             <a:r>
               <a:rPr lang="en-US" sz="4000" dirty="0" smtClean="0"/>
-              <a:t>Quick Reference Guide  V 2.0</a:t>
+              <a:t>Quick Reference Guide  V </a:t>
+            </a:r>
+            <a:r>
+              <a:rPr lang="en-US" sz="4000" dirty="0" smtClean="0"/>
+              <a:t>2.1</a:t>
             </a:r>
             <a:endParaRPr lang="en-US" sz="4000" dirty="0"/>
           </a:p>
@@ -3120,7 +3149,11 @@
           <a:p>
             <a:r>
               <a:rPr lang="en-US" sz="900" dirty="0" smtClean="0"/>
-              <a:t>20140630 – Cassini</a:t>
+              <a:t>20140709 </a:t>
+            </a:r>
+            <a:r>
+              <a:rPr lang="en-US" sz="900" dirty="0" smtClean="0"/>
+              <a:t>– Cassini</a:t>
             </a:r>
           </a:p>
           <a:p>
@@ -3212,64 +3245,6 @@
               <a:t>Have fun in the verse …</a:t>
             </a:r>
             <a:endParaRPr lang="en-US" sz="1000" dirty="0"/>
-          </a:p>
-        </p:txBody>
-      </p:sp>
-      <p:pic>
-        <p:nvPicPr>
-          <p:cNvPr id="4" name="Grafik 3"/>
-          <p:cNvPicPr>
-            <a:picLocks noChangeAspect="1"/>
-          </p:cNvPicPr>
-          <p:nvPr/>
-        </p:nvPicPr>
-        <p:blipFill>
-          <a:blip r:embed="rId2"/>
-          <a:stretch>
-            <a:fillRect/>
-          </a:stretch>
-        </p:blipFill>
-        <p:spPr>
-          <a:xfrm>
-            <a:off x="5796136" y="3774638"/>
-            <a:ext cx="3219108" cy="2897198"/>
-          </a:xfrm>
-          <a:prstGeom prst="rect">
-            <a:avLst/>
-          </a:prstGeom>
-        </p:spPr>
-      </p:pic>
-      <p:sp>
-        <p:nvSpPr>
-          <p:cNvPr id="8" name="Textfeld 7"/>
-          <p:cNvSpPr txBox="1"/>
-          <p:nvPr/>
-        </p:nvSpPr>
-        <p:spPr>
-          <a:xfrm>
-            <a:off x="7260360" y="3898232"/>
-            <a:ext cx="864096" cy="107722"/>
-          </a:xfrm>
-          <a:prstGeom prst="rect">
-            <a:avLst/>
-          </a:prstGeom>
-          <a:solidFill>
-            <a:schemeClr val="bg1">
-              <a:lumMod val="95000"/>
-            </a:schemeClr>
-          </a:solidFill>
-        </p:spPr>
-        <p:txBody>
-          <a:bodyPr wrap="square" lIns="0" tIns="0" rIns="0" bIns="0" rtlCol="0">
-            <a:spAutoFit/>
-          </a:bodyPr>
-          <a:lstStyle/>
-          <a:p>
-            <a:r>
-              <a:rPr lang="en-US" sz="700" b="1" dirty="0" smtClean="0"/>
-              <a:t>2.0</a:t>
-            </a:r>
-            <a:endParaRPr lang="de-CH" sz="700" b="1" dirty="0"/>
           </a:p>
         </p:txBody>
       </p:sp>
@@ -3343,10 +3318,18 @@
           <a:lstStyle/>
           <a:p>
             <a:r>
-              <a:rPr lang="en-US" dirty="0" smtClean="0"/>
+              <a:rPr lang="en-US" dirty="0" smtClean="0">
+                <a:solidFill>
+                  <a:schemeClr val="accent6"/>
+                </a:solidFill>
+              </a:rPr>
               <a:t>V2 – Features - 1</a:t>
             </a:r>
-            <a:endParaRPr lang="en-US" dirty="0"/>
+            <a:endParaRPr lang="en-US" dirty="0">
+              <a:solidFill>
+                <a:schemeClr val="accent6"/>
+              </a:solidFill>
+            </a:endParaRPr>
           </a:p>
         </p:txBody>
       </p:sp>
@@ -3606,10 +3589,18 @@
           <a:lstStyle/>
           <a:p>
             <a:r>
-              <a:rPr lang="en-US" dirty="0" smtClean="0"/>
+              <a:rPr lang="en-US" dirty="0" smtClean="0">
+                <a:solidFill>
+                  <a:schemeClr val="accent6"/>
+                </a:solidFill>
+              </a:rPr>
               <a:t>V2 – Features - 2</a:t>
             </a:r>
-            <a:endParaRPr lang="en-US" dirty="0"/>
+            <a:endParaRPr lang="en-US" dirty="0">
+              <a:solidFill>
+                <a:schemeClr val="accent6"/>
+              </a:solidFill>
+            </a:endParaRPr>
           </a:p>
         </p:txBody>
       </p:sp>
@@ -3968,10 +3959,18 @@
           <a:lstStyle/>
           <a:p>
             <a:r>
-              <a:rPr lang="en-US" dirty="0" smtClean="0"/>
+              <a:rPr lang="en-US" dirty="0" smtClean="0">
+                <a:solidFill>
+                  <a:schemeClr val="accent6"/>
+                </a:solidFill>
+              </a:rPr>
               <a:t>V2 – Features - 3</a:t>
             </a:r>
-            <a:endParaRPr lang="en-US" dirty="0"/>
+            <a:endParaRPr lang="en-US" dirty="0">
+              <a:solidFill>
+                <a:schemeClr val="accent6"/>
+              </a:solidFill>
+            </a:endParaRPr>
           </a:p>
         </p:txBody>
       </p:sp>
@@ -4462,10 +4461,18 @@
           <a:lstStyle/>
           <a:p>
             <a:r>
-              <a:rPr lang="en-US" dirty="0" smtClean="0"/>
+              <a:rPr lang="en-US" dirty="0" smtClean="0">
+                <a:solidFill>
+                  <a:schemeClr val="accent6"/>
+                </a:solidFill>
+              </a:rPr>
               <a:t>V2 – Features - 4</a:t>
             </a:r>
-            <a:endParaRPr lang="en-US" dirty="0"/>
+            <a:endParaRPr lang="en-US" dirty="0">
+              <a:solidFill>
+                <a:schemeClr val="accent6"/>
+              </a:solidFill>
+            </a:endParaRPr>
           </a:p>
         </p:txBody>
       </p:sp>
@@ -4983,6 +4990,507 @@
           <a:chExt cx="0" cy="0"/>
         </a:xfrm>
       </p:grpSpPr>
+      <p:pic>
+        <p:nvPicPr>
+          <p:cNvPr id="7" name="Grafik 6"/>
+          <p:cNvPicPr>
+            <a:picLocks noChangeAspect="1"/>
+          </p:cNvPicPr>
+          <p:nvPr/>
+        </p:nvPicPr>
+        <p:blipFill>
+          <a:blip r:embed="rId2"/>
+          <a:stretch>
+            <a:fillRect/>
+          </a:stretch>
+        </p:blipFill>
+        <p:spPr>
+          <a:xfrm>
+            <a:off x="1406191" y="1124743"/>
+            <a:ext cx="6194833" cy="5575350"/>
+          </a:xfrm>
+          <a:prstGeom prst="rect">
+            <a:avLst/>
+          </a:prstGeom>
+        </p:spPr>
+      </p:pic>
+      <p:sp>
+        <p:nvSpPr>
+          <p:cNvPr id="2" name="Titel 1"/>
+          <p:cNvSpPr>
+            <a:spLocks noGrp="1"/>
+          </p:cNvSpPr>
+          <p:nvPr>
+            <p:ph type="title"/>
+          </p:nvPr>
+        </p:nvSpPr>
+        <p:spPr/>
+        <p:txBody>
+          <a:bodyPr/>
+          <a:lstStyle/>
+          <a:p>
+            <a:r>
+              <a:rPr lang="en-US" dirty="0" smtClean="0">
+                <a:solidFill>
+                  <a:schemeClr val="accent3"/>
+                </a:solidFill>
+              </a:rPr>
+              <a:t>V2.1 </a:t>
+            </a:r>
+            <a:r>
+              <a:rPr lang="en-US" dirty="0" smtClean="0">
+                <a:solidFill>
+                  <a:schemeClr val="accent3"/>
+                </a:solidFill>
+              </a:rPr>
+              <a:t>– </a:t>
+            </a:r>
+            <a:r>
+              <a:rPr lang="en-US" dirty="0" smtClean="0">
+                <a:solidFill>
+                  <a:schemeClr val="accent3"/>
+                </a:solidFill>
+              </a:rPr>
+              <a:t>Features</a:t>
+            </a:r>
+            <a:endParaRPr lang="en-US" dirty="0">
+              <a:solidFill>
+                <a:schemeClr val="accent3"/>
+              </a:solidFill>
+            </a:endParaRPr>
+          </a:p>
+        </p:txBody>
+      </p:sp>
+      <p:sp>
+        <p:nvSpPr>
+          <p:cNvPr id="14" name="Textfeld 13"/>
+          <p:cNvSpPr txBox="1"/>
+          <p:nvPr/>
+        </p:nvSpPr>
+        <p:spPr>
+          <a:xfrm>
+            <a:off x="4217976" y="1394912"/>
+            <a:ext cx="864096" cy="161583"/>
+          </a:xfrm>
+          <a:prstGeom prst="rect">
+            <a:avLst/>
+          </a:prstGeom>
+          <a:solidFill>
+            <a:schemeClr val="bg1">
+              <a:lumMod val="95000"/>
+            </a:schemeClr>
+          </a:solidFill>
+        </p:spPr>
+        <p:txBody>
+          <a:bodyPr wrap="square" lIns="0" tIns="0" rIns="0" bIns="0" rtlCol="0">
+            <a:spAutoFit/>
+          </a:bodyPr>
+          <a:lstStyle/>
+          <a:p>
+            <a:r>
+              <a:rPr lang="en-US" sz="1050" b="1" dirty="0" smtClean="0"/>
+              <a:t>2.0</a:t>
+            </a:r>
+            <a:endParaRPr lang="de-CH" sz="1050" b="1" dirty="0"/>
+          </a:p>
+        </p:txBody>
+      </p:sp>
+      <p:sp>
+        <p:nvSpPr>
+          <p:cNvPr id="17" name="Rechteck 16"/>
+          <p:cNvSpPr/>
+          <p:nvPr/>
+        </p:nvSpPr>
+        <p:spPr>
+          <a:xfrm flipV="1">
+            <a:off x="3275857" y="5988330"/>
+            <a:ext cx="942120" cy="500871"/>
+          </a:xfrm>
+          <a:prstGeom prst="rect">
+            <a:avLst/>
+          </a:prstGeom>
+          <a:noFill/>
+          <a:ln w="57150"/>
+        </p:spPr>
+        <p:style>
+          <a:lnRef idx="2">
+            <a:schemeClr val="accent3"/>
+          </a:lnRef>
+          <a:fillRef idx="1">
+            <a:schemeClr val="lt1"/>
+          </a:fillRef>
+          <a:effectRef idx="0">
+            <a:schemeClr val="accent3"/>
+          </a:effectRef>
+          <a:fontRef idx="minor">
+            <a:schemeClr val="dk1"/>
+          </a:fontRef>
+        </p:style>
+        <p:txBody>
+          <a:bodyPr rtlCol="0" anchor="ctr"/>
+          <a:lstStyle/>
+          <a:p>
+            <a:pPr algn="ctr"/>
+            <a:endParaRPr lang="de-CH"/>
+          </a:p>
+        </p:txBody>
+      </p:sp>
+      <p:sp>
+        <p:nvSpPr>
+          <p:cNvPr id="18" name="Rechteck 17"/>
+          <p:cNvSpPr/>
+          <p:nvPr/>
+        </p:nvSpPr>
+        <p:spPr>
+          <a:xfrm>
+            <a:off x="611560" y="1340768"/>
+            <a:ext cx="8075240" cy="4451857"/>
+          </a:xfrm>
+          <a:prstGeom prst="rect">
+            <a:avLst/>
+          </a:prstGeom>
+        </p:spPr>
+        <p:style>
+          <a:lnRef idx="2">
+            <a:schemeClr val="accent5"/>
+          </a:lnRef>
+          <a:fillRef idx="1">
+            <a:schemeClr val="lt1"/>
+          </a:fillRef>
+          <a:effectRef idx="0">
+            <a:schemeClr val="accent5"/>
+          </a:effectRef>
+          <a:fontRef idx="minor">
+            <a:schemeClr val="dk1"/>
+          </a:fontRef>
+        </p:style>
+        <p:txBody>
+          <a:bodyPr rtlCol="0" anchor="t" anchorCtr="0"/>
+          <a:lstStyle/>
+          <a:p>
+            <a:r>
+              <a:rPr lang="en-US" sz="1200" b="1" dirty="0" smtClean="0"/>
+              <a:t>New </a:t>
+            </a:r>
+            <a:r>
+              <a:rPr lang="en-US" sz="1200" b="1" dirty="0" smtClean="0"/>
+              <a:t>possibility to blend the unmapped joystick entries</a:t>
+            </a:r>
+            <a:endParaRPr lang="en-US" sz="1200" b="1" dirty="0" smtClean="0"/>
+          </a:p>
+          <a:p>
+            <a:endParaRPr lang="en-US" sz="1200" dirty="0"/>
+          </a:p>
+          <a:p>
+            <a:r>
+              <a:rPr lang="en-US" sz="1200" dirty="0" smtClean="0"/>
+              <a:t>If you wish to hide all the joystick actions that you don’t use – to make sure they are not active – check “Blend unmapped”</a:t>
+            </a:r>
+            <a:endParaRPr lang="en-US" sz="1200" dirty="0" smtClean="0"/>
+          </a:p>
+          <a:p>
+            <a:endParaRPr lang="en-US" sz="1200" dirty="0" smtClean="0"/>
+          </a:p>
+          <a:p>
+            <a:r>
+              <a:rPr lang="en-US" sz="1200" dirty="0" smtClean="0"/>
+              <a:t>The program will then map all unmapped actions with ‘</a:t>
+            </a:r>
+            <a:r>
+              <a:rPr lang="en-US" sz="1200" dirty="0" err="1" smtClean="0"/>
+              <a:t>jsx_reserved</a:t>
+            </a:r>
+            <a:r>
+              <a:rPr lang="en-US" sz="1200" dirty="0" smtClean="0"/>
+              <a:t>’ preventing any profile settings on the joystick.</a:t>
+            </a:r>
+          </a:p>
+          <a:p>
+            <a:r>
+              <a:rPr lang="en-US" sz="1200" dirty="0" smtClean="0"/>
+              <a:t>This is fully reversible – just uncheck the option and Dump the contents again.</a:t>
+            </a:r>
+            <a:endParaRPr lang="en-US" sz="1200" dirty="0"/>
+          </a:p>
+          <a:p>
+            <a:endParaRPr lang="en-US" sz="1200" b="1" dirty="0" smtClean="0"/>
+          </a:p>
+          <a:p>
+            <a:endParaRPr lang="en-US" sz="1200" b="1" dirty="0"/>
+          </a:p>
+          <a:p>
+            <a:r>
+              <a:rPr lang="en-US" sz="1200" b="1" dirty="0" smtClean="0"/>
+              <a:t>New Settings window</a:t>
+            </a:r>
+            <a:endParaRPr lang="en-US" sz="1200" b="1" dirty="0"/>
+          </a:p>
+          <a:p>
+            <a:r>
+              <a:rPr lang="en-US" sz="1200" dirty="0" smtClean="0"/>
+              <a:t>As many are concerned about steady ON buttons </a:t>
+            </a:r>
+            <a:r>
+              <a:rPr lang="en-US" sz="1200" dirty="0" smtClean="0"/>
+              <a:t>that might interfere with assigning the proper control to an action we included a setting to IGNORE specific buttons.</a:t>
+            </a:r>
+            <a:br>
+              <a:rPr lang="en-US" sz="1200" dirty="0" smtClean="0"/>
+            </a:br>
+            <a:r>
+              <a:rPr lang="en-US" sz="1200" dirty="0" smtClean="0"/>
+              <a:t>Just enter the button numbers to ignore separated by a Space.</a:t>
+            </a:r>
+          </a:p>
+          <a:p>
+            <a:r>
+              <a:rPr lang="en-US" sz="1200" dirty="0" smtClean="0"/>
+              <a:t>Make sure you enter the numbers for the right Joystick.</a:t>
+            </a:r>
+          </a:p>
+          <a:p>
+            <a:r>
+              <a:rPr lang="en-US" sz="1200" dirty="0" smtClean="0"/>
+              <a:t>Numbers are the same as in the main window.</a:t>
+            </a:r>
+          </a:p>
+          <a:p>
+            <a:endParaRPr lang="en-US" sz="1200" dirty="0" smtClean="0"/>
+          </a:p>
+          <a:p>
+            <a:endParaRPr lang="en-US" sz="1200" dirty="0"/>
+          </a:p>
+          <a:p>
+            <a:endParaRPr lang="en-US" sz="1200" dirty="0" smtClean="0"/>
+          </a:p>
+          <a:p>
+            <a:endParaRPr lang="en-US" sz="1200" dirty="0"/>
+          </a:p>
+          <a:p>
+            <a:endParaRPr lang="en-US" sz="1200" dirty="0"/>
+          </a:p>
+          <a:p>
+            <a:r>
+              <a:rPr lang="en-US" sz="1200" dirty="0" smtClean="0"/>
+              <a:t>There is also way to override the programs own detection of the </a:t>
+            </a:r>
+          </a:p>
+          <a:p>
+            <a:r>
+              <a:rPr lang="en-US" sz="1200" dirty="0" smtClean="0"/>
+              <a:t>Star Citizen install folder. </a:t>
+            </a:r>
+          </a:p>
+          <a:p>
+            <a:r>
+              <a:rPr lang="en-US" sz="1200" dirty="0" smtClean="0"/>
+              <a:t>Make sure to use the Checkbox if you want to override!</a:t>
+            </a:r>
+            <a:endParaRPr lang="en-US" sz="1200" dirty="0"/>
+          </a:p>
+        </p:txBody>
+      </p:sp>
+      <p:sp>
+        <p:nvSpPr>
+          <p:cNvPr id="9" name="Pfeil nach rechts 8"/>
+          <p:cNvSpPr/>
+          <p:nvPr/>
+        </p:nvSpPr>
+        <p:spPr>
+          <a:xfrm>
+            <a:off x="1154163" y="5878783"/>
+            <a:ext cx="504056" cy="285009"/>
+          </a:xfrm>
+          <a:prstGeom prst="rightArrow">
+            <a:avLst/>
+          </a:prstGeom>
+        </p:spPr>
+        <p:style>
+          <a:lnRef idx="1">
+            <a:schemeClr val="accent2"/>
+          </a:lnRef>
+          <a:fillRef idx="2">
+            <a:schemeClr val="accent2"/>
+          </a:fillRef>
+          <a:effectRef idx="1">
+            <a:schemeClr val="accent2"/>
+          </a:effectRef>
+          <a:fontRef idx="minor">
+            <a:schemeClr val="dk1"/>
+          </a:fontRef>
+        </p:style>
+        <p:txBody>
+          <a:bodyPr rtlCol="0" anchor="ctr"/>
+          <a:lstStyle/>
+          <a:p>
+            <a:pPr algn="ctr"/>
+            <a:endParaRPr lang="de-CH"/>
+          </a:p>
+        </p:txBody>
+      </p:sp>
+      <p:cxnSp>
+        <p:nvCxnSpPr>
+          <p:cNvPr id="10" name="Gerade Verbindung mit Pfeil 9"/>
+          <p:cNvCxnSpPr/>
+          <p:nvPr/>
+        </p:nvCxnSpPr>
+        <p:spPr>
+          <a:xfrm flipH="1">
+            <a:off x="2843808" y="6021288"/>
+            <a:ext cx="432049" cy="0"/>
+          </a:xfrm>
+          <a:prstGeom prst="straightConnector1">
+            <a:avLst/>
+          </a:prstGeom>
+          <a:ln>
+            <a:tailEnd type="triangle"/>
+          </a:ln>
+        </p:spPr>
+        <p:style>
+          <a:lnRef idx="2">
+            <a:schemeClr val="accent3"/>
+          </a:lnRef>
+          <a:fillRef idx="1">
+            <a:schemeClr val="lt1"/>
+          </a:fillRef>
+          <a:effectRef idx="0">
+            <a:schemeClr val="accent3"/>
+          </a:effectRef>
+          <a:fontRef idx="minor">
+            <a:schemeClr val="dk1"/>
+          </a:fontRef>
+        </p:style>
+      </p:cxnSp>
+      <p:pic>
+        <p:nvPicPr>
+          <p:cNvPr id="13" name="Grafik 12"/>
+          <p:cNvPicPr>
+            <a:picLocks noChangeAspect="1"/>
+          </p:cNvPicPr>
+          <p:nvPr/>
+        </p:nvPicPr>
+        <p:blipFill>
+          <a:blip r:embed="rId3"/>
+          <a:stretch>
+            <a:fillRect/>
+          </a:stretch>
+        </p:blipFill>
+        <p:spPr>
+          <a:xfrm>
+            <a:off x="5220072" y="3363672"/>
+            <a:ext cx="3395360" cy="2316079"/>
+          </a:xfrm>
+          <a:prstGeom prst="rect">
+            <a:avLst/>
+          </a:prstGeom>
+        </p:spPr>
+      </p:pic>
+      <p:sp>
+        <p:nvSpPr>
+          <p:cNvPr id="19" name="Pfeil nach rechts 18"/>
+          <p:cNvSpPr/>
+          <p:nvPr/>
+        </p:nvSpPr>
+        <p:spPr>
+          <a:xfrm>
+            <a:off x="4830044" y="5067136"/>
+            <a:ext cx="504056" cy="285009"/>
+          </a:xfrm>
+          <a:prstGeom prst="rightArrow">
+            <a:avLst/>
+          </a:prstGeom>
+        </p:spPr>
+        <p:style>
+          <a:lnRef idx="1">
+            <a:schemeClr val="accent2"/>
+          </a:lnRef>
+          <a:fillRef idx="2">
+            <a:schemeClr val="accent2"/>
+          </a:fillRef>
+          <a:effectRef idx="1">
+            <a:schemeClr val="accent2"/>
+          </a:effectRef>
+          <a:fontRef idx="minor">
+            <a:schemeClr val="dk1"/>
+          </a:fontRef>
+        </p:style>
+        <p:txBody>
+          <a:bodyPr rtlCol="0" anchor="ctr"/>
+          <a:lstStyle/>
+          <a:p>
+            <a:pPr algn="ctr"/>
+            <a:endParaRPr lang="de-CH"/>
+          </a:p>
+        </p:txBody>
+      </p:sp>
+      <p:sp>
+        <p:nvSpPr>
+          <p:cNvPr id="20" name="Pfeil nach rechts 19"/>
+          <p:cNvSpPr/>
+          <p:nvPr/>
+        </p:nvSpPr>
+        <p:spPr>
+          <a:xfrm>
+            <a:off x="4830044" y="3705038"/>
+            <a:ext cx="504056" cy="285009"/>
+          </a:xfrm>
+          <a:prstGeom prst="rightArrow">
+            <a:avLst/>
+          </a:prstGeom>
+        </p:spPr>
+        <p:style>
+          <a:lnRef idx="1">
+            <a:schemeClr val="accent2"/>
+          </a:lnRef>
+          <a:fillRef idx="2">
+            <a:schemeClr val="accent2"/>
+          </a:fillRef>
+          <a:effectRef idx="1">
+            <a:schemeClr val="accent2"/>
+          </a:effectRef>
+          <a:fontRef idx="minor">
+            <a:schemeClr val="dk1"/>
+          </a:fontRef>
+        </p:style>
+        <p:txBody>
+          <a:bodyPr rtlCol="0" anchor="ctr"/>
+          <a:lstStyle/>
+          <a:p>
+            <a:pPr algn="ctr"/>
+            <a:endParaRPr lang="de-CH"/>
+          </a:p>
+        </p:txBody>
+      </p:sp>
+    </p:spTree>
+    <p:extLst>
+      <p:ext uri="{BB962C8B-B14F-4D97-AF65-F5344CB8AC3E}">
+        <p14:creationId xmlns:p14="http://schemas.microsoft.com/office/powerpoint/2010/main" val="1926937733"/>
+      </p:ext>
+    </p:extLst>
+  </p:cSld>
+  <p:clrMapOvr>
+    <a:masterClrMapping/>
+  </p:clrMapOvr>
+</p:sld>
+</file>
+
+<file path=ppt/slides/slide15.xml><?xml version="1.0" encoding="utf-8"?>
+<p:sld xmlns:a="http://schemas.openxmlformats.org/drawingml/2006/main" xmlns:r="http://schemas.openxmlformats.org/officeDocument/2006/relationships" xmlns:p="http://schemas.openxmlformats.org/presentationml/2006/main">
+  <p:cSld>
+    <p:spTree>
+      <p:nvGrpSpPr>
+        <p:cNvPr id="1" name=""/>
+        <p:cNvGrpSpPr/>
+        <p:nvPr/>
+      </p:nvGrpSpPr>
+      <p:grpSpPr>
+        <a:xfrm>
+          <a:off x="0" y="0"/>
+          <a:ext cx="0" cy="0"/>
+          <a:chOff x="0" y="0"/>
+          <a:chExt cx="0" cy="0"/>
+        </a:xfrm>
+      </p:grpSpPr>
       <p:sp>
         <p:nvSpPr>
           <p:cNvPr id="4" name="Titel 3"/>
@@ -7716,7 +8224,19 @@
           <a:p>
             <a:r>
               <a:rPr lang="en-US" dirty="0" smtClean="0"/>
-              <a:t>Updating from V 1.x to V 2.0:</a:t>
+              <a:t>Updating from V </a:t>
+            </a:r>
+            <a:r>
+              <a:rPr lang="en-US" dirty="0" smtClean="0"/>
+              <a:t>2.0 </a:t>
+            </a:r>
+            <a:r>
+              <a:rPr lang="en-US" dirty="0" smtClean="0"/>
+              <a:t>to V </a:t>
+            </a:r>
+            <a:r>
+              <a:rPr lang="en-US" dirty="0" smtClean="0"/>
+              <a:t>2.1:</a:t>
             </a:r>
             <a:endParaRPr lang="de-CH" dirty="0"/>
           </a:p>
@@ -7735,64 +8255,179 @@
         <p:spPr/>
         <p:txBody>
           <a:bodyPr>
-            <a:normAutofit/>
+            <a:normAutofit lnSpcReduction="10000"/>
           </a:bodyPr>
           <a:lstStyle/>
           <a:p>
             <a:r>
               <a:rPr lang="en-US" sz="2400" dirty="0" smtClean="0"/>
-              <a:t>As the action list taken from the game assets (</a:t>
-            </a:r>
-            <a:r>
-              <a:rPr lang="en-US" sz="2400" dirty="0" err="1" smtClean="0"/>
-              <a:t>GameData.pak</a:t>
-            </a:r>
-            <a:r>
-              <a:rPr lang="en-US" sz="2400" dirty="0" smtClean="0"/>
-              <a:t>)</a:t>
+              <a:t>As there seems to be issues with Win 8.1 we included a debug log facility.</a:t>
             </a:r>
             <a:br>
               <a:rPr lang="en-US" sz="2400" dirty="0" smtClean="0"/>
             </a:br>
+            <a:endParaRPr lang="en-US" sz="2400" dirty="0" smtClean="0"/>
+          </a:p>
+          <a:p>
             <a:r>
               <a:rPr lang="en-US" sz="2400" dirty="0" smtClean="0"/>
-              <a:t>You have to </a:t>
-            </a:r>
-            <a:r>
-              <a:rPr lang="en-US" sz="2400" dirty="0" smtClean="0">
-                <a:solidFill>
-                  <a:srgbClr val="FF0000"/>
-                </a:solidFill>
-              </a:rPr>
-              <a:t>manually remove the ‘defaultProfile.xml’ file if it exists in the same folder as the program file</a:t>
+              <a:t>If you encounter an error or crash then read on…</a:t>
             </a:r>
             <a:r>
               <a:rPr lang="en-US" sz="2400" dirty="0" smtClean="0"/>
-              <a:t>.</a:t>
+              <a:t/>
             </a:r>
             <a:br>
               <a:rPr lang="en-US" sz="2400" dirty="0" smtClean="0"/>
             </a:br>
+            <a:endParaRPr lang="en-US" sz="2400" dirty="0" smtClean="0"/>
+          </a:p>
+          <a:p>
             <a:r>
               <a:rPr lang="en-US" sz="2400" dirty="0" smtClean="0"/>
-              <a:t>If the program finds it there it is taken before the one from the game (which is may be not what you wanted)</a:t>
-            </a:r>
-          </a:p>
-          <a:p>
-            <a:endParaRPr lang="en-US" sz="2400" dirty="0" smtClean="0"/>
-          </a:p>
-          <a:p>
+              <a:t>You </a:t>
+            </a:r>
+            <a:r>
+              <a:rPr lang="en-US" sz="2400" dirty="0"/>
+              <a:t>will find </a:t>
+            </a:r>
             <a:r>
               <a:rPr lang="en-US" sz="2400" dirty="0" smtClean="0"/>
-              <a:t>You may however use this priority for any purpose</a:t>
+              <a:t>‘</a:t>
+            </a:r>
+            <a:r>
+              <a:rPr lang="en-US" sz="1400" dirty="0" smtClean="0">
+                <a:latin typeface="Lucida Console" panose="020B0609040504020204" pitchFamily="49" charset="0"/>
+              </a:rPr>
+              <a:t>log4net.config.OFF</a:t>
+            </a:r>
+            <a:r>
+              <a:rPr lang="en-US" sz="2400" dirty="0" smtClean="0"/>
+              <a:t>’ in the distribution zip.</a:t>
             </a:r>
             <a:br>
               <a:rPr lang="en-US" sz="2400" dirty="0" smtClean="0"/>
             </a:br>
             <a:r>
               <a:rPr lang="en-US" sz="2400" dirty="0" smtClean="0"/>
-              <a:t>i.e. place a defaultProfile.xml file in the program directory and it will be taken as action list</a:t>
-            </a:r>
+              <a:t>Rename it to </a:t>
+            </a:r>
+            <a:r>
+              <a:rPr lang="en-US" sz="2400" dirty="0">
+                <a:solidFill>
+                  <a:prstClr val="black"/>
+                </a:solidFill>
+              </a:rPr>
+              <a:t>‘</a:t>
+            </a:r>
+            <a:r>
+              <a:rPr lang="en-US" sz="1400" dirty="0" smtClean="0">
+                <a:solidFill>
+                  <a:prstClr val="black"/>
+                </a:solidFill>
+                <a:latin typeface="Lucida Console" panose="020B0609040504020204" pitchFamily="49" charset="0"/>
+              </a:rPr>
+              <a:t>log4net.config</a:t>
+            </a:r>
+            <a:r>
+              <a:rPr lang="en-US" sz="2400" dirty="0" smtClean="0">
+                <a:solidFill>
+                  <a:prstClr val="black"/>
+                </a:solidFill>
+              </a:rPr>
+              <a:t>’ and run the program.</a:t>
+            </a:r>
+            <a:br>
+              <a:rPr lang="en-US" sz="2400" dirty="0" smtClean="0">
+                <a:solidFill>
+                  <a:prstClr val="black"/>
+                </a:solidFill>
+              </a:rPr>
+            </a:br>
+            <a:r>
+              <a:rPr lang="en-US" sz="2400" dirty="0" smtClean="0">
+                <a:solidFill>
+                  <a:prstClr val="black"/>
+                </a:solidFill>
+              </a:rPr>
+              <a:t>Then look for a file named ‘</a:t>
+            </a:r>
+            <a:r>
+              <a:rPr lang="en-US" sz="1400" dirty="0" smtClean="0">
+                <a:solidFill>
+                  <a:prstClr val="black"/>
+                </a:solidFill>
+                <a:latin typeface="Lucida Console" panose="020B0609040504020204" pitchFamily="49" charset="0"/>
+              </a:rPr>
+              <a:t>trace.log</a:t>
+            </a:r>
+            <a:r>
+              <a:rPr lang="en-US" sz="2400" dirty="0" smtClean="0">
+                <a:solidFill>
+                  <a:prstClr val="black"/>
+                </a:solidFill>
+              </a:rPr>
+              <a:t>’ in the program folder and send this to </a:t>
+            </a:r>
+            <a:r>
+              <a:rPr lang="en-US" sz="2400" dirty="0" smtClean="0">
+                <a:solidFill>
+                  <a:prstClr val="black"/>
+                </a:solidFill>
+                <a:hlinkClick r:id="rId2"/>
+              </a:rPr>
+              <a:t>cassini@burri-web.org</a:t>
+            </a:r>
+            <a:r>
+              <a:rPr lang="en-US" sz="2400" dirty="0" smtClean="0">
+                <a:solidFill>
+                  <a:prstClr val="black"/>
+                </a:solidFill>
+              </a:rPr>
+              <a:t> along with a description of the problem and your system </a:t>
+            </a:r>
+            <a:br>
+              <a:rPr lang="en-US" sz="2400" dirty="0" smtClean="0">
+                <a:solidFill>
+                  <a:prstClr val="black"/>
+                </a:solidFill>
+              </a:rPr>
+            </a:br>
+            <a:r>
+              <a:rPr lang="en-US" sz="2400" dirty="0" smtClean="0">
+                <a:solidFill>
+                  <a:prstClr val="black"/>
+                </a:solidFill>
+              </a:rPr>
+              <a:t>i.e. OS, CPU, Graphics card, Joystick(s) </a:t>
+            </a:r>
+            <a:br>
+              <a:rPr lang="en-US" sz="2400" dirty="0" smtClean="0">
+                <a:solidFill>
+                  <a:prstClr val="black"/>
+                </a:solidFill>
+              </a:rPr>
+            </a:br>
+            <a:r>
+              <a:rPr lang="en-US" sz="2400" dirty="0" smtClean="0">
+                <a:solidFill>
+                  <a:prstClr val="black"/>
+                </a:solidFill>
+              </a:rPr>
+              <a:t>we may then finally solve </a:t>
+            </a:r>
+            <a:r>
+              <a:rPr lang="en-US" sz="2400" smtClean="0">
+                <a:solidFill>
+                  <a:prstClr val="black"/>
+                </a:solidFill>
+              </a:rPr>
+              <a:t>the issue …</a:t>
+            </a:r>
+            <a:endParaRPr lang="en-US" sz="2400" dirty="0" smtClean="0"/>
+          </a:p>
+          <a:p>
+            <a:endParaRPr lang="en-US" sz="2400" dirty="0" smtClean="0"/>
           </a:p>
         </p:txBody>
       </p:sp>
@@ -8144,7 +8779,7 @@
       </p:grpSpPr>
       <p:pic>
         <p:nvPicPr>
-          <p:cNvPr id="3" name="Grafik 2"/>
+          <p:cNvPr id="4" name="Grafik 3"/>
           <p:cNvPicPr>
             <a:picLocks noChangeAspect="1"/>
           </p:cNvPicPr>
@@ -8158,8 +8793,8 @@
         </p:blipFill>
         <p:spPr>
           <a:xfrm>
-            <a:off x="1403648" y="1124744"/>
-            <a:ext cx="6197377" cy="5577639"/>
+            <a:off x="1398985" y="1134421"/>
+            <a:ext cx="6202040" cy="5581836"/>
           </a:xfrm>
           <a:prstGeom prst="rect">
             <a:avLst/>
@@ -8593,17 +9228,17 @@
         </p:nvSpPr>
         <p:spPr>
           <a:xfrm>
-            <a:off x="1475656" y="5178202"/>
+            <a:off x="1503349" y="4869160"/>
             <a:ext cx="1656184" cy="360040"/>
           </a:xfrm>
           <a:prstGeom prst="borderCallout2">
             <a:avLst>
-              <a:gd name="adj1" fmla="val 38801"/>
-              <a:gd name="adj2" fmla="val 102453"/>
-              <a:gd name="adj3" fmla="val 83913"/>
-              <a:gd name="adj4" fmla="val 107558"/>
-              <a:gd name="adj5" fmla="val 82423"/>
-              <a:gd name="adj6" fmla="val 152384"/>
+              <a:gd name="adj1" fmla="val 42143"/>
+              <a:gd name="adj2" fmla="val 102816"/>
+              <a:gd name="adj3" fmla="val 175811"/>
+              <a:gd name="adj4" fmla="val 115549"/>
+              <a:gd name="adj5" fmla="val 174321"/>
+              <a:gd name="adj6" fmla="val 153837"/>
             </a:avLst>
           </a:prstGeom>
         </p:spPr>
@@ -8641,16 +9276,16 @@
         </p:nvSpPr>
         <p:spPr>
           <a:xfrm>
-            <a:off x="1475656" y="5580252"/>
+            <a:off x="1503349" y="5335365"/>
             <a:ext cx="1656184" cy="360040"/>
           </a:xfrm>
           <a:prstGeom prst="borderCallout2">
             <a:avLst>
               <a:gd name="adj1" fmla="val 38801"/>
               <a:gd name="adj2" fmla="val 102453"/>
-              <a:gd name="adj3" fmla="val 39891"/>
-              <a:gd name="adj4" fmla="val 109766"/>
-              <a:gd name="adj5" fmla="val 19777"/>
+              <a:gd name="adj3" fmla="val 83334"/>
+              <a:gd name="adj4" fmla="val 111219"/>
+              <a:gd name="adj5" fmla="val 93295"/>
               <a:gd name="adj6" fmla="val 133612"/>
             </a:avLst>
           </a:prstGeom>
@@ -8689,17 +9324,17 @@
         </p:nvSpPr>
         <p:spPr>
           <a:xfrm>
-            <a:off x="3645883" y="5876456"/>
+            <a:off x="4203232" y="5605126"/>
             <a:ext cx="1436189" cy="360040"/>
           </a:xfrm>
           <a:prstGeom prst="borderCallout2">
             <a:avLst>
               <a:gd name="adj1" fmla="val 84649"/>
               <a:gd name="adj2" fmla="val 101885"/>
-              <a:gd name="adj3" fmla="val 204706"/>
-              <a:gd name="adj4" fmla="val 112323"/>
-              <a:gd name="adj5" fmla="val 206513"/>
-              <a:gd name="adj6" fmla="val 232124"/>
+              <a:gd name="adj3" fmla="val 284908"/>
+              <a:gd name="adj4" fmla="val 71274"/>
+              <a:gd name="adj5" fmla="val 285044"/>
+              <a:gd name="adj6" fmla="val 192750"/>
             </a:avLst>
           </a:prstGeom>
         </p:spPr>
@@ -8908,6 +9543,54 @@
             <a:r>
               <a:rPr lang="en-US" sz="1100" dirty="0" smtClean="0"/>
               <a:t>V2: Resize the window</a:t>
+            </a:r>
+            <a:endParaRPr lang="de-CH" sz="800" dirty="0"/>
+          </a:p>
+        </p:txBody>
+      </p:sp>
+      <p:sp>
+        <p:nvSpPr>
+          <p:cNvPr id="23" name="Legende mit Linie 2 22"/>
+          <p:cNvSpPr/>
+          <p:nvPr/>
+        </p:nvSpPr>
+        <p:spPr>
+          <a:xfrm>
+            <a:off x="143566" y="5492548"/>
+            <a:ext cx="1359783" cy="360040"/>
+          </a:xfrm>
+          <a:prstGeom prst="borderCallout2">
+            <a:avLst>
+              <a:gd name="adj1" fmla="val 88169"/>
+              <a:gd name="adj2" fmla="val 102100"/>
+              <a:gd name="adj3" fmla="val 143663"/>
+              <a:gd name="adj4" fmla="val 139313"/>
+              <a:gd name="adj5" fmla="val 180515"/>
+              <a:gd name="adj6" fmla="val 235168"/>
+            </a:avLst>
+          </a:prstGeom>
+        </p:spPr>
+        <p:style>
+          <a:lnRef idx="2">
+            <a:schemeClr val="accent3"/>
+          </a:lnRef>
+          <a:fillRef idx="1">
+            <a:schemeClr val="lt1"/>
+          </a:fillRef>
+          <a:effectRef idx="0">
+            <a:schemeClr val="accent3"/>
+          </a:effectRef>
+          <a:fontRef idx="minor">
+            <a:schemeClr val="dk1"/>
+          </a:fontRef>
+        </p:style>
+        <p:txBody>
+          <a:bodyPr rtlCol="0" anchor="ctr"/>
+          <a:lstStyle/>
+          <a:p>
+            <a:r>
+              <a:rPr lang="en-US" sz="1100" dirty="0" smtClean="0"/>
+              <a:t>V2.1: Blend unmapped option</a:t>
             </a:r>
             <a:endParaRPr lang="de-CH" sz="800" dirty="0"/>
           </a:p>
@@ -9850,11 +10533,7 @@
           <a:p>
             <a:r>
               <a:rPr lang="en-US" sz="1200" dirty="0" smtClean="0"/>
-              <a:t>To </a:t>
-            </a:r>
-            <a:r>
-              <a:rPr lang="en-US" sz="1200" dirty="0" smtClean="0"/>
-              <a:t>clear a mapping – select it in the </a:t>
+              <a:t>To clear a mapping – select it in the </a:t>
             </a:r>
             <a:r>
               <a:rPr lang="en-US" sz="1200" dirty="0" err="1" smtClean="0"/>
@@ -9877,11 +10556,7 @@
           <a:p>
             <a:r>
               <a:rPr lang="en-US" sz="1200" dirty="0" smtClean="0"/>
-              <a:t>You </a:t>
-            </a:r>
-            <a:r>
-              <a:rPr lang="en-US" sz="1200" dirty="0" smtClean="0"/>
-              <a:t>may use “Find 1</a:t>
+              <a:t>You may use “Find 1</a:t>
             </a:r>
             <a:r>
               <a:rPr lang="en-US" sz="1200" baseline="30000" dirty="0" smtClean="0"/>
@@ -9889,11 +10564,7 @@
             </a:r>
             <a:r>
               <a:rPr lang="en-US" sz="1200" dirty="0" smtClean="0"/>
-              <a:t>” to find the first action where the currently shown Ctrl. (</a:t>
-            </a:r>
-            <a:r>
-              <a:rPr lang="en-US" sz="1200" dirty="0" smtClean="0"/>
-              <a:t>js1_z </a:t>
+              <a:t>” to find the first action where the currently shown Ctrl. (js1_z </a:t>
             </a:r>
             <a:r>
               <a:rPr lang="en-US" sz="1200" dirty="0" smtClean="0">
@@ -9907,11 +10578,7 @@
             </a:r>
             <a:r>
               <a:rPr lang="en-US" sz="1200" dirty="0" smtClean="0"/>
-              <a:t>) </a:t>
-            </a:r>
-            <a:r>
-              <a:rPr lang="en-US" sz="1200" dirty="0" smtClean="0"/>
-              <a:t>is mapped.</a:t>
+              <a:t>) is mapped.</a:t>
             </a:r>
           </a:p>
           <a:p>

</xml_diff>

<commit_message>
late fix for the new settings - need to rebuild the tree after accepting changes doc updated with new dialog screenshot
</commit_message>
<xml_diff>
--- a/doc/SCJMapper_QGuide.pptx
+++ b/doc/SCJMapper_QGuide.pptx
@@ -320,7 +320,7 @@
           <a:p>
             <a:fld id="{1BA50D42-C9CD-4801-B293-61D1F53EC57E}" type="datetimeFigureOut">
               <a:rPr lang="de-DE" smtClean="0"/>
-              <a:t>02.08.2014</a:t>
+              <a:t>03.08.2014</a:t>
             </a:fld>
             <a:endParaRPr lang="de-DE"/>
           </a:p>
@@ -485,7 +485,7 @@
           <a:p>
             <a:fld id="{1BA50D42-C9CD-4801-B293-61D1F53EC57E}" type="datetimeFigureOut">
               <a:rPr lang="de-DE" smtClean="0"/>
-              <a:t>02.08.2014</a:t>
+              <a:t>03.08.2014</a:t>
             </a:fld>
             <a:endParaRPr lang="de-DE"/>
           </a:p>
@@ -660,7 +660,7 @@
           <a:p>
             <a:fld id="{1BA50D42-C9CD-4801-B293-61D1F53EC57E}" type="datetimeFigureOut">
               <a:rPr lang="de-DE" smtClean="0"/>
-              <a:t>02.08.2014</a:t>
+              <a:t>03.08.2014</a:t>
             </a:fld>
             <a:endParaRPr lang="de-DE"/>
           </a:p>
@@ -825,7 +825,7 @@
           <a:p>
             <a:fld id="{1BA50D42-C9CD-4801-B293-61D1F53EC57E}" type="datetimeFigureOut">
               <a:rPr lang="de-DE" smtClean="0"/>
-              <a:t>02.08.2014</a:t>
+              <a:t>03.08.2014</a:t>
             </a:fld>
             <a:endParaRPr lang="de-DE"/>
           </a:p>
@@ -1066,7 +1066,7 @@
           <a:p>
             <a:fld id="{1BA50D42-C9CD-4801-B293-61D1F53EC57E}" type="datetimeFigureOut">
               <a:rPr lang="de-DE" smtClean="0"/>
-              <a:t>02.08.2014</a:t>
+              <a:t>03.08.2014</a:t>
             </a:fld>
             <a:endParaRPr lang="de-DE"/>
           </a:p>
@@ -1349,7 +1349,7 @@
           <a:p>
             <a:fld id="{1BA50D42-C9CD-4801-B293-61D1F53EC57E}" type="datetimeFigureOut">
               <a:rPr lang="de-DE" smtClean="0"/>
-              <a:t>02.08.2014</a:t>
+              <a:t>03.08.2014</a:t>
             </a:fld>
             <a:endParaRPr lang="de-DE"/>
           </a:p>
@@ -1766,7 +1766,7 @@
           <a:p>
             <a:fld id="{1BA50D42-C9CD-4801-B293-61D1F53EC57E}" type="datetimeFigureOut">
               <a:rPr lang="de-DE" smtClean="0"/>
-              <a:t>02.08.2014</a:t>
+              <a:t>03.08.2014</a:t>
             </a:fld>
             <a:endParaRPr lang="de-DE"/>
           </a:p>
@@ -1879,7 +1879,7 @@
           <a:p>
             <a:fld id="{1BA50D42-C9CD-4801-B293-61D1F53EC57E}" type="datetimeFigureOut">
               <a:rPr lang="de-DE" smtClean="0"/>
-              <a:t>02.08.2014</a:t>
+              <a:t>03.08.2014</a:t>
             </a:fld>
             <a:endParaRPr lang="de-DE"/>
           </a:p>
@@ -1969,7 +1969,7 @@
           <a:p>
             <a:fld id="{1BA50D42-C9CD-4801-B293-61D1F53EC57E}" type="datetimeFigureOut">
               <a:rPr lang="de-DE" smtClean="0"/>
-              <a:t>02.08.2014</a:t>
+              <a:t>03.08.2014</a:t>
             </a:fld>
             <a:endParaRPr lang="de-DE"/>
           </a:p>
@@ -2241,7 +2241,7 @@
           <a:p>
             <a:fld id="{1BA50D42-C9CD-4801-B293-61D1F53EC57E}" type="datetimeFigureOut">
               <a:rPr lang="de-DE" smtClean="0"/>
-              <a:t>02.08.2014</a:t>
+              <a:t>03.08.2014</a:t>
             </a:fld>
             <a:endParaRPr lang="de-DE"/>
           </a:p>
@@ -2489,7 +2489,7 @@
           <a:p>
             <a:fld id="{1BA50D42-C9CD-4801-B293-61D1F53EC57E}" type="datetimeFigureOut">
               <a:rPr lang="de-DE" smtClean="0"/>
-              <a:t>02.08.2014</a:t>
+              <a:t>03.08.2014</a:t>
             </a:fld>
             <a:endParaRPr lang="de-DE"/>
           </a:p>
@@ -2697,7 +2697,7 @@
           <a:p>
             <a:fld id="{1BA50D42-C9CD-4801-B293-61D1F53EC57E}" type="datetimeFigureOut">
               <a:rPr lang="de-DE" smtClean="0"/>
-              <a:t>02.08.2014</a:t>
+              <a:t>03.08.2014</a:t>
             </a:fld>
             <a:endParaRPr lang="de-DE"/>
           </a:p>
@@ -3117,11 +3117,7 @@
             </a:br>
             <a:r>
               <a:rPr lang="en-US" sz="4000" dirty="0" smtClean="0"/>
-              <a:t>Quick Reference Guide  V </a:t>
-            </a:r>
-            <a:r>
-              <a:rPr lang="en-US" sz="4000" dirty="0" smtClean="0"/>
-              <a:t>2.2</a:t>
+              <a:t>Quick Reference Guide  V 2.2</a:t>
             </a:r>
             <a:endParaRPr lang="en-US" sz="4000" dirty="0"/>
           </a:p>
@@ -3151,11 +3147,7 @@
           <a:p>
             <a:r>
               <a:rPr lang="en-US" sz="900" dirty="0" smtClean="0"/>
-              <a:t>20140802 </a:t>
-            </a:r>
-            <a:r>
-              <a:rPr lang="en-US" sz="900" dirty="0" smtClean="0"/>
-              <a:t>– Cassini</a:t>
+              <a:t>20140802 – Cassini</a:t>
             </a:r>
           </a:p>
           <a:p>
@@ -5528,22 +5520,26 @@
           <a:p>
             <a:r>
               <a:rPr lang="en-US" sz="1200" dirty="0" smtClean="0"/>
-              <a:t>There is also way to override the programs own detection of </a:t>
+              <a:t>There is also way to override the programs </a:t>
+            </a:r>
+            <a:r>
+              <a:rPr lang="en-US" sz="1200" smtClean="0"/>
+              <a:t>own </a:t>
+            </a:r>
+            <a:r>
+              <a:rPr lang="en-US" sz="1200" smtClean="0"/>
+              <a:t>detection</a:t>
+            </a:r>
+            <a:br>
+              <a:rPr lang="en-US" sz="1200" smtClean="0"/>
+            </a:br>
+            <a:r>
+              <a:rPr lang="en-US" sz="1200" smtClean="0"/>
+              <a:t>of the </a:t>
             </a:r>
             <a:r>
               <a:rPr lang="en-US" sz="1200" dirty="0" smtClean="0"/>
-              <a:t/>
-            </a:r>
-            <a:br>
-              <a:rPr lang="en-US" sz="1200" dirty="0" smtClean="0"/>
-            </a:br>
-            <a:r>
-              <a:rPr lang="en-US" sz="1200" dirty="0" smtClean="0"/>
-              <a:t>the Star </a:t>
-            </a:r>
-            <a:r>
-              <a:rPr lang="en-US" sz="1200" dirty="0" smtClean="0"/>
-              <a:t>Citizen install folder. </a:t>
+              <a:t>Star Citizen install folder. </a:t>
             </a:r>
           </a:p>
           <a:p>
@@ -5628,7 +5624,7 @@
       </p:cxnSp>
       <p:pic>
         <p:nvPicPr>
-          <p:cNvPr id="12" name="Grafik 11"/>
+          <p:cNvPr id="13" name="Grafik 12"/>
           <p:cNvPicPr>
             <a:picLocks noChangeAspect="1"/>
           </p:cNvPicPr>
@@ -5642,8 +5638,8 @@
         </p:blipFill>
         <p:spPr>
           <a:xfrm>
-            <a:off x="4592055" y="3689181"/>
-            <a:ext cx="4302570" cy="2035994"/>
+            <a:off x="4405016" y="3595779"/>
+            <a:ext cx="4511326" cy="2134778"/>
           </a:xfrm>
           <a:prstGeom prst="rect">
             <a:avLst/>
@@ -5801,15 +5797,7 @@
                   <a:schemeClr val="accent4"/>
                 </a:solidFill>
               </a:rPr>
-              <a:t>V2.2 </a:t>
-            </a:r>
-            <a:r>
-              <a:rPr lang="en-US" dirty="0" smtClean="0">
-                <a:solidFill>
-                  <a:schemeClr val="accent4"/>
-                </a:solidFill>
-              </a:rPr>
-              <a:t>– Features</a:t>
+              <a:t>V2.2 – Features</a:t>
             </a:r>
             <a:endParaRPr lang="en-US" dirty="0">
               <a:solidFill>
@@ -5932,11 +5920,7 @@
           <a:p>
             <a:r>
               <a:rPr lang="en-US" sz="1200" b="1" dirty="0" smtClean="0"/>
-              <a:t>New possibility to </a:t>
-            </a:r>
-            <a:r>
-              <a:rPr lang="en-US" sz="1200" b="1" dirty="0" smtClean="0"/>
-              <a:t>ignore unwanted </a:t>
+              <a:t>New possibility to ignore unwanted </a:t>
             </a:r>
             <a:r>
               <a:rPr lang="en-US" sz="1200" b="1" dirty="0" err="1" smtClean="0"/>
@@ -5950,11 +5934,7 @@
           <a:p>
             <a:r>
               <a:rPr lang="en-US" sz="1200" dirty="0" smtClean="0"/>
-              <a:t>If you wish to </a:t>
-            </a:r>
-            <a:r>
-              <a:rPr lang="en-US" sz="1200" dirty="0" smtClean="0"/>
-              <a:t>ignore some maps to unclutter the GUI</a:t>
+              <a:t>If you wish to ignore some maps to unclutter the GUI</a:t>
             </a:r>
           </a:p>
           <a:p>
@@ -5982,7 +5962,6 @@
               <a:rPr lang="en-US" sz="1200" i="1" dirty="0" smtClean="0"/>
               <a:t>, player</a:t>
             </a:r>
-            <a:endParaRPr lang="en-US" sz="1200" i="1" dirty="0" smtClean="0"/>
           </a:p>
           <a:p>
             <a:endParaRPr lang="en-US" sz="1200" dirty="0" smtClean="0"/>
@@ -5990,15 +5969,7 @@
           <a:p>
             <a:r>
               <a:rPr lang="en-US" sz="1200" dirty="0" smtClean="0"/>
-              <a:t>The </a:t>
-            </a:r>
-            <a:r>
-              <a:rPr lang="en-US" sz="1200" dirty="0" smtClean="0"/>
-              <a:t>program will </a:t>
-            </a:r>
-            <a:r>
-              <a:rPr lang="en-US" sz="1200" dirty="0" smtClean="0"/>
-              <a:t>ignore all </a:t>
+              <a:t>The program will ignore all </a:t>
             </a:r>
             <a:r>
               <a:rPr lang="en-US" sz="1200" dirty="0" err="1" smtClean="0"/>
@@ -6006,17 +5977,12 @@
             </a:r>
             <a:r>
               <a:rPr lang="en-US" sz="1200" dirty="0" smtClean="0"/>
-              <a:t> </a:t>
-            </a:r>
-            <a:r>
-              <a:rPr lang="en-US" sz="1200" dirty="0" smtClean="0"/>
-              <a:t>that are </a:t>
+              <a:t> that are </a:t>
             </a:r>
             <a:r>
               <a:rPr lang="en-US" sz="1200" b="1" dirty="0" smtClean="0"/>
               <a:t>checked</a:t>
             </a:r>
-            <a:endParaRPr lang="en-US" sz="1200" b="1" dirty="0" smtClean="0"/>
           </a:p>
           <a:p>
             <a:r>
@@ -6070,7 +6036,7 @@
       </p:sp>
       <p:pic>
         <p:nvPicPr>
-          <p:cNvPr id="3" name="Grafik 2"/>
+          <p:cNvPr id="4" name="Grafik 3"/>
           <p:cNvPicPr>
             <a:picLocks noChangeAspect="1"/>
           </p:cNvPicPr>
@@ -6084,8 +6050,8 @@
         </p:blipFill>
         <p:spPr>
           <a:xfrm>
-            <a:off x="4067944" y="3558886"/>
-            <a:ext cx="4536753" cy="2146810"/>
+            <a:off x="4088988" y="3558886"/>
+            <a:ext cx="4511326" cy="2134778"/>
           </a:xfrm>
           <a:prstGeom prst="rect">
             <a:avLst/>
@@ -8937,19 +8903,7 @@
           <a:p>
             <a:r>
               <a:rPr lang="en-US" dirty="0" smtClean="0"/>
-              <a:t>Updating from V </a:t>
-            </a:r>
-            <a:r>
-              <a:rPr lang="en-US" dirty="0" smtClean="0"/>
-              <a:t>2.1 </a:t>
-            </a:r>
-            <a:r>
-              <a:rPr lang="en-US" dirty="0" smtClean="0"/>
-              <a:t>to V </a:t>
-            </a:r>
-            <a:r>
-              <a:rPr lang="en-US" dirty="0" smtClean="0"/>
-              <a:t>2.2:</a:t>
+              <a:t>Updating from V 2.1 to V 2.2:</a:t>
             </a:r>
             <a:endParaRPr lang="de-CH" dirty="0"/>
           </a:p>
@@ -8974,11 +8928,7 @@
           <a:p>
             <a:r>
               <a:rPr lang="en-US" sz="2400" dirty="0" smtClean="0"/>
-              <a:t>No specifi</a:t>
-            </a:r>
-            <a:r>
-              <a:rPr lang="en-US" sz="2400" dirty="0" smtClean="0"/>
-              <a:t>c things to do</a:t>
+              <a:t>No specific things to do</a:t>
             </a:r>
           </a:p>
           <a:p>

</xml_diff>

<commit_message>
- new feature #16 - allow reassignment of the jsN group - improvement - uniquely identified devices with the same name (use GUID) - improvement - shows jsN assignment in Joystick tab - improvement - detection of the SC install path extended to one more Registry entry - fix - blend unmapped works properly now - fix #16 - manual entry of SC directory works now - update doc
</commit_message>
<xml_diff>
--- a/doc/SCJMapper_QGuide.pptx
+++ b/doc/SCJMapper_QGuide.pptx
@@ -21,7 +21,8 @@
     <p:sldId id="268" r:id="rId15"/>
     <p:sldId id="272" r:id="rId16"/>
     <p:sldId id="271" r:id="rId17"/>
-    <p:sldId id="266" r:id="rId18"/>
+    <p:sldId id="274" r:id="rId18"/>
+    <p:sldId id="266" r:id="rId19"/>
   </p:sldIdLst>
   <p:sldSz cx="9144000" cy="6858000" type="screen4x3"/>
   <p:notesSz cx="6858000" cy="9144000"/>
@@ -320,7 +321,7 @@
           <a:p>
             <a:fld id="{1BA50D42-C9CD-4801-B293-61D1F53EC57E}" type="datetimeFigureOut">
               <a:rPr lang="de-DE" smtClean="0"/>
-              <a:t>03.08.2014</a:t>
+              <a:t>31.08.2014</a:t>
             </a:fld>
             <a:endParaRPr lang="de-DE"/>
           </a:p>
@@ -485,7 +486,7 @@
           <a:p>
             <a:fld id="{1BA50D42-C9CD-4801-B293-61D1F53EC57E}" type="datetimeFigureOut">
               <a:rPr lang="de-DE" smtClean="0"/>
-              <a:t>03.08.2014</a:t>
+              <a:t>31.08.2014</a:t>
             </a:fld>
             <a:endParaRPr lang="de-DE"/>
           </a:p>
@@ -660,7 +661,7 @@
           <a:p>
             <a:fld id="{1BA50D42-C9CD-4801-B293-61D1F53EC57E}" type="datetimeFigureOut">
               <a:rPr lang="de-DE" smtClean="0"/>
-              <a:t>03.08.2014</a:t>
+              <a:t>31.08.2014</a:t>
             </a:fld>
             <a:endParaRPr lang="de-DE"/>
           </a:p>
@@ -825,7 +826,7 @@
           <a:p>
             <a:fld id="{1BA50D42-C9CD-4801-B293-61D1F53EC57E}" type="datetimeFigureOut">
               <a:rPr lang="de-DE" smtClean="0"/>
-              <a:t>03.08.2014</a:t>
+              <a:t>31.08.2014</a:t>
             </a:fld>
             <a:endParaRPr lang="de-DE"/>
           </a:p>
@@ -1066,7 +1067,7 @@
           <a:p>
             <a:fld id="{1BA50D42-C9CD-4801-B293-61D1F53EC57E}" type="datetimeFigureOut">
               <a:rPr lang="de-DE" smtClean="0"/>
-              <a:t>03.08.2014</a:t>
+              <a:t>31.08.2014</a:t>
             </a:fld>
             <a:endParaRPr lang="de-DE"/>
           </a:p>
@@ -1349,7 +1350,7 @@
           <a:p>
             <a:fld id="{1BA50D42-C9CD-4801-B293-61D1F53EC57E}" type="datetimeFigureOut">
               <a:rPr lang="de-DE" smtClean="0"/>
-              <a:t>03.08.2014</a:t>
+              <a:t>31.08.2014</a:t>
             </a:fld>
             <a:endParaRPr lang="de-DE"/>
           </a:p>
@@ -1766,7 +1767,7 @@
           <a:p>
             <a:fld id="{1BA50D42-C9CD-4801-B293-61D1F53EC57E}" type="datetimeFigureOut">
               <a:rPr lang="de-DE" smtClean="0"/>
-              <a:t>03.08.2014</a:t>
+              <a:t>31.08.2014</a:t>
             </a:fld>
             <a:endParaRPr lang="de-DE"/>
           </a:p>
@@ -1879,7 +1880,7 @@
           <a:p>
             <a:fld id="{1BA50D42-C9CD-4801-B293-61D1F53EC57E}" type="datetimeFigureOut">
               <a:rPr lang="de-DE" smtClean="0"/>
-              <a:t>03.08.2014</a:t>
+              <a:t>31.08.2014</a:t>
             </a:fld>
             <a:endParaRPr lang="de-DE"/>
           </a:p>
@@ -1969,7 +1970,7 @@
           <a:p>
             <a:fld id="{1BA50D42-C9CD-4801-B293-61D1F53EC57E}" type="datetimeFigureOut">
               <a:rPr lang="de-DE" smtClean="0"/>
-              <a:t>03.08.2014</a:t>
+              <a:t>31.08.2014</a:t>
             </a:fld>
             <a:endParaRPr lang="de-DE"/>
           </a:p>
@@ -2241,7 +2242,7 @@
           <a:p>
             <a:fld id="{1BA50D42-C9CD-4801-B293-61D1F53EC57E}" type="datetimeFigureOut">
               <a:rPr lang="de-DE" smtClean="0"/>
-              <a:t>03.08.2014</a:t>
+              <a:t>31.08.2014</a:t>
             </a:fld>
             <a:endParaRPr lang="de-DE"/>
           </a:p>
@@ -2489,7 +2490,7 @@
           <a:p>
             <a:fld id="{1BA50D42-C9CD-4801-B293-61D1F53EC57E}" type="datetimeFigureOut">
               <a:rPr lang="de-DE" smtClean="0"/>
-              <a:t>03.08.2014</a:t>
+              <a:t>31.08.2014</a:t>
             </a:fld>
             <a:endParaRPr lang="de-DE"/>
           </a:p>
@@ -2697,7 +2698,7 @@
           <a:p>
             <a:fld id="{1BA50D42-C9CD-4801-B293-61D1F53EC57E}" type="datetimeFigureOut">
               <a:rPr lang="de-DE" smtClean="0"/>
-              <a:t>03.08.2014</a:t>
+              <a:t>31.08.2014</a:t>
             </a:fld>
             <a:endParaRPr lang="de-DE"/>
           </a:p>
@@ -3069,7 +3070,7 @@
       </p:grpSpPr>
       <p:pic>
         <p:nvPicPr>
-          <p:cNvPr id="4" name="Grafik 3"/>
+          <p:cNvPr id="6" name="Grafik 5"/>
           <p:cNvPicPr>
             <a:picLocks noChangeAspect="1"/>
           </p:cNvPicPr>
@@ -3083,8 +3084,8 @@
         </p:blipFill>
         <p:spPr>
           <a:xfrm>
-            <a:off x="5818772" y="3774638"/>
-            <a:ext cx="3204865" cy="2897198"/>
+            <a:off x="5800926" y="3774638"/>
+            <a:ext cx="3219109" cy="2897198"/>
           </a:xfrm>
           <a:prstGeom prst="rect">
             <a:avLst/>
@@ -3117,7 +3118,11 @@
             </a:br>
             <a:r>
               <a:rPr lang="en-US" sz="4000" dirty="0" smtClean="0"/>
-              <a:t>Quick Reference Guide  V 2.2</a:t>
+              <a:t>Quick Reference Guide  V </a:t>
+            </a:r>
+            <a:r>
+              <a:rPr lang="en-US" sz="4000" dirty="0" smtClean="0"/>
+              <a:t>2.3</a:t>
             </a:r>
             <a:endParaRPr lang="en-US" sz="4000" dirty="0"/>
           </a:p>
@@ -3147,7 +3152,11 @@
           <a:p>
             <a:r>
               <a:rPr lang="en-US" sz="900" dirty="0" smtClean="0"/>
-              <a:t>20140802 – Cassini</a:t>
+              <a:t>20140831 </a:t>
+            </a:r>
+            <a:r>
+              <a:rPr lang="en-US" sz="900" dirty="0" smtClean="0"/>
+              <a:t>– Cassini</a:t>
             </a:r>
           </a:p>
           <a:p>
@@ -3274,7 +3283,7 @@
       </p:grpSpPr>
       <p:pic>
         <p:nvPicPr>
-          <p:cNvPr id="4" name="Grafik 3"/>
+          <p:cNvPr id="3" name="Grafik 2"/>
           <p:cNvPicPr>
             <a:picLocks noChangeAspect="1"/>
           </p:cNvPicPr>
@@ -3288,8 +3297,8 @@
         </p:blipFill>
         <p:spPr>
           <a:xfrm>
-            <a:off x="1592357" y="1107206"/>
-            <a:ext cx="6192688" cy="5573419"/>
+            <a:off x="1580563" y="1107206"/>
+            <a:ext cx="6197377" cy="5577639"/>
           </a:xfrm>
           <a:prstGeom prst="rect">
             <a:avLst/>
@@ -3328,7 +3337,7 @@
         <p:spPr>
           <a:xfrm flipV="1">
             <a:off x="5321144" y="1724144"/>
-            <a:ext cx="2467677" cy="4226304"/>
+            <a:ext cx="2467677" cy="4153128"/>
           </a:xfrm>
           <a:prstGeom prst="rect">
             <a:avLst/>
@@ -3368,7 +3377,7 @@
         <p:spPr>
           <a:xfrm>
             <a:off x="410281" y="1268760"/>
-            <a:ext cx="4895422" cy="3888432"/>
+            <a:ext cx="4895422" cy="3744416"/>
           </a:xfrm>
           <a:prstGeom prst="rect">
             <a:avLst/>
@@ -3426,7 +3435,7 @@
         </p:nvSpPr>
         <p:spPr>
           <a:xfrm flipV="1">
-            <a:off x="3419872" y="5281108"/>
+            <a:off x="3414286" y="5022061"/>
             <a:ext cx="997998" cy="305338"/>
           </a:xfrm>
           <a:prstGeom prst="rect">
@@ -3554,7 +3563,7 @@
       </p:grpSpPr>
       <p:pic>
         <p:nvPicPr>
-          <p:cNvPr id="3" name="Grafik 2"/>
+          <p:cNvPr id="4" name="Grafik 3"/>
           <p:cNvPicPr>
             <a:picLocks noChangeAspect="1"/>
           </p:cNvPicPr>
@@ -3568,7 +3577,7 @@
         </p:blipFill>
         <p:spPr>
           <a:xfrm>
-            <a:off x="1403648" y="1124743"/>
+            <a:off x="1403612" y="1124743"/>
             <a:ext cx="6197376" cy="5577639"/>
           </a:xfrm>
           <a:prstGeom prst="rect">
@@ -3755,7 +3764,7 @@
         </p:nvSpPr>
         <p:spPr>
           <a:xfrm flipV="1">
-            <a:off x="3275856" y="5517231"/>
+            <a:off x="3275856" y="5253264"/>
             <a:ext cx="1050403" cy="432048"/>
           </a:xfrm>
           <a:prstGeom prst="rect">
@@ -3825,7 +3834,7 @@
       </p:grpSpPr>
       <p:pic>
         <p:nvPicPr>
-          <p:cNvPr id="3" name="Grafik 2"/>
+          <p:cNvPr id="8" name="Grafik 7"/>
           <p:cNvPicPr>
             <a:picLocks noChangeAspect="1"/>
           </p:cNvPicPr>
@@ -3839,7 +3848,7 @@
         </p:blipFill>
         <p:spPr>
           <a:xfrm>
-            <a:off x="1403648" y="1124743"/>
+            <a:off x="1403648" y="1105855"/>
             <a:ext cx="6197376" cy="5577639"/>
           </a:xfrm>
           <a:prstGeom prst="rect">
@@ -4195,7 +4204,7 @@
       </p:grpSpPr>
       <p:pic>
         <p:nvPicPr>
-          <p:cNvPr id="3" name="Grafik 2"/>
+          <p:cNvPr id="12" name="Grafik 11"/>
           <p:cNvPicPr>
             <a:picLocks noChangeAspect="1"/>
           </p:cNvPicPr>
@@ -4209,7 +4218,7 @@
         </p:blipFill>
         <p:spPr>
           <a:xfrm>
-            <a:off x="1403648" y="1124743"/>
+            <a:off x="1403612" y="1124743"/>
             <a:ext cx="6197376" cy="5577639"/>
           </a:xfrm>
           <a:prstGeom prst="rect">
@@ -4697,7 +4706,7 @@
       </p:grpSpPr>
       <p:pic>
         <p:nvPicPr>
-          <p:cNvPr id="3" name="Grafik 2"/>
+          <p:cNvPr id="12" name="Grafik 11"/>
           <p:cNvPicPr>
             <a:picLocks noChangeAspect="1"/>
           </p:cNvPicPr>
@@ -4711,7 +4720,7 @@
         </p:blipFill>
         <p:spPr>
           <a:xfrm>
-            <a:off x="1403648" y="1124743"/>
+            <a:off x="1403612" y="1124743"/>
             <a:ext cx="6197376" cy="5577639"/>
           </a:xfrm>
           <a:prstGeom prst="rect">
@@ -5266,7 +5275,7 @@
       </p:grpSpPr>
       <p:pic>
         <p:nvPicPr>
-          <p:cNvPr id="7" name="Grafik 6"/>
+          <p:cNvPr id="3" name="Grafik 2"/>
           <p:cNvPicPr>
             <a:picLocks noChangeAspect="1"/>
           </p:cNvPicPr>
@@ -5280,8 +5289,8 @@
         </p:blipFill>
         <p:spPr>
           <a:xfrm>
-            <a:off x="1406191" y="1124743"/>
-            <a:ext cx="6194833" cy="5575350"/>
+            <a:off x="1403611" y="1124742"/>
+            <a:ext cx="6197378" cy="5577640"/>
           </a:xfrm>
           <a:prstGeom prst="rect">
             <a:avLst/>
@@ -5321,48 +5330,14 @@
       </p:sp>
       <p:sp>
         <p:nvSpPr>
-          <p:cNvPr id="14" name="Textfeld 13"/>
-          <p:cNvSpPr txBox="1"/>
-          <p:nvPr/>
-        </p:nvSpPr>
-        <p:spPr>
-          <a:xfrm>
-            <a:off x="4217976" y="1394912"/>
-            <a:ext cx="864096" cy="161583"/>
-          </a:xfrm>
-          <a:prstGeom prst="rect">
-            <a:avLst/>
-          </a:prstGeom>
-          <a:solidFill>
-            <a:schemeClr val="bg1">
-              <a:lumMod val="95000"/>
-            </a:schemeClr>
-          </a:solidFill>
-        </p:spPr>
-        <p:txBody>
-          <a:bodyPr wrap="square" lIns="0" tIns="0" rIns="0" bIns="0" rtlCol="0">
-            <a:spAutoFit/>
-          </a:bodyPr>
-          <a:lstStyle/>
-          <a:p>
-            <a:r>
-              <a:rPr lang="en-US" sz="1050" b="1" dirty="0" smtClean="0"/>
-              <a:t>2.0</a:t>
-            </a:r>
-            <a:endParaRPr lang="de-CH" sz="1050" b="1" dirty="0"/>
-          </a:p>
-        </p:txBody>
-      </p:sp>
-      <p:sp>
-        <p:nvSpPr>
           <p:cNvPr id="17" name="Rechteck 16"/>
           <p:cNvSpPr/>
           <p:nvPr/>
         </p:nvSpPr>
         <p:spPr>
           <a:xfrm flipV="1">
-            <a:off x="3275857" y="5988330"/>
-            <a:ext cx="942120" cy="500871"/>
+            <a:off x="3275857" y="6163791"/>
+            <a:ext cx="942120" cy="262916"/>
           </a:xfrm>
           <a:prstGeom prst="rect">
             <a:avLst/>
@@ -5401,7 +5376,7 @@
         </p:nvSpPr>
         <p:spPr>
           <a:xfrm>
-            <a:off x="611560" y="1340768"/>
+            <a:off x="611560" y="1124744"/>
             <a:ext cx="8352928" cy="4451857"/>
           </a:xfrm>
           <a:prstGeom prst="rect">
@@ -5520,26 +5495,14 @@
           <a:p>
             <a:r>
               <a:rPr lang="en-US" sz="1200" dirty="0" smtClean="0"/>
-              <a:t>There is also way to override the programs </a:t>
-            </a:r>
-            <a:r>
-              <a:rPr lang="en-US" sz="1200" smtClean="0"/>
-              <a:t>own </a:t>
-            </a:r>
-            <a:r>
-              <a:rPr lang="en-US" sz="1200" smtClean="0"/>
-              <a:t>detection</a:t>
+              <a:t>There is also way to override the programs own detection</a:t>
             </a:r>
             <a:br>
-              <a:rPr lang="en-US" sz="1200" smtClean="0"/>
+              <a:rPr lang="en-US" sz="1200" dirty="0" smtClean="0"/>
             </a:br>
             <a:r>
-              <a:rPr lang="en-US" sz="1200" smtClean="0"/>
-              <a:t>of the </a:t>
-            </a:r>
-            <a:r>
               <a:rPr lang="en-US" sz="1200" dirty="0" smtClean="0"/>
-              <a:t>Star Citizen install folder. </a:t>
+              <a:t>of the Star Citizen install folder. </a:t>
             </a:r>
           </a:p>
           <a:p>
@@ -5597,8 +5560,8 @@
         </p:nvCxnSpPr>
         <p:spPr>
           <a:xfrm flipH="1">
-            <a:off x="2843808" y="6021288"/>
-            <a:ext cx="432049" cy="0"/>
+            <a:off x="2843809" y="5733256"/>
+            <a:ext cx="432048" cy="216024"/>
           </a:xfrm>
           <a:prstGeom prst="straightConnector1">
             <a:avLst/>
@@ -5638,7 +5601,7 @@
         </p:blipFill>
         <p:spPr>
           <a:xfrm>
-            <a:off x="4405016" y="3595779"/>
+            <a:off x="4405016" y="3379755"/>
             <a:ext cx="4511326" cy="2134778"/>
           </a:xfrm>
           <a:prstGeom prst="rect">
@@ -5654,7 +5617,7 @@
         </p:nvSpPr>
         <p:spPr>
           <a:xfrm>
-            <a:off x="4217976" y="3904908"/>
+            <a:off x="4217976" y="3688884"/>
             <a:ext cx="504056" cy="285009"/>
           </a:xfrm>
           <a:prstGeom prst="rightArrow">
@@ -5692,7 +5655,7 @@
         </p:nvSpPr>
         <p:spPr>
           <a:xfrm>
-            <a:off x="4152988" y="5157192"/>
+            <a:off x="4152988" y="4941168"/>
             <a:ext cx="504056" cy="285009"/>
           </a:xfrm>
           <a:prstGeom prst="rightArrow">
@@ -5708,6 +5671,46 @@
           </a:fillRef>
           <a:effectRef idx="1">
             <a:schemeClr val="accent2"/>
+          </a:effectRef>
+          <a:fontRef idx="minor">
+            <a:schemeClr val="dk1"/>
+          </a:fontRef>
+        </p:style>
+        <p:txBody>
+          <a:bodyPr rtlCol="0" anchor="ctr"/>
+          <a:lstStyle/>
+          <a:p>
+            <a:pPr algn="ctr"/>
+            <a:endParaRPr lang="de-CH"/>
+          </a:p>
+        </p:txBody>
+      </p:sp>
+      <p:sp>
+        <p:nvSpPr>
+          <p:cNvPr id="15" name="Rechteck 14"/>
+          <p:cNvSpPr/>
+          <p:nvPr/>
+        </p:nvSpPr>
+        <p:spPr>
+          <a:xfrm flipV="1">
+            <a:off x="3275857" y="5622814"/>
+            <a:ext cx="942120" cy="262916"/>
+          </a:xfrm>
+          <a:prstGeom prst="rect">
+            <a:avLst/>
+          </a:prstGeom>
+          <a:noFill/>
+          <a:ln w="57150"/>
+        </p:spPr>
+        <p:style>
+          <a:lnRef idx="2">
+            <a:schemeClr val="accent3"/>
+          </a:lnRef>
+          <a:fillRef idx="1">
+            <a:schemeClr val="lt1"/>
+          </a:fillRef>
+          <a:effectRef idx="0">
+            <a:schemeClr val="accent3"/>
           </a:effectRef>
           <a:fontRef idx="minor">
             <a:schemeClr val="dk1"/>
@@ -5754,7 +5757,7 @@
       </p:grpSpPr>
       <p:pic>
         <p:nvPicPr>
-          <p:cNvPr id="7" name="Grafik 6"/>
+          <p:cNvPr id="10" name="Grafik 9"/>
           <p:cNvPicPr>
             <a:picLocks noChangeAspect="1"/>
           </p:cNvPicPr>
@@ -5768,8 +5771,8 @@
         </p:blipFill>
         <p:spPr>
           <a:xfrm>
-            <a:off x="1406191" y="1124743"/>
-            <a:ext cx="6194833" cy="5575350"/>
+            <a:off x="1403611" y="1124742"/>
+            <a:ext cx="6197378" cy="5577640"/>
           </a:xfrm>
           <a:prstGeom prst="rect">
             <a:avLst/>
@@ -6170,6 +6173,486 @@
           <a:chExt cx="0" cy="0"/>
         </a:xfrm>
       </p:grpSpPr>
+      <p:pic>
+        <p:nvPicPr>
+          <p:cNvPr id="10" name="Grafik 9"/>
+          <p:cNvPicPr>
+            <a:picLocks noChangeAspect="1"/>
+          </p:cNvPicPr>
+          <p:nvPr/>
+        </p:nvPicPr>
+        <p:blipFill>
+          <a:blip r:embed="rId2"/>
+          <a:stretch>
+            <a:fillRect/>
+          </a:stretch>
+        </p:blipFill>
+        <p:spPr>
+          <a:xfrm>
+            <a:off x="1403611" y="1124742"/>
+            <a:ext cx="6197378" cy="5577640"/>
+          </a:xfrm>
+          <a:prstGeom prst="rect">
+            <a:avLst/>
+          </a:prstGeom>
+        </p:spPr>
+      </p:pic>
+      <p:sp>
+        <p:nvSpPr>
+          <p:cNvPr id="2" name="Titel 1"/>
+          <p:cNvSpPr>
+            <a:spLocks noGrp="1"/>
+          </p:cNvSpPr>
+          <p:nvPr>
+            <p:ph type="title"/>
+          </p:nvPr>
+        </p:nvSpPr>
+        <p:spPr/>
+        <p:txBody>
+          <a:bodyPr/>
+          <a:lstStyle/>
+          <a:p>
+            <a:r>
+              <a:rPr lang="en-US" dirty="0" smtClean="0">
+                <a:solidFill>
+                  <a:srgbClr val="00B050"/>
+                </a:solidFill>
+              </a:rPr>
+              <a:t>V2.3 </a:t>
+            </a:r>
+            <a:r>
+              <a:rPr lang="en-US" dirty="0" smtClean="0">
+                <a:solidFill>
+                  <a:srgbClr val="00B050"/>
+                </a:solidFill>
+              </a:rPr>
+              <a:t>– Features</a:t>
+            </a:r>
+            <a:endParaRPr lang="en-US" dirty="0">
+              <a:solidFill>
+                <a:srgbClr val="00B050"/>
+              </a:solidFill>
+            </a:endParaRPr>
+          </a:p>
+        </p:txBody>
+      </p:sp>
+      <p:sp>
+        <p:nvSpPr>
+          <p:cNvPr id="14" name="Textfeld 13"/>
+          <p:cNvSpPr txBox="1"/>
+          <p:nvPr/>
+        </p:nvSpPr>
+        <p:spPr>
+          <a:xfrm>
+            <a:off x="4217976" y="1394912"/>
+            <a:ext cx="864096" cy="161583"/>
+          </a:xfrm>
+          <a:prstGeom prst="rect">
+            <a:avLst/>
+          </a:prstGeom>
+          <a:solidFill>
+            <a:schemeClr val="bg1">
+              <a:lumMod val="95000"/>
+            </a:schemeClr>
+          </a:solidFill>
+        </p:spPr>
+        <p:txBody>
+          <a:bodyPr wrap="square" lIns="0" tIns="0" rIns="0" bIns="0" rtlCol="0">
+            <a:spAutoFit/>
+          </a:bodyPr>
+          <a:lstStyle/>
+          <a:p>
+            <a:r>
+              <a:rPr lang="en-US" sz="1050" b="1" dirty="0" smtClean="0"/>
+              <a:t>2.0</a:t>
+            </a:r>
+            <a:endParaRPr lang="de-CH" sz="1050" b="1" dirty="0"/>
+          </a:p>
+        </p:txBody>
+      </p:sp>
+      <p:sp>
+        <p:nvSpPr>
+          <p:cNvPr id="17" name="Rechteck 16"/>
+          <p:cNvSpPr/>
+          <p:nvPr/>
+        </p:nvSpPr>
+        <p:spPr>
+          <a:xfrm flipV="1">
+            <a:off x="3275856" y="5969287"/>
+            <a:ext cx="942120" cy="289545"/>
+          </a:xfrm>
+          <a:prstGeom prst="rect">
+            <a:avLst/>
+          </a:prstGeom>
+          <a:noFill/>
+          <a:ln w="57150">
+            <a:solidFill>
+              <a:srgbClr val="00B050"/>
+            </a:solidFill>
+          </a:ln>
+        </p:spPr>
+        <p:style>
+          <a:lnRef idx="2">
+            <a:schemeClr val="accent3"/>
+          </a:lnRef>
+          <a:fillRef idx="1">
+            <a:schemeClr val="lt1"/>
+          </a:fillRef>
+          <a:effectRef idx="0">
+            <a:schemeClr val="accent3"/>
+          </a:effectRef>
+          <a:fontRef idx="minor">
+            <a:schemeClr val="dk1"/>
+          </a:fontRef>
+        </p:style>
+        <p:txBody>
+          <a:bodyPr rtlCol="0" anchor="ctr"/>
+          <a:lstStyle/>
+          <a:p>
+            <a:pPr algn="ctr"/>
+            <a:endParaRPr lang="de-CH"/>
+          </a:p>
+        </p:txBody>
+      </p:sp>
+      <p:sp>
+        <p:nvSpPr>
+          <p:cNvPr id="18" name="Rechteck 17"/>
+          <p:cNvSpPr/>
+          <p:nvPr/>
+        </p:nvSpPr>
+        <p:spPr>
+          <a:xfrm>
+            <a:off x="611560" y="1340768"/>
+            <a:ext cx="8075240" cy="4451857"/>
+          </a:xfrm>
+          <a:prstGeom prst="rect">
+            <a:avLst/>
+          </a:prstGeom>
+        </p:spPr>
+        <p:style>
+          <a:lnRef idx="2">
+            <a:schemeClr val="accent5"/>
+          </a:lnRef>
+          <a:fillRef idx="1">
+            <a:schemeClr val="lt1"/>
+          </a:fillRef>
+          <a:effectRef idx="0">
+            <a:schemeClr val="accent5"/>
+          </a:effectRef>
+          <a:fontRef idx="minor">
+            <a:schemeClr val="dk1"/>
+          </a:fontRef>
+        </p:style>
+        <p:txBody>
+          <a:bodyPr rtlCol="0" anchor="t" anchorCtr="0"/>
+          <a:lstStyle/>
+          <a:p>
+            <a:r>
+              <a:rPr lang="en-US" sz="1200" b="1" dirty="0" smtClean="0"/>
+              <a:t>New possibility </a:t>
+            </a:r>
+            <a:r>
+              <a:rPr lang="en-US" sz="1200" b="1" dirty="0" smtClean="0"/>
+              <a:t>to (re) assign the joystick devices to the wanted </a:t>
+            </a:r>
+            <a:r>
+              <a:rPr lang="en-US" sz="1200" b="1" dirty="0" err="1" smtClean="0"/>
+              <a:t>js</a:t>
+            </a:r>
+            <a:r>
+              <a:rPr lang="en-US" sz="1200" b="1" dirty="0" smtClean="0"/>
+              <a:t> - number</a:t>
+            </a:r>
+            <a:endParaRPr lang="en-US" sz="1200" b="1" dirty="0" smtClean="0"/>
+          </a:p>
+          <a:p>
+            <a:endParaRPr lang="en-US" sz="1200" dirty="0"/>
+          </a:p>
+          <a:p>
+            <a:r>
+              <a:rPr lang="en-US" sz="1200" dirty="0" smtClean="0"/>
+              <a:t>Go here i</a:t>
+            </a:r>
+            <a:r>
+              <a:rPr lang="en-US" sz="1200" dirty="0" smtClean="0"/>
+              <a:t>f </a:t>
+            </a:r>
+            <a:r>
+              <a:rPr lang="en-US" sz="1200" dirty="0" smtClean="0"/>
+              <a:t>you wish to </a:t>
+            </a:r>
+            <a:r>
+              <a:rPr lang="en-US" sz="1200" dirty="0" smtClean="0"/>
+              <a:t>assign a device to a particular </a:t>
+            </a:r>
+            <a:r>
+              <a:rPr lang="en-US" sz="1200" dirty="0" err="1" smtClean="0"/>
+              <a:t>js</a:t>
+            </a:r>
+            <a:r>
+              <a:rPr lang="en-US" sz="1200" dirty="0" smtClean="0"/>
+              <a:t> – number or to re-assign the devices to other numbers.</a:t>
+            </a:r>
+            <a:endParaRPr lang="en-US" sz="1200" dirty="0" smtClean="0"/>
+          </a:p>
+          <a:p>
+            <a:r>
+              <a:rPr lang="en-US" sz="1200" dirty="0" smtClean="0"/>
+              <a:t>Per default the devices found are assigned along the sequence 1..8 but SC may remap them so here is the place to fix this without having to go through all commands and reassign them.</a:t>
+            </a:r>
+          </a:p>
+          <a:p>
+            <a:endParaRPr lang="en-US" sz="1200" dirty="0"/>
+          </a:p>
+          <a:p>
+            <a:r>
+              <a:rPr lang="en-US" sz="1200" dirty="0" smtClean="0">
+                <a:solidFill>
+                  <a:srgbClr val="FF0000"/>
+                </a:solidFill>
+              </a:rPr>
+              <a:t>Notes: The color of the assigned items will not change as it is still the same device but js1 will become js2 for example. </a:t>
+            </a:r>
+          </a:p>
+          <a:p>
+            <a:r>
+              <a:rPr lang="en-US" sz="1200" dirty="0" smtClean="0">
+                <a:solidFill>
+                  <a:srgbClr val="FF0000"/>
+                </a:solidFill>
+              </a:rPr>
+              <a:t>You can leave this dialog with “Accept” only if each device is either assigned to a unique number or to </a:t>
+            </a:r>
+            <a:r>
+              <a:rPr lang="en-US" sz="1200" dirty="0" err="1" smtClean="0">
+                <a:solidFill>
+                  <a:srgbClr val="FF0000"/>
+                </a:solidFill>
+              </a:rPr>
+              <a:t>n.a</a:t>
+            </a:r>
+            <a:r>
+              <a:rPr lang="en-US" sz="1200" dirty="0" smtClean="0">
+                <a:solidFill>
+                  <a:srgbClr val="FF0000"/>
+                </a:solidFill>
+              </a:rPr>
+              <a:t>. (not assigned)</a:t>
+            </a:r>
+            <a:r>
+              <a:rPr lang="en-US" sz="1200" dirty="0">
+                <a:solidFill>
+                  <a:srgbClr val="FF0000"/>
+                </a:solidFill>
+              </a:rPr>
+              <a:t> </a:t>
+            </a:r>
+            <a:r>
+              <a:rPr lang="en-US" sz="1200" dirty="0" smtClean="0">
+                <a:solidFill>
+                  <a:srgbClr val="FF0000"/>
+                </a:solidFill>
+              </a:rPr>
+              <a:t>otherwise an error pops to ask you to fix it or Cancel.</a:t>
+            </a:r>
+            <a:r>
+              <a:rPr lang="en-US" sz="1200" dirty="0"/>
+              <a:t> </a:t>
+            </a:r>
+            <a:endParaRPr lang="en-US" sz="1200" dirty="0" smtClean="0"/>
+          </a:p>
+          <a:p>
+            <a:endParaRPr lang="en-US" sz="1200" dirty="0" smtClean="0"/>
+          </a:p>
+          <a:p>
+            <a:endParaRPr lang="en-US" sz="1200" dirty="0"/>
+          </a:p>
+          <a:p>
+            <a:r>
+              <a:rPr lang="en-US" sz="1200" dirty="0" smtClean="0"/>
+              <a:t>Related SC console commands are:</a:t>
+            </a:r>
+          </a:p>
+          <a:p>
+            <a:endParaRPr lang="en-US" sz="1200" dirty="0"/>
+          </a:p>
+          <a:p>
+            <a:r>
+              <a:rPr lang="en-US" sz="900" dirty="0" err="1">
+                <a:latin typeface="Lucida Console" panose="020B0609040504020204" pitchFamily="49" charset="0"/>
+              </a:rPr>
+              <a:t>i_DumpDeviceInformation</a:t>
+            </a:r>
+            <a:endParaRPr lang="en-US" sz="900" dirty="0">
+              <a:latin typeface="Lucida Console" panose="020B0609040504020204" pitchFamily="49" charset="0"/>
+            </a:endParaRPr>
+          </a:p>
+          <a:p>
+            <a:endParaRPr lang="en-US" sz="900" dirty="0">
+              <a:latin typeface="Lucida Console" panose="020B0609040504020204" pitchFamily="49" charset="0"/>
+            </a:endParaRPr>
+          </a:p>
+          <a:p>
+            <a:r>
+              <a:rPr lang="en-US" sz="900" dirty="0" err="1">
+                <a:latin typeface="Lucida Console" panose="020B0609040504020204" pitchFamily="49" charset="0"/>
+              </a:rPr>
+              <a:t>pp_ResortDevices</a:t>
+            </a:r>
+            <a:r>
+              <a:rPr lang="en-US" sz="900" dirty="0">
+                <a:latin typeface="Lucida Console" panose="020B0609040504020204" pitchFamily="49" charset="0"/>
+              </a:rPr>
+              <a:t> joystick 1 </a:t>
+            </a:r>
+            <a:r>
+              <a:rPr lang="en-US" sz="900" dirty="0" smtClean="0">
+                <a:latin typeface="Lucida Console" panose="020B0609040504020204" pitchFamily="49" charset="0"/>
+              </a:rPr>
+              <a:t>2</a:t>
+            </a:r>
+          </a:p>
+          <a:p>
+            <a:endParaRPr lang="en-US" sz="1200" dirty="0"/>
+          </a:p>
+        </p:txBody>
+      </p:sp>
+      <p:pic>
+        <p:nvPicPr>
+          <p:cNvPr id="3" name="Grafik 2"/>
+          <p:cNvPicPr>
+            <a:picLocks noChangeAspect="1"/>
+          </p:cNvPicPr>
+          <p:nvPr/>
+        </p:nvPicPr>
+        <p:blipFill>
+          <a:blip r:embed="rId3"/>
+          <a:stretch>
+            <a:fillRect/>
+          </a:stretch>
+        </p:blipFill>
+        <p:spPr>
+          <a:xfrm>
+            <a:off x="3921573" y="3212976"/>
+            <a:ext cx="4471467" cy="2306201"/>
+          </a:xfrm>
+          <a:prstGeom prst="rect">
+            <a:avLst/>
+          </a:prstGeom>
+        </p:spPr>
+      </p:pic>
+      <p:sp>
+        <p:nvSpPr>
+          <p:cNvPr id="15" name="Rechteck 14"/>
+          <p:cNvSpPr/>
+          <p:nvPr/>
+        </p:nvSpPr>
+        <p:spPr>
+          <a:xfrm flipV="1">
+            <a:off x="7600989" y="3501007"/>
+            <a:ext cx="737700" cy="864094"/>
+          </a:xfrm>
+          <a:prstGeom prst="rect">
+            <a:avLst/>
+          </a:prstGeom>
+          <a:noFill/>
+          <a:ln w="57150">
+            <a:solidFill>
+              <a:srgbClr val="00B050"/>
+            </a:solidFill>
+          </a:ln>
+        </p:spPr>
+        <p:style>
+          <a:lnRef idx="2">
+            <a:schemeClr val="accent3"/>
+          </a:lnRef>
+          <a:fillRef idx="1">
+            <a:schemeClr val="lt1"/>
+          </a:fillRef>
+          <a:effectRef idx="0">
+            <a:schemeClr val="accent3"/>
+          </a:effectRef>
+          <a:fontRef idx="minor">
+            <a:schemeClr val="dk1"/>
+          </a:fontRef>
+        </p:style>
+        <p:txBody>
+          <a:bodyPr rtlCol="0" anchor="ctr"/>
+          <a:lstStyle/>
+          <a:p>
+            <a:pPr algn="ctr"/>
+            <a:endParaRPr lang="de-CH"/>
+          </a:p>
+        </p:txBody>
+      </p:sp>
+      <p:sp>
+        <p:nvSpPr>
+          <p:cNvPr id="20" name="Pfeil nach rechts 19"/>
+          <p:cNvSpPr/>
+          <p:nvPr/>
+        </p:nvSpPr>
+        <p:spPr>
+          <a:xfrm>
+            <a:off x="3494888" y="3628553"/>
+            <a:ext cx="504056" cy="285009"/>
+          </a:xfrm>
+          <a:prstGeom prst="rightArrow">
+            <a:avLst/>
+          </a:prstGeom>
+        </p:spPr>
+        <p:style>
+          <a:lnRef idx="1">
+            <a:schemeClr val="accent2"/>
+          </a:lnRef>
+          <a:fillRef idx="2">
+            <a:schemeClr val="accent2"/>
+          </a:fillRef>
+          <a:effectRef idx="1">
+            <a:schemeClr val="accent2"/>
+          </a:effectRef>
+          <a:fontRef idx="minor">
+            <a:schemeClr val="dk1"/>
+          </a:fontRef>
+        </p:style>
+        <p:txBody>
+          <a:bodyPr rtlCol="0" anchor="ctr"/>
+          <a:lstStyle/>
+          <a:p>
+            <a:pPr algn="ctr"/>
+            <a:endParaRPr lang="de-CH"/>
+          </a:p>
+        </p:txBody>
+      </p:sp>
+    </p:spTree>
+    <p:extLst>
+      <p:ext uri="{BB962C8B-B14F-4D97-AF65-F5344CB8AC3E}">
+        <p14:creationId xmlns:p14="http://schemas.microsoft.com/office/powerpoint/2010/main" val="1690729761"/>
+      </p:ext>
+    </p:extLst>
+  </p:cSld>
+  <p:clrMapOvr>
+    <a:masterClrMapping/>
+  </p:clrMapOvr>
+</p:sld>
+</file>
+
+<file path=ppt/slides/slide18.xml><?xml version="1.0" encoding="utf-8"?>
+<p:sld xmlns:a="http://schemas.openxmlformats.org/drawingml/2006/main" xmlns:r="http://schemas.openxmlformats.org/officeDocument/2006/relationships" xmlns:p="http://schemas.openxmlformats.org/presentationml/2006/main">
+  <p:cSld>
+    <p:spTree>
+      <p:nvGrpSpPr>
+        <p:cNvPr id="1" name=""/>
+        <p:cNvGrpSpPr/>
+        <p:nvPr/>
+      </p:nvGrpSpPr>
+      <p:grpSpPr>
+        <a:xfrm>
+          <a:off x="0" y="0"/>
+          <a:ext cx="0" cy="0"/>
+          <a:chOff x="0" y="0"/>
+          <a:chExt cx="0" cy="0"/>
+        </a:xfrm>
+      </p:grpSpPr>
       <p:sp>
         <p:nvSpPr>
           <p:cNvPr id="4" name="Titel 3"/>
@@ -8898,12 +9381,34 @@
         </p:nvSpPr>
         <p:spPr/>
         <p:txBody>
-          <a:bodyPr/>
+          <a:bodyPr>
+            <a:normAutofit/>
+          </a:bodyPr>
           <a:lstStyle/>
           <a:p>
             <a:r>
               <a:rPr lang="en-US" dirty="0" smtClean="0"/>
-              <a:t>Updating from V 2.1 to V 2.2:</a:t>
+              <a:t>Updating from V </a:t>
+            </a:r>
+            <a:r>
+              <a:rPr lang="en-US" dirty="0" smtClean="0"/>
+              <a:t>2.x </a:t>
+            </a:r>
+            <a:r>
+              <a:rPr lang="en-US" dirty="0" smtClean="0"/>
+              <a:t>to V </a:t>
+            </a:r>
+            <a:r>
+              <a:rPr lang="en-US" dirty="0" smtClean="0"/>
+              <a:t>2</a:t>
+            </a:r>
+            <a:r>
+              <a:rPr lang="en-US" dirty="0" smtClean="0"/>
+              <a:t>.3</a:t>
+            </a:r>
+            <a:r>
+              <a:rPr lang="en-US" dirty="0" smtClean="0"/>
+              <a:t>:</a:t>
             </a:r>
             <a:endParaRPr lang="de-CH" dirty="0"/>
           </a:p>
@@ -8922,14 +9427,65 @@
         <p:spPr/>
         <p:txBody>
           <a:bodyPr>
-            <a:normAutofit lnSpcReduction="10000"/>
+            <a:normAutofit fontScale="92500" lnSpcReduction="20000"/>
           </a:bodyPr>
           <a:lstStyle/>
           <a:p>
             <a:r>
               <a:rPr lang="en-US" sz="2400" dirty="0" smtClean="0"/>
-              <a:t>No specific things to do</a:t>
-            </a:r>
+              <a:t>Check the </a:t>
+            </a:r>
+            <a:r>
+              <a:rPr lang="en-US" sz="2400" dirty="0" err="1" smtClean="0"/>
+              <a:t>jsN</a:t>
+            </a:r>
+            <a:r>
+              <a:rPr lang="en-US" sz="2400" dirty="0" smtClean="0"/>
+              <a:t> assignment and maybe de-assign unused devices</a:t>
+            </a:r>
+            <a:br>
+              <a:rPr lang="en-US" sz="2400" dirty="0" smtClean="0"/>
+            </a:br>
+            <a:r>
+              <a:rPr lang="en-US" sz="2400" dirty="0" smtClean="0"/>
+              <a:t>See the new ‘</a:t>
+            </a:r>
+            <a:r>
+              <a:rPr lang="en-US" sz="2400" dirty="0" err="1" smtClean="0">
+                <a:solidFill>
+                  <a:srgbClr val="00B050"/>
+                </a:solidFill>
+              </a:rPr>
+              <a:t>js</a:t>
+            </a:r>
+            <a:r>
+              <a:rPr lang="en-US" sz="2400" dirty="0" smtClean="0">
+                <a:solidFill>
+                  <a:srgbClr val="00B050"/>
+                </a:solidFill>
+              </a:rPr>
+              <a:t> Reassign</a:t>
+            </a:r>
+            <a:r>
+              <a:rPr lang="en-US" sz="2400" dirty="0" smtClean="0"/>
+              <a:t>’ feature on page 17. </a:t>
+            </a:r>
+            <a:br>
+              <a:rPr lang="en-US" sz="2400" dirty="0" smtClean="0"/>
+            </a:br>
+            <a:r>
+              <a:rPr lang="en-US" sz="1900" dirty="0" smtClean="0"/>
+              <a:t>Note: You may need to do this twice for each of the “</a:t>
+            </a:r>
+            <a:r>
+              <a:rPr lang="en-US" sz="1900" dirty="0" err="1" smtClean="0"/>
+              <a:t>VJoy</a:t>
+            </a:r>
+            <a:r>
+              <a:rPr lang="en-US" sz="1900" dirty="0" smtClean="0"/>
+              <a:t> virtual joystick” devices.</a:t>
+            </a:r>
+            <a:endParaRPr lang="en-US" sz="2400" dirty="0" smtClean="0"/>
           </a:p>
           <a:p>
             <a:endParaRPr lang="en-US" sz="2400" dirty="0"/>
@@ -9248,19 +9804,7 @@
           <a:p>
             <a:r>
               <a:rPr lang="en-US" sz="2400" dirty="0"/>
-              <a:t>Page </a:t>
-            </a:r>
-            <a:r>
-              <a:rPr lang="en-US" sz="2400" dirty="0" smtClean="0"/>
-              <a:t>16 		</a:t>
-            </a:r>
-            <a:r>
-              <a:rPr lang="en-US" sz="2400" dirty="0" smtClean="0">
-                <a:solidFill>
-                  <a:schemeClr val="accent4"/>
-                </a:solidFill>
-              </a:rPr>
-              <a:t>V2.2 </a:t>
+              <a:t>Page 16 		</a:t>
             </a:r>
             <a:r>
               <a:rPr lang="en-US" sz="2400" dirty="0">
@@ -9268,13 +9812,47 @@
                   <a:schemeClr val="accent4"/>
                 </a:solidFill>
               </a:rPr>
+              <a:t>V2.2 new features</a:t>
+            </a:r>
+          </a:p>
+          <a:p>
+            <a:r>
+              <a:rPr lang="en-US" sz="2400" dirty="0"/>
+              <a:t>Page </a:t>
+            </a:r>
+            <a:r>
+              <a:rPr lang="en-US" sz="2400" dirty="0" smtClean="0"/>
+              <a:t>17 </a:t>
+            </a:r>
+            <a:r>
+              <a:rPr lang="en-US" sz="2400" dirty="0"/>
+              <a:t>		</a:t>
+            </a:r>
+            <a:r>
+              <a:rPr lang="en-US" sz="2400" dirty="0" smtClean="0">
+                <a:solidFill>
+                  <a:srgbClr val="00B050"/>
+                </a:solidFill>
+              </a:rPr>
+              <a:t>V2.3 </a:t>
+            </a:r>
+            <a:r>
+              <a:rPr lang="en-US" sz="2400" dirty="0">
+                <a:solidFill>
+                  <a:srgbClr val="00B050"/>
+                </a:solidFill>
+              </a:rPr>
               <a:t>new features</a:t>
             </a:r>
           </a:p>
           <a:p>
             <a:r>
               <a:rPr lang="en-US" sz="2400" dirty="0" smtClean="0"/>
-              <a:t>Last Page 		Common Workflows - Cheat sheet</a:t>
+              <a:t>Last </a:t>
+            </a:r>
+            <a:r>
+              <a:rPr lang="en-US" sz="2400" dirty="0" smtClean="0"/>
+              <a:t>Page 		Common Workflows - Cheat sheet</a:t>
             </a:r>
             <a:endParaRPr lang="en-US" sz="2400" dirty="0"/>
           </a:p>
@@ -9631,7 +10209,7 @@
       </p:grpSpPr>
       <p:pic>
         <p:nvPicPr>
-          <p:cNvPr id="4" name="Grafik 3"/>
+          <p:cNvPr id="5" name="Grafik 4"/>
           <p:cNvPicPr>
             <a:picLocks noChangeAspect="1"/>
           </p:cNvPicPr>
@@ -9645,8 +10223,8 @@
         </p:blipFill>
         <p:spPr>
           <a:xfrm>
-            <a:off x="1398985" y="1134421"/>
-            <a:ext cx="6202040" cy="5581836"/>
+            <a:off x="1416633" y="1134421"/>
+            <a:ext cx="6193051" cy="5573747"/>
           </a:xfrm>
           <a:prstGeom prst="rect">
             <a:avLst/>
@@ -9834,8 +10412,8 @@
         </p:nvSpPr>
         <p:spPr>
           <a:xfrm>
-            <a:off x="5292080" y="3419197"/>
-            <a:ext cx="1656184" cy="360040"/>
+            <a:off x="5292080" y="3492505"/>
+            <a:ext cx="1656184" cy="286732"/>
           </a:xfrm>
           <a:prstGeom prst="borderCallout2">
             <a:avLst>
@@ -9843,8 +10421,8 @@
               <a:gd name="adj2" fmla="val -2884"/>
               <a:gd name="adj3" fmla="val 17079"/>
               <a:gd name="adj4" fmla="val -13761"/>
-              <a:gd name="adj5" fmla="val 109158"/>
-              <a:gd name="adj6" fmla="val -56474"/>
+              <a:gd name="adj5" fmla="val 34748"/>
+              <a:gd name="adj6" fmla="val -50299"/>
             </a:avLst>
           </a:prstGeom>
         </p:spPr>
@@ -9868,15 +10446,13 @@
           <a:p>
             <a:r>
               <a:rPr lang="en-US" sz="1100" dirty="0" smtClean="0"/>
-              <a:t>Joystick device map</a:t>
-            </a:r>
-          </a:p>
-          <a:p>
-            <a:r>
-              <a:rPr lang="en-US" sz="800" dirty="0" smtClean="0"/>
-              <a:t>(the default is usually OK)</a:t>
-            </a:r>
-            <a:endParaRPr lang="de-CH" sz="800" dirty="0"/>
+              <a:t>Joystick device </a:t>
+            </a:r>
+            <a:r>
+              <a:rPr lang="en-US" sz="1100" dirty="0" smtClean="0"/>
+              <a:t>map</a:t>
+            </a:r>
+            <a:endParaRPr lang="en-US" sz="1100" dirty="0" smtClean="0"/>
           </a:p>
         </p:txBody>
       </p:sp>
@@ -9888,8 +10464,8 @@
         </p:nvSpPr>
         <p:spPr>
           <a:xfrm>
-            <a:off x="5303112" y="4169828"/>
-            <a:ext cx="1656184" cy="360040"/>
+            <a:off x="5292080" y="3892739"/>
+            <a:ext cx="1656184" cy="232446"/>
           </a:xfrm>
           <a:prstGeom prst="borderCallout2">
             <a:avLst>
@@ -9897,8 +10473,8 @@
               <a:gd name="adj2" fmla="val -2884"/>
               <a:gd name="adj3" fmla="val 17079"/>
               <a:gd name="adj4" fmla="val -13761"/>
-              <a:gd name="adj5" fmla="val 109158"/>
-              <a:gd name="adj6" fmla="val -56474"/>
+              <a:gd name="adj5" fmla="val 111746"/>
+              <a:gd name="adj6" fmla="val -45577"/>
             </a:avLst>
           </a:prstGeom>
         </p:spPr>
@@ -9922,7 +10498,7 @@
           <a:p>
             <a:r>
               <a:rPr lang="en-US" sz="1100" dirty="0" smtClean="0"/>
-              <a:t>Current mapping</a:t>
+              <a:t>Selected mapping</a:t>
             </a:r>
             <a:endParaRPr lang="de-CH" sz="800" dirty="0"/>
           </a:p>
@@ -9936,17 +10512,17 @@
         </p:nvSpPr>
         <p:spPr>
           <a:xfrm>
-            <a:off x="5639421" y="4809397"/>
+            <a:off x="5508104" y="4199693"/>
             <a:ext cx="1656184" cy="360040"/>
           </a:xfrm>
           <a:prstGeom prst="borderCallout2">
             <a:avLst>
               <a:gd name="adj1" fmla="val 18750"/>
               <a:gd name="adj2" fmla="val -2884"/>
-              <a:gd name="adj3" fmla="val 47154"/>
-              <a:gd name="adj4" fmla="val -9402"/>
-              <a:gd name="adj5" fmla="val 49006"/>
-              <a:gd name="adj6" fmla="val -129484"/>
+              <a:gd name="adj3" fmla="val 110647"/>
+              <a:gd name="adj4" fmla="val -23932"/>
+              <a:gd name="adj5" fmla="val 109157"/>
+              <a:gd name="adj6" fmla="val -122583"/>
             </a:avLst>
           </a:prstGeom>
         </p:spPr>
@@ -9984,7 +10560,7 @@
         </p:nvSpPr>
         <p:spPr>
           <a:xfrm>
-            <a:off x="5639421" y="5155345"/>
+            <a:off x="5639421" y="4923987"/>
             <a:ext cx="1656184" cy="360040"/>
           </a:xfrm>
           <a:prstGeom prst="borderCallout2">
@@ -10080,7 +10656,7 @@
         </p:nvSpPr>
         <p:spPr>
           <a:xfrm>
-            <a:off x="1503349" y="4869160"/>
+            <a:off x="1503349" y="4603078"/>
             <a:ext cx="1656184" cy="360040"/>
           </a:xfrm>
           <a:prstGeom prst="borderCallout2">
@@ -10128,7 +10704,7 @@
         </p:nvSpPr>
         <p:spPr>
           <a:xfrm>
-            <a:off x="1503349" y="5335365"/>
+            <a:off x="1503349" y="5145820"/>
             <a:ext cx="1656184" cy="360040"/>
           </a:xfrm>
           <a:prstGeom prst="borderCallout2">
@@ -10408,17 +10984,17 @@
         </p:nvSpPr>
         <p:spPr>
           <a:xfrm>
-            <a:off x="143566" y="5492548"/>
+            <a:off x="115873" y="5337354"/>
             <a:ext cx="1359783" cy="360040"/>
           </a:xfrm>
           <a:prstGeom prst="borderCallout2">
             <a:avLst>
               <a:gd name="adj1" fmla="val 88169"/>
               <a:gd name="adj2" fmla="val 102100"/>
-              <a:gd name="adj3" fmla="val 143663"/>
-              <a:gd name="adj4" fmla="val 139313"/>
-              <a:gd name="adj5" fmla="val 180515"/>
-              <a:gd name="adj6" fmla="val 235168"/>
+              <a:gd name="adj3" fmla="val 85183"/>
+              <a:gd name="adj4" fmla="val 141083"/>
+              <a:gd name="adj5" fmla="val 105326"/>
+              <a:gd name="adj6" fmla="val 241804"/>
             </a:avLst>
           </a:prstGeom>
         </p:spPr>
@@ -10443,6 +11019,67 @@
             <a:r>
               <a:rPr lang="en-US" sz="1100" dirty="0" smtClean="0"/>
               <a:t>V2.1: Blend unmapped option</a:t>
+            </a:r>
+            <a:endParaRPr lang="de-CH" sz="800" dirty="0"/>
+          </a:p>
+        </p:txBody>
+      </p:sp>
+      <p:sp>
+        <p:nvSpPr>
+          <p:cNvPr id="24" name="Legende mit Linie 2 23"/>
+          <p:cNvSpPr/>
+          <p:nvPr/>
+        </p:nvSpPr>
+        <p:spPr>
+          <a:xfrm>
+            <a:off x="115873" y="5734057"/>
+            <a:ext cx="1359783" cy="360040"/>
+          </a:xfrm>
+          <a:prstGeom prst="borderCallout2">
+            <a:avLst>
+              <a:gd name="adj1" fmla="val 88169"/>
+              <a:gd name="adj2" fmla="val 102100"/>
+              <a:gd name="adj3" fmla="val 85183"/>
+              <a:gd name="adj4" fmla="val 141083"/>
+              <a:gd name="adj5" fmla="val 105326"/>
+              <a:gd name="adj6" fmla="val 241804"/>
+            </a:avLst>
+          </a:prstGeom>
+          <a:ln>
+            <a:solidFill>
+              <a:srgbClr val="00B050"/>
+            </a:solidFill>
+          </a:ln>
+        </p:spPr>
+        <p:style>
+          <a:lnRef idx="2">
+            <a:schemeClr val="accent3"/>
+          </a:lnRef>
+          <a:fillRef idx="1">
+            <a:schemeClr val="lt1"/>
+          </a:fillRef>
+          <a:effectRef idx="0">
+            <a:schemeClr val="accent3"/>
+          </a:effectRef>
+          <a:fontRef idx="minor">
+            <a:schemeClr val="dk1"/>
+          </a:fontRef>
+        </p:style>
+        <p:txBody>
+          <a:bodyPr rtlCol="0" anchor="ctr"/>
+          <a:lstStyle/>
+          <a:p>
+            <a:r>
+              <a:rPr lang="en-US" sz="1100" dirty="0" smtClean="0"/>
+              <a:t>V2.3: </a:t>
+            </a:r>
+            <a:r>
+              <a:rPr lang="en-US" sz="1100" dirty="0" err="1" smtClean="0"/>
+              <a:t>Js</a:t>
+            </a:r>
+            <a:r>
+              <a:rPr lang="en-US" sz="1100" dirty="0" smtClean="0"/>
+              <a:t> Reassignment</a:t>
             </a:r>
             <a:endParaRPr lang="de-CH" sz="800" dirty="0"/>
           </a:p>
@@ -10480,7 +11117,7 @@
       </p:grpSpPr>
       <p:pic>
         <p:nvPicPr>
-          <p:cNvPr id="8" name="Grafik 7"/>
+          <p:cNvPr id="3" name="Grafik 2"/>
           <p:cNvPicPr>
             <a:picLocks noChangeAspect="1"/>
           </p:cNvPicPr>
@@ -10494,8 +11131,8 @@
         </p:blipFill>
         <p:spPr>
           <a:xfrm>
-            <a:off x="1403648" y="1124744"/>
-            <a:ext cx="6197377" cy="5577639"/>
+            <a:off x="1403648" y="1124742"/>
+            <a:ext cx="6192114" cy="5572903"/>
           </a:xfrm>
           <a:prstGeom prst="rect">
             <a:avLst/>
@@ -10534,7 +11171,7 @@
         <p:spPr>
           <a:xfrm>
             <a:off x="3275856" y="1772816"/>
-            <a:ext cx="1984909" cy="2664296"/>
+            <a:ext cx="1984909" cy="2232248"/>
           </a:xfrm>
           <a:prstGeom prst="rect">
             <a:avLst/>
@@ -10573,8 +11210,8 @@
         </p:nvSpPr>
         <p:spPr>
           <a:xfrm>
-            <a:off x="304721" y="4494307"/>
-            <a:ext cx="8227719" cy="2208075"/>
+            <a:off x="304721" y="4077073"/>
+            <a:ext cx="8227719" cy="2625310"/>
           </a:xfrm>
           <a:prstGeom prst="rect">
             <a:avLst/>
@@ -10600,7 +11237,15 @@
           <a:p>
             <a:r>
               <a:rPr lang="en-US" sz="1200" dirty="0" smtClean="0"/>
-              <a:t>The tabs represent the joystick devices found connected to the PC also the number 1..8 shows the order the PC reports them which is crucial to the mapping as this will result in the js_1, js_2 .. Names used to build the command name.</a:t>
+              <a:t>The tabs represent the joystick devices found connected to the PC also the number 1..8 shows the order the PC reports them which is crucial to the mapping as this will result in </a:t>
+            </a:r>
+            <a:r>
+              <a:rPr lang="en-US" sz="1200" dirty="0" smtClean="0"/>
+              <a:t>the default </a:t>
+            </a:r>
+            <a:r>
+              <a:rPr lang="en-US" sz="1200" dirty="0" smtClean="0"/>
+              <a:t>js_1, js_2 .. Names used to build the command name.</a:t>
             </a:r>
           </a:p>
           <a:p>
@@ -10614,25 +11259,97 @@
           </a:p>
           <a:p>
             <a:r>
-              <a:rPr lang="en-US" sz="1200" dirty="0" smtClean="0"/>
+              <a:rPr lang="en-US" sz="1200" dirty="0" smtClean="0">
+                <a:solidFill>
+                  <a:srgbClr val="00B050"/>
+                </a:solidFill>
+              </a:rPr>
+              <a:t>V 2.3: </a:t>
+            </a:r>
+            <a:r>
+              <a:rPr lang="en-US" sz="1200" dirty="0" smtClean="0">
+                <a:solidFill>
+                  <a:srgbClr val="00B050"/>
+                </a:solidFill>
+              </a:rPr>
+              <a:t>you will see the actual </a:t>
+            </a:r>
+            <a:r>
+              <a:rPr lang="en-US" sz="1200" dirty="0" err="1" smtClean="0">
+                <a:solidFill>
+                  <a:srgbClr val="00B050"/>
+                </a:solidFill>
+              </a:rPr>
+              <a:t>Js</a:t>
+            </a:r>
+            <a:r>
+              <a:rPr lang="en-US" sz="1200" dirty="0" smtClean="0">
+                <a:solidFill>
+                  <a:srgbClr val="00B050"/>
+                </a:solidFill>
+              </a:rPr>
+              <a:t> assignment but it is not enabled to change it here.</a:t>
+            </a:r>
+            <a:br>
+              <a:rPr lang="en-US" sz="1200" dirty="0" smtClean="0">
+                <a:solidFill>
+                  <a:srgbClr val="00B050"/>
+                </a:solidFill>
+              </a:rPr>
+            </a:br>
+            <a:r>
+              <a:rPr lang="en-US" sz="1200" dirty="0" smtClean="0">
+                <a:solidFill>
+                  <a:srgbClr val="00B050"/>
+                </a:solidFill>
+              </a:rPr>
               <a:t>The </a:t>
             </a:r>
             <a:r>
-              <a:rPr lang="en-US" sz="1200" i="1" dirty="0" smtClean="0"/>
+              <a:rPr lang="en-US" sz="1200" dirty="0" smtClean="0">
+                <a:solidFill>
+                  <a:srgbClr val="00B050"/>
+                </a:solidFill>
+              </a:rPr>
               <a:t>SC-Device to Joystick Mapping </a:t>
             </a:r>
             <a:r>
-              <a:rPr lang="en-US" sz="1200" dirty="0" smtClean="0"/>
-              <a:t>can be used if the default assignment “Joystick 1 -&gt; js_1” does not match what the </a:t>
-            </a:r>
-            <a:r>
-              <a:rPr lang="en-US" sz="1200" dirty="0" err="1" smtClean="0"/>
-              <a:t>CryEngine</a:t>
-            </a:r>
-            <a:r>
-              <a:rPr lang="en-US" sz="1200" dirty="0" smtClean="0"/>
-              <a:t> is using. – Usually the default should work. You may only remap js1..js3 - 4..8 will remain as detected.</a:t>
-            </a:r>
+              <a:rPr lang="en-US" sz="1200" dirty="0" smtClean="0">
+                <a:solidFill>
+                  <a:srgbClr val="00B050"/>
+                </a:solidFill>
+              </a:rPr>
+              <a:t>is a separate window accessed by hitting the ‘</a:t>
+            </a:r>
+            <a:r>
+              <a:rPr lang="en-US" sz="1200" b="1" dirty="0" err="1" smtClean="0">
+                <a:solidFill>
+                  <a:srgbClr val="00B050"/>
+                </a:solidFill>
+              </a:rPr>
+              <a:t>Js</a:t>
+            </a:r>
+            <a:r>
+              <a:rPr lang="en-US" sz="1200" b="1" dirty="0" smtClean="0">
+                <a:solidFill>
+                  <a:srgbClr val="00B050"/>
+                </a:solidFill>
+              </a:rPr>
+              <a:t> Reassign</a:t>
+            </a:r>
+            <a:r>
+              <a:rPr lang="en-US" sz="1200" dirty="0" smtClean="0">
+                <a:solidFill>
+                  <a:srgbClr val="00B050"/>
+                </a:solidFill>
+              </a:rPr>
+              <a:t>’ button.</a:t>
+            </a:r>
+            <a:endParaRPr lang="en-US" sz="1200" dirty="0" smtClean="0">
+              <a:solidFill>
+                <a:srgbClr val="00B050"/>
+              </a:solidFill>
+            </a:endParaRPr>
           </a:p>
           <a:p>
             <a:endParaRPr lang="en-US" sz="1200" dirty="0" smtClean="0"/>
@@ -10663,7 +11380,7 @@
         <p:spPr>
           <a:xfrm>
             <a:off x="5317742" y="1340768"/>
-            <a:ext cx="3214698" cy="3153539"/>
+            <a:ext cx="3214698" cy="2736305"/>
           </a:xfrm>
           <a:prstGeom prst="rect">
             <a:avLst/>
@@ -10727,7 +11444,7 @@
         </p:blipFill>
         <p:spPr>
           <a:xfrm>
-            <a:off x="5796136" y="1809035"/>
+            <a:off x="5724128" y="1489647"/>
             <a:ext cx="2160240" cy="1767469"/>
           </a:xfrm>
           <a:prstGeom prst="rect">
@@ -10737,35 +11454,39 @@
       </p:pic>
       <p:sp>
         <p:nvSpPr>
-          <p:cNvPr id="10" name="Textfeld 9"/>
+          <p:cNvPr id="6" name="Textfeld 5"/>
           <p:cNvSpPr txBox="1"/>
           <p:nvPr/>
         </p:nvSpPr>
         <p:spPr>
           <a:xfrm>
-            <a:off x="4217976" y="1394912"/>
-            <a:ext cx="864096" cy="161583"/>
+            <a:off x="107504" y="89972"/>
+            <a:ext cx="1857111" cy="369332"/>
           </a:xfrm>
           <a:prstGeom prst="rect">
             <a:avLst/>
           </a:prstGeom>
-          <a:solidFill>
-            <a:schemeClr val="bg1">
-              <a:lumMod val="95000"/>
-            </a:schemeClr>
-          </a:solidFill>
-        </p:spPr>
-        <p:txBody>
-          <a:bodyPr wrap="square" lIns="0" tIns="0" rIns="0" bIns="0" rtlCol="0">
+          <a:noFill/>
+        </p:spPr>
+        <p:txBody>
+          <a:bodyPr wrap="none" rtlCol="0">
             <a:spAutoFit/>
           </a:bodyPr>
           <a:lstStyle/>
           <a:p>
             <a:r>
-              <a:rPr lang="en-US" sz="1050" b="1" dirty="0" smtClean="0"/>
-              <a:t>2.0</a:t>
-            </a:r>
-            <a:endParaRPr lang="de-CH" sz="1050" b="1" dirty="0"/>
+              <a:rPr lang="en-US" b="1" dirty="0" smtClean="0">
+                <a:solidFill>
+                  <a:srgbClr val="00B050"/>
+                </a:solidFill>
+              </a:rPr>
+              <a:t>V2.3 Update here</a:t>
+            </a:r>
+            <a:endParaRPr lang="de-CH" b="1" dirty="0">
+              <a:solidFill>
+                <a:srgbClr val="00B050"/>
+              </a:solidFill>
+            </a:endParaRPr>
           </a:p>
         </p:txBody>
       </p:sp>
@@ -11193,7 +11914,7 @@
       </p:grpSpPr>
       <p:pic>
         <p:nvPicPr>
-          <p:cNvPr id="3" name="Grafik 2"/>
+          <p:cNvPr id="5" name="Grafik 4"/>
           <p:cNvPicPr>
             <a:picLocks noChangeAspect="1"/>
           </p:cNvPicPr>
@@ -11207,8 +11928,8 @@
         </p:blipFill>
         <p:spPr>
           <a:xfrm>
-            <a:off x="1401835" y="1124744"/>
-            <a:ext cx="6197376" cy="5577639"/>
+            <a:off x="1399952" y="1124742"/>
+            <a:ext cx="6197377" cy="5577639"/>
           </a:xfrm>
           <a:prstGeom prst="rect">
             <a:avLst/>
@@ -11246,8 +11967,8 @@
         </p:nvSpPr>
         <p:spPr>
           <a:xfrm flipV="1">
-            <a:off x="3275856" y="4293097"/>
-            <a:ext cx="1944216" cy="864096"/>
+            <a:off x="3275856" y="3958780"/>
+            <a:ext cx="1944216" cy="766364"/>
           </a:xfrm>
           <a:prstGeom prst="rect">
             <a:avLst/>
@@ -11286,8 +12007,8 @@
         </p:nvSpPr>
         <p:spPr>
           <a:xfrm>
-            <a:off x="457200" y="1340769"/>
-            <a:ext cx="8227719" cy="2880320"/>
+            <a:off x="251520" y="1196753"/>
+            <a:ext cx="8712968" cy="2736304"/>
           </a:xfrm>
           <a:prstGeom prst="rect">
             <a:avLst/>
@@ -11512,7 +12233,7 @@
       </p:grpSpPr>
       <p:pic>
         <p:nvPicPr>
-          <p:cNvPr id="9" name="Grafik 8"/>
+          <p:cNvPr id="3" name="Grafik 2"/>
           <p:cNvPicPr>
             <a:picLocks noChangeAspect="1"/>
           </p:cNvPicPr>
@@ -11526,8 +12247,8 @@
         </p:blipFill>
         <p:spPr>
           <a:xfrm>
-            <a:off x="1403648" y="1124744"/>
-            <a:ext cx="6197377" cy="5577639"/>
+            <a:off x="1391771" y="1124744"/>
+            <a:ext cx="6197376" cy="5577639"/>
           </a:xfrm>
           <a:prstGeom prst="rect">
             <a:avLst/>
@@ -11566,7 +12287,7 @@
         <p:spPr>
           <a:xfrm flipV="1">
             <a:off x="5220073" y="1769332"/>
-            <a:ext cx="2380952" cy="4251956"/>
+            <a:ext cx="2380952" cy="4107940"/>
           </a:xfrm>
           <a:prstGeom prst="rect">
             <a:avLst/>
@@ -11606,7 +12327,7 @@
         <p:spPr>
           <a:xfrm>
             <a:off x="288157" y="1340768"/>
-            <a:ext cx="4895422" cy="3702612"/>
+            <a:ext cx="4895422" cy="3456384"/>
           </a:xfrm>
           <a:prstGeom prst="rect">
             <a:avLst/>
@@ -11758,7 +12479,7 @@
         </p:nvSpPr>
         <p:spPr>
           <a:xfrm flipV="1">
-            <a:off x="3203849" y="5085184"/>
+            <a:off x="3216244" y="4843163"/>
             <a:ext cx="2016224" cy="307525"/>
           </a:xfrm>
           <a:prstGeom prst="rect">

</xml_diff>

<commit_message>
improved on #17 allows js1..js8 adopt for AC 0.9 - add actionmaps flycam and spaceship_turret
</commit_message>
<xml_diff>
--- a/doc/SCJMapper_QGuide.pptx
+++ b/doc/SCJMapper_QGuide.pptx
@@ -321,7 +321,7 @@
           <a:p>
             <a:fld id="{1BA50D42-C9CD-4801-B293-61D1F53EC57E}" type="datetimeFigureOut">
               <a:rPr lang="de-DE" smtClean="0"/>
-              <a:t>31.08.2014</a:t>
+              <a:t>14.09.2014</a:t>
             </a:fld>
             <a:endParaRPr lang="de-DE"/>
           </a:p>
@@ -486,7 +486,7 @@
           <a:p>
             <a:fld id="{1BA50D42-C9CD-4801-B293-61D1F53EC57E}" type="datetimeFigureOut">
               <a:rPr lang="de-DE" smtClean="0"/>
-              <a:t>31.08.2014</a:t>
+              <a:t>14.09.2014</a:t>
             </a:fld>
             <a:endParaRPr lang="de-DE"/>
           </a:p>
@@ -661,7 +661,7 @@
           <a:p>
             <a:fld id="{1BA50D42-C9CD-4801-B293-61D1F53EC57E}" type="datetimeFigureOut">
               <a:rPr lang="de-DE" smtClean="0"/>
-              <a:t>31.08.2014</a:t>
+              <a:t>14.09.2014</a:t>
             </a:fld>
             <a:endParaRPr lang="de-DE"/>
           </a:p>
@@ -826,7 +826,7 @@
           <a:p>
             <a:fld id="{1BA50D42-C9CD-4801-B293-61D1F53EC57E}" type="datetimeFigureOut">
               <a:rPr lang="de-DE" smtClean="0"/>
-              <a:t>31.08.2014</a:t>
+              <a:t>14.09.2014</a:t>
             </a:fld>
             <a:endParaRPr lang="de-DE"/>
           </a:p>
@@ -1067,7 +1067,7 @@
           <a:p>
             <a:fld id="{1BA50D42-C9CD-4801-B293-61D1F53EC57E}" type="datetimeFigureOut">
               <a:rPr lang="de-DE" smtClean="0"/>
-              <a:t>31.08.2014</a:t>
+              <a:t>14.09.2014</a:t>
             </a:fld>
             <a:endParaRPr lang="de-DE"/>
           </a:p>
@@ -1350,7 +1350,7 @@
           <a:p>
             <a:fld id="{1BA50D42-C9CD-4801-B293-61D1F53EC57E}" type="datetimeFigureOut">
               <a:rPr lang="de-DE" smtClean="0"/>
-              <a:t>31.08.2014</a:t>
+              <a:t>14.09.2014</a:t>
             </a:fld>
             <a:endParaRPr lang="de-DE"/>
           </a:p>
@@ -1767,7 +1767,7 @@
           <a:p>
             <a:fld id="{1BA50D42-C9CD-4801-B293-61D1F53EC57E}" type="datetimeFigureOut">
               <a:rPr lang="de-DE" smtClean="0"/>
-              <a:t>31.08.2014</a:t>
+              <a:t>14.09.2014</a:t>
             </a:fld>
             <a:endParaRPr lang="de-DE"/>
           </a:p>
@@ -1880,7 +1880,7 @@
           <a:p>
             <a:fld id="{1BA50D42-C9CD-4801-B293-61D1F53EC57E}" type="datetimeFigureOut">
               <a:rPr lang="de-DE" smtClean="0"/>
-              <a:t>31.08.2014</a:t>
+              <a:t>14.09.2014</a:t>
             </a:fld>
             <a:endParaRPr lang="de-DE"/>
           </a:p>
@@ -1970,7 +1970,7 @@
           <a:p>
             <a:fld id="{1BA50D42-C9CD-4801-B293-61D1F53EC57E}" type="datetimeFigureOut">
               <a:rPr lang="de-DE" smtClean="0"/>
-              <a:t>31.08.2014</a:t>
+              <a:t>14.09.2014</a:t>
             </a:fld>
             <a:endParaRPr lang="de-DE"/>
           </a:p>
@@ -2242,7 +2242,7 @@
           <a:p>
             <a:fld id="{1BA50D42-C9CD-4801-B293-61D1F53EC57E}" type="datetimeFigureOut">
               <a:rPr lang="de-DE" smtClean="0"/>
-              <a:t>31.08.2014</a:t>
+              <a:t>14.09.2014</a:t>
             </a:fld>
             <a:endParaRPr lang="de-DE"/>
           </a:p>
@@ -2490,7 +2490,7 @@
           <a:p>
             <a:fld id="{1BA50D42-C9CD-4801-B293-61D1F53EC57E}" type="datetimeFigureOut">
               <a:rPr lang="de-DE" smtClean="0"/>
-              <a:t>31.08.2014</a:t>
+              <a:t>14.09.2014</a:t>
             </a:fld>
             <a:endParaRPr lang="de-DE"/>
           </a:p>
@@ -2698,7 +2698,7 @@
           <a:p>
             <a:fld id="{1BA50D42-C9CD-4801-B293-61D1F53EC57E}" type="datetimeFigureOut">
               <a:rPr lang="de-DE" smtClean="0"/>
-              <a:t>31.08.2014</a:t>
+              <a:t>14.09.2014</a:t>
             </a:fld>
             <a:endParaRPr lang="de-DE"/>
           </a:p>
@@ -3070,7 +3070,7 @@
       </p:grpSpPr>
       <p:pic>
         <p:nvPicPr>
-          <p:cNvPr id="6" name="Grafik 5"/>
+          <p:cNvPr id="7" name="Grafik 6"/>
           <p:cNvPicPr>
             <a:picLocks noChangeAspect="1"/>
           </p:cNvPicPr>
@@ -3084,7 +3084,7 @@
         </p:blipFill>
         <p:spPr>
           <a:xfrm>
-            <a:off x="5800926" y="3774638"/>
+            <a:off x="5805028" y="3767923"/>
             <a:ext cx="3219109" cy="2897198"/>
           </a:xfrm>
           <a:prstGeom prst="rect">
@@ -3118,11 +3118,7 @@
             </a:br>
             <a:r>
               <a:rPr lang="en-US" sz="4000" dirty="0" smtClean="0"/>
-              <a:t>Quick Reference Guide  V </a:t>
-            </a:r>
-            <a:r>
-              <a:rPr lang="en-US" sz="4000" dirty="0" smtClean="0"/>
-              <a:t>2.3</a:t>
+              <a:t>Quick Reference Guide  V 2.4</a:t>
             </a:r>
             <a:endParaRPr lang="en-US" sz="4000" dirty="0"/>
           </a:p>
@@ -3152,11 +3148,7 @@
           <a:p>
             <a:r>
               <a:rPr lang="en-US" sz="900" dirty="0" smtClean="0"/>
-              <a:t>20140831 </a:t>
-            </a:r>
-            <a:r>
-              <a:rPr lang="en-US" sz="900" dirty="0" smtClean="0"/>
-              <a:t>– Cassini</a:t>
+              <a:t>20140914 – Cassini</a:t>
             </a:r>
           </a:p>
           <a:p>
@@ -3283,7 +3275,7 @@
       </p:grpSpPr>
       <p:pic>
         <p:nvPicPr>
-          <p:cNvPr id="3" name="Grafik 2"/>
+          <p:cNvPr id="4" name="Grafik 3"/>
           <p:cNvPicPr>
             <a:picLocks noChangeAspect="1"/>
           </p:cNvPicPr>
@@ -3297,8 +3289,8 @@
         </p:blipFill>
         <p:spPr>
           <a:xfrm>
-            <a:off x="1580563" y="1107206"/>
-            <a:ext cx="6197377" cy="5577639"/>
+            <a:off x="1584886" y="1107206"/>
+            <a:ext cx="6180171" cy="5562154"/>
           </a:xfrm>
           <a:prstGeom prst="rect">
             <a:avLst/>
@@ -6039,7 +6031,7 @@
       </p:sp>
       <p:pic>
         <p:nvPicPr>
-          <p:cNvPr id="4" name="Grafik 3"/>
+          <p:cNvPr id="3" name="Grafik 2"/>
           <p:cNvPicPr>
             <a:picLocks noChangeAspect="1"/>
           </p:cNvPicPr>
@@ -6053,7 +6045,7 @@
         </p:blipFill>
         <p:spPr>
           <a:xfrm>
-            <a:off x="4088988" y="3558886"/>
+            <a:off x="4093915" y="3558886"/>
             <a:ext cx="4511326" cy="2134778"/>
           </a:xfrm>
           <a:prstGeom prst="rect">
@@ -6218,7 +6210,17 @@
                   <a:srgbClr val="00B050"/>
                 </a:solidFill>
               </a:rPr>
-              <a:t>V2.3 </a:t>
+              <a:t>V2.3, </a:t>
+            </a:r>
+            <a:r>
+              <a:rPr lang="en-US" dirty="0" smtClean="0">
+                <a:solidFill>
+                  <a:schemeClr val="accent5">
+                    <a:lumMod val="75000"/>
+                  </a:schemeClr>
+                </a:solidFill>
+              </a:rPr>
+              <a:t>2.4</a:t>
             </a:r>
             <a:r>
               <a:rPr lang="en-US" dirty="0" smtClean="0">
@@ -6226,7 +6228,7 @@
                   <a:srgbClr val="00B050"/>
                 </a:solidFill>
               </a:rPr>
-              <a:t>– Features</a:t>
+              <a:t> – Features</a:t>
             </a:r>
             <a:endParaRPr lang="en-US" dirty="0">
               <a:solidFill>
@@ -6349,11 +6351,7 @@
           <a:p>
             <a:r>
               <a:rPr lang="en-US" sz="1200" b="1" dirty="0" smtClean="0"/>
-              <a:t>New possibility </a:t>
-            </a:r>
-            <a:r>
-              <a:rPr lang="en-US" sz="1200" b="1" dirty="0" smtClean="0"/>
-              <a:t>to (re) assign the joystick devices to the wanted </a:t>
+              <a:t>New possibility to (re) assign the joystick devices to the wanted </a:t>
             </a:r>
             <a:r>
               <a:rPr lang="en-US" sz="1200" b="1" dirty="0" err="1" smtClean="0"/>
@@ -6363,7 +6361,6 @@
               <a:rPr lang="en-US" sz="1200" b="1" dirty="0" smtClean="0"/>
               <a:t> - number</a:t>
             </a:r>
-            <a:endParaRPr lang="en-US" sz="1200" b="1" dirty="0" smtClean="0"/>
           </a:p>
           <a:p>
             <a:endParaRPr lang="en-US" sz="1200" dirty="0"/>
@@ -6371,19 +6368,7 @@
           <a:p>
             <a:r>
               <a:rPr lang="en-US" sz="1200" dirty="0" smtClean="0"/>
-              <a:t>Go here i</a:t>
-            </a:r>
-            <a:r>
-              <a:rPr lang="en-US" sz="1200" dirty="0" smtClean="0"/>
-              <a:t>f </a:t>
-            </a:r>
-            <a:r>
-              <a:rPr lang="en-US" sz="1200" dirty="0" smtClean="0"/>
-              <a:t>you wish to </a:t>
-            </a:r>
-            <a:r>
-              <a:rPr lang="en-US" sz="1200" dirty="0" smtClean="0"/>
-              <a:t>assign a device to a particular </a:t>
+              <a:t>Go here if you wish to assign a device to a particular </a:t>
             </a:r>
             <a:r>
               <a:rPr lang="en-US" sz="1200" dirty="0" err="1" smtClean="0"/>
@@ -6393,7 +6378,6 @@
               <a:rPr lang="en-US" sz="1200" dirty="0" smtClean="0"/>
               <a:t> – number or to re-assign the devices to other numbers.</a:t>
             </a:r>
-            <a:endParaRPr lang="en-US" sz="1200" dirty="0" smtClean="0"/>
           </a:p>
           <a:p>
             <a:r>
@@ -6462,7 +6446,25 @@
             <a:endParaRPr lang="en-US" sz="1200" dirty="0" smtClean="0"/>
           </a:p>
           <a:p>
-            <a:endParaRPr lang="en-US" sz="1200" dirty="0" smtClean="0"/>
+            <a:endParaRPr lang="en-US" sz="1200" dirty="0" smtClean="0">
+              <a:solidFill>
+                <a:schemeClr val="accent5">
+                  <a:lumMod val="75000"/>
+                </a:schemeClr>
+              </a:solidFill>
+            </a:endParaRPr>
+          </a:p>
+          <a:p>
+            <a:r>
+              <a:rPr lang="en-US" sz="1200" dirty="0" smtClean="0">
+                <a:solidFill>
+                  <a:schemeClr val="accent5">
+                    <a:lumMod val="75000"/>
+                  </a:schemeClr>
+                </a:solidFill>
+              </a:rPr>
+              <a:t>V2.4 allows to assign js1 .. Js8 now</a:t>
+            </a:r>
           </a:p>
           <a:p>
             <a:endParaRPr lang="en-US" sz="1200" dirty="0"/>
@@ -9388,27 +9390,7 @@
           <a:p>
             <a:r>
               <a:rPr lang="en-US" dirty="0" smtClean="0"/>
-              <a:t>Updating from V </a:t>
-            </a:r>
-            <a:r>
-              <a:rPr lang="en-US" dirty="0" smtClean="0"/>
-              <a:t>2.x </a:t>
-            </a:r>
-            <a:r>
-              <a:rPr lang="en-US" dirty="0" smtClean="0"/>
-              <a:t>to V </a:t>
-            </a:r>
-            <a:r>
-              <a:rPr lang="en-US" dirty="0" smtClean="0"/>
-              <a:t>2</a:t>
-            </a:r>
-            <a:r>
-              <a:rPr lang="en-US" dirty="0" smtClean="0"/>
-              <a:t>.3</a:t>
-            </a:r>
-            <a:r>
-              <a:rPr lang="en-US" dirty="0" smtClean="0"/>
-              <a:t>:</a:t>
+              <a:t>Updating from V 2.x to V 2.4:</a:t>
             </a:r>
             <a:endParaRPr lang="de-CH" dirty="0"/>
           </a:p>
@@ -9431,6 +9413,13 @@
           </a:bodyPr>
           <a:lstStyle/>
           <a:p>
+            <a:r>
+              <a:rPr lang="en-US" sz="2400" dirty="0" smtClean="0"/>
+              <a:t>If you not have used 2.3 already:</a:t>
+            </a:r>
+            <a:br>
+              <a:rPr lang="en-US" sz="2400" dirty="0" smtClean="0"/>
+            </a:br>
             <a:r>
               <a:rPr lang="en-US" sz="2400" dirty="0" smtClean="0"/>
               <a:t>Check the </a:t>
@@ -9818,15 +9807,15 @@
           <a:p>
             <a:r>
               <a:rPr lang="en-US" sz="2400" dirty="0"/>
-              <a:t>Page </a:t>
-            </a:r>
-            <a:r>
-              <a:rPr lang="en-US" sz="2400" dirty="0" smtClean="0"/>
-              <a:t>17 </a:t>
-            </a:r>
-            <a:r>
-              <a:rPr lang="en-US" sz="2400" dirty="0"/>
-              <a:t>		</a:t>
+              <a:t>Page 17 		</a:t>
+            </a:r>
+            <a:r>
+              <a:rPr lang="en-US" sz="2400" dirty="0">
+                <a:solidFill>
+                  <a:srgbClr val="00B050"/>
+                </a:solidFill>
+              </a:rPr>
+              <a:t>V2.3 new </a:t>
             </a:r>
             <a:r>
               <a:rPr lang="en-US" sz="2400" dirty="0" smtClean="0">
@@ -9834,25 +9823,30 @@
                   <a:srgbClr val="00B050"/>
                 </a:solidFill>
               </a:rPr>
-              <a:t>V2.3 </a:t>
-            </a:r>
-            <a:r>
-              <a:rPr lang="en-US" sz="2400" dirty="0">
+              <a:t>features</a:t>
+            </a:r>
+            <a:r>
+              <a:rPr lang="en-US" sz="2400" dirty="0" smtClean="0">
                 <a:solidFill>
-                  <a:srgbClr val="00B050"/>
+                  <a:schemeClr val="accent5">
+                    <a:lumMod val="75000"/>
+                  </a:schemeClr>
                 </a:solidFill>
               </a:rPr>
-              <a:t>new features</a:t>
-            </a:r>
+              <a:t> + V2.4 refinement</a:t>
+            </a:r>
+            <a:endParaRPr lang="en-US" sz="2400" dirty="0">
+              <a:solidFill>
+                <a:schemeClr val="accent5">
+                  <a:lumMod val="75000"/>
+                </a:schemeClr>
+              </a:solidFill>
+            </a:endParaRPr>
           </a:p>
           <a:p>
             <a:r>
               <a:rPr lang="en-US" sz="2400" dirty="0" smtClean="0"/>
-              <a:t>Last </a:t>
-            </a:r>
-            <a:r>
-              <a:rPr lang="en-US" sz="2400" dirty="0" smtClean="0"/>
-              <a:t>Page 		Common Workflows - Cheat sheet</a:t>
+              <a:t>Last Page 		Common Workflows - Cheat sheet</a:t>
             </a:r>
             <a:endParaRPr lang="en-US" sz="2400" dirty="0"/>
           </a:p>
@@ -10209,7 +10203,7 @@
       </p:grpSpPr>
       <p:pic>
         <p:nvPicPr>
-          <p:cNvPr id="5" name="Grafik 4"/>
+          <p:cNvPr id="4" name="Grafik 3"/>
           <p:cNvPicPr>
             <a:picLocks noChangeAspect="1"/>
           </p:cNvPicPr>
@@ -10223,8 +10217,8 @@
         </p:blipFill>
         <p:spPr>
           <a:xfrm>
-            <a:off x="1416633" y="1134421"/>
-            <a:ext cx="6193051" cy="5573747"/>
+            <a:off x="1416632" y="1142360"/>
+            <a:ext cx="6184231" cy="5565808"/>
           </a:xfrm>
           <a:prstGeom prst="rect">
             <a:avLst/>
@@ -10446,13 +10440,8 @@
           <a:p>
             <a:r>
               <a:rPr lang="en-US" sz="1100" dirty="0" smtClean="0"/>
-              <a:t>Joystick device </a:t>
-            </a:r>
-            <a:r>
-              <a:rPr lang="en-US" sz="1100" dirty="0" smtClean="0"/>
-              <a:t>map</a:t>
-            </a:r>
-            <a:endParaRPr lang="en-US" sz="1100" dirty="0" smtClean="0"/>
+              <a:t>Joystick device map</a:t>
+            </a:r>
           </a:p>
         </p:txBody>
       </p:sp>
@@ -10842,40 +10831,6 @@
       </p:sp>
       <p:sp>
         <p:nvSpPr>
-          <p:cNvPr id="21" name="Textfeld 20"/>
-          <p:cNvSpPr txBox="1"/>
-          <p:nvPr/>
-        </p:nvSpPr>
-        <p:spPr>
-          <a:xfrm>
-            <a:off x="4217976" y="1394912"/>
-            <a:ext cx="864096" cy="161583"/>
-          </a:xfrm>
-          <a:prstGeom prst="rect">
-            <a:avLst/>
-          </a:prstGeom>
-          <a:solidFill>
-            <a:schemeClr val="bg1">
-              <a:lumMod val="95000"/>
-            </a:schemeClr>
-          </a:solidFill>
-        </p:spPr>
-        <p:txBody>
-          <a:bodyPr wrap="square" lIns="0" tIns="0" rIns="0" bIns="0" rtlCol="0">
-            <a:spAutoFit/>
-          </a:bodyPr>
-          <a:lstStyle/>
-          <a:p>
-            <a:r>
-              <a:rPr lang="en-US" sz="1050" b="1" dirty="0" smtClean="0"/>
-              <a:t>2.0</a:t>
-            </a:r>
-            <a:endParaRPr lang="de-CH" sz="1050" b="1" dirty="0"/>
-          </a:p>
-        </p:txBody>
-      </p:sp>
-      <p:sp>
-        <p:nvSpPr>
           <p:cNvPr id="8" name="Legende mit Linie 2 7"/>
           <p:cNvSpPr/>
           <p:nvPr/>
@@ -11071,7 +11026,7 @@
           <a:p>
             <a:r>
               <a:rPr lang="en-US" sz="1100" dirty="0" smtClean="0"/>
-              <a:t>V2.3: </a:t>
+              <a:t>V2.3, 2.4: </a:t>
             </a:r>
             <a:r>
               <a:rPr lang="en-US" sz="1100" dirty="0" err="1" smtClean="0"/>
@@ -11117,7 +11072,7 @@
       </p:grpSpPr>
       <p:pic>
         <p:nvPicPr>
-          <p:cNvPr id="3" name="Grafik 2"/>
+          <p:cNvPr id="10" name="Grafik 9"/>
           <p:cNvPicPr>
             <a:picLocks noChangeAspect="1"/>
           </p:cNvPicPr>
@@ -11131,8 +11086,8 @@
         </p:blipFill>
         <p:spPr>
           <a:xfrm>
-            <a:off x="1403648" y="1124742"/>
-            <a:ext cx="6192114" cy="5572903"/>
+            <a:off x="1416632" y="1142360"/>
+            <a:ext cx="6184231" cy="5565808"/>
           </a:xfrm>
           <a:prstGeom prst="rect">
             <a:avLst/>
@@ -11237,15 +11192,7 @@
           <a:p>
             <a:r>
               <a:rPr lang="en-US" sz="1200" dirty="0" smtClean="0"/>
-              <a:t>The tabs represent the joystick devices found connected to the PC also the number 1..8 shows the order the PC reports them which is crucial to the mapping as this will result in </a:t>
-            </a:r>
-            <a:r>
-              <a:rPr lang="en-US" sz="1200" dirty="0" smtClean="0"/>
-              <a:t>the default </a:t>
-            </a:r>
-            <a:r>
-              <a:rPr lang="en-US" sz="1200" dirty="0" smtClean="0"/>
-              <a:t>js_1, js_2 .. Names used to build the command name.</a:t>
+              <a:t>The tabs represent the joystick devices found connected to the PC also the number 1..8 shows the order the PC reports them which is crucial to the mapping as this will result in the default js_1, js_2 .. Names used to build the command name.</a:t>
             </a:r>
           </a:p>
           <a:p>
@@ -11256,6 +11203,38 @@
           </a:p>
           <a:p>
             <a:endParaRPr lang="en-US" sz="1200" dirty="0" smtClean="0"/>
+          </a:p>
+          <a:p>
+            <a:r>
+              <a:rPr lang="en-US" sz="1200" dirty="0" smtClean="0">
+                <a:solidFill>
+                  <a:schemeClr val="accent5">
+                    <a:lumMod val="75000"/>
+                  </a:schemeClr>
+                </a:solidFill>
+              </a:rPr>
+              <a:t>V 2.4: you will see the actual </a:t>
+            </a:r>
+            <a:r>
+              <a:rPr lang="en-US" sz="1200" dirty="0" err="1" smtClean="0">
+                <a:solidFill>
+                  <a:schemeClr val="accent5">
+                    <a:lumMod val="75000"/>
+                  </a:schemeClr>
+                </a:solidFill>
+              </a:rPr>
+              <a:t>Js</a:t>
+            </a:r>
+            <a:r>
+              <a:rPr lang="en-US" sz="1200" dirty="0" smtClean="0">
+                <a:solidFill>
+                  <a:schemeClr val="accent5">
+                    <a:lumMod val="75000"/>
+                  </a:schemeClr>
+                </a:solidFill>
+              </a:rPr>
+              <a:t> assignment  - or ‘not assigned’ – see page 17</a:t>
+            </a:r>
           </a:p>
           <a:p>
             <a:r>
@@ -11264,62 +11243,7 @@
                   <a:srgbClr val="00B050"/>
                 </a:solidFill>
               </a:rPr>
-              <a:t>V 2.3: </a:t>
-            </a:r>
-            <a:r>
-              <a:rPr lang="en-US" sz="1200" dirty="0" smtClean="0">
-                <a:solidFill>
-                  <a:srgbClr val="00B050"/>
-                </a:solidFill>
-              </a:rPr>
-              <a:t>you will see the actual </a:t>
-            </a:r>
-            <a:r>
-              <a:rPr lang="en-US" sz="1200" dirty="0" err="1" smtClean="0">
-                <a:solidFill>
-                  <a:srgbClr val="00B050"/>
-                </a:solidFill>
-              </a:rPr>
-              <a:t>Js</a:t>
-            </a:r>
-            <a:r>
-              <a:rPr lang="en-US" sz="1200" dirty="0" smtClean="0">
-                <a:solidFill>
-                  <a:srgbClr val="00B050"/>
-                </a:solidFill>
-              </a:rPr>
-              <a:t> assignment but it is not enabled to change it here.</a:t>
-            </a:r>
-            <a:br>
-              <a:rPr lang="en-US" sz="1200" dirty="0" smtClean="0">
-                <a:solidFill>
-                  <a:srgbClr val="00B050"/>
-                </a:solidFill>
-              </a:rPr>
-            </a:br>
-            <a:r>
-              <a:rPr lang="en-US" sz="1200" dirty="0" smtClean="0">
-                <a:solidFill>
-                  <a:srgbClr val="00B050"/>
-                </a:solidFill>
-              </a:rPr>
-              <a:t>The </a:t>
-            </a:r>
-            <a:r>
-              <a:rPr lang="en-US" sz="1200" dirty="0" smtClean="0">
-                <a:solidFill>
-                  <a:srgbClr val="00B050"/>
-                </a:solidFill>
-              </a:rPr>
-              <a:t>SC-Device to Joystick Mapping </a:t>
-            </a:r>
-            <a:r>
-              <a:rPr lang="en-US" sz="1200" dirty="0" smtClean="0">
-                <a:solidFill>
-                  <a:srgbClr val="00B050"/>
-                </a:solidFill>
-              </a:rPr>
-              <a:t>is a separate window accessed by hitting the ‘</a:t>
+              <a:t>The SC-Device to Joystick Mapping is a separate window accessed by hitting the ‘</a:t>
             </a:r>
             <a:r>
               <a:rPr lang="en-US" sz="1200" b="1" dirty="0" err="1" smtClean="0">
@@ -11345,11 +11269,6 @@
               </a:rPr>
               <a:t>’ button.</a:t>
             </a:r>
-            <a:endParaRPr lang="en-US" sz="1200" dirty="0" smtClean="0">
-              <a:solidFill>
-                <a:srgbClr val="00B050"/>
-              </a:solidFill>
-            </a:endParaRPr>
           </a:p>
           <a:p>
             <a:endParaRPr lang="en-US" sz="1200" dirty="0" smtClean="0"/>
@@ -11522,7 +11441,7 @@
       </p:grpSpPr>
       <p:pic>
         <p:nvPicPr>
-          <p:cNvPr id="9" name="Grafik 8"/>
+          <p:cNvPr id="3" name="Grafik 2"/>
           <p:cNvPicPr>
             <a:picLocks noChangeAspect="1"/>
           </p:cNvPicPr>
@@ -11536,7 +11455,7 @@
         </p:blipFill>
         <p:spPr>
           <a:xfrm>
-            <a:off x="1403648" y="1124744"/>
+            <a:off x="1403647" y="1124743"/>
             <a:ext cx="6197377" cy="5577639"/>
           </a:xfrm>
           <a:prstGeom prst="rect">
@@ -11786,7 +11705,7 @@
         </p:nvSpPr>
         <p:spPr>
           <a:xfrm>
-            <a:off x="1641139" y="4917104"/>
+            <a:off x="1691680" y="5229200"/>
             <a:ext cx="288032" cy="288032"/>
           </a:xfrm>
           <a:prstGeom prst="ellipse">
@@ -11828,7 +11747,7 @@
         </p:nvSpPr>
         <p:spPr>
           <a:xfrm rot="10800000">
-            <a:off x="2370847" y="2594984"/>
+            <a:off x="2370847" y="2492895"/>
             <a:ext cx="216024" cy="144016"/>
           </a:xfrm>
           <a:prstGeom prst="rightArrow">
@@ -11914,7 +11833,7 @@
       </p:grpSpPr>
       <p:pic>
         <p:nvPicPr>
-          <p:cNvPr id="5" name="Grafik 4"/>
+          <p:cNvPr id="3" name="Grafik 2"/>
           <p:cNvPicPr>
             <a:picLocks noChangeAspect="1"/>
           </p:cNvPicPr>
@@ -11928,7 +11847,7 @@
         </p:blipFill>
         <p:spPr>
           <a:xfrm>
-            <a:off x="1399952" y="1124742"/>
+            <a:off x="1399951" y="1124742"/>
             <a:ext cx="6197377" cy="5577639"/>
           </a:xfrm>
           <a:prstGeom prst="rect">
@@ -12167,7 +12086,7 @@
         </p:nvSpPr>
         <p:spPr>
           <a:xfrm>
-            <a:off x="1643736" y="5397280"/>
+            <a:off x="1643736" y="5301208"/>
             <a:ext cx="288032" cy="288032"/>
           </a:xfrm>
           <a:prstGeom prst="ellipse">
@@ -12233,7 +12152,7 @@
       </p:grpSpPr>
       <p:pic>
         <p:nvPicPr>
-          <p:cNvPr id="3" name="Grafik 2"/>
+          <p:cNvPr id="7" name="Grafik 6"/>
           <p:cNvPicPr>
             <a:picLocks noChangeAspect="1"/>
           </p:cNvPicPr>
@@ -12247,8 +12166,8 @@
         </p:blipFill>
         <p:spPr>
           <a:xfrm>
-            <a:off x="1391771" y="1124744"/>
-            <a:ext cx="6197376" cy="5577639"/>
+            <a:off x="1399951" y="1124742"/>
+            <a:ext cx="6197377" cy="5577639"/>
           </a:xfrm>
           <a:prstGeom prst="rect">
             <a:avLst/>

</xml_diff>

<commit_message>
support option tags #18 support version and ignoreversion, can force ignoreversion does not longer dump empty maps supported actionmaps are preset in config file (instead of code) Doc Update
</commit_message>
<xml_diff>
--- a/doc/SCJMapper_QGuide.pptx
+++ b/doc/SCJMapper_QGuide.pptx
@@ -22,7 +22,8 @@
     <p:sldId id="272" r:id="rId16"/>
     <p:sldId id="271" r:id="rId17"/>
     <p:sldId id="274" r:id="rId18"/>
-    <p:sldId id="266" r:id="rId19"/>
+    <p:sldId id="275" r:id="rId19"/>
+    <p:sldId id="266" r:id="rId20"/>
   </p:sldIdLst>
   <p:sldSz cx="9144000" cy="6858000" type="screen4x3"/>
   <p:notesSz cx="6858000" cy="9144000"/>
@@ -321,7 +322,7 @@
           <a:p>
             <a:fld id="{1BA50D42-C9CD-4801-B293-61D1F53EC57E}" type="datetimeFigureOut">
               <a:rPr lang="de-DE" smtClean="0"/>
-              <a:t>14.09.2014</a:t>
+              <a:t>20.09.2014</a:t>
             </a:fld>
             <a:endParaRPr lang="de-DE"/>
           </a:p>
@@ -486,7 +487,7 @@
           <a:p>
             <a:fld id="{1BA50D42-C9CD-4801-B293-61D1F53EC57E}" type="datetimeFigureOut">
               <a:rPr lang="de-DE" smtClean="0"/>
-              <a:t>14.09.2014</a:t>
+              <a:t>20.09.2014</a:t>
             </a:fld>
             <a:endParaRPr lang="de-DE"/>
           </a:p>
@@ -661,7 +662,7 @@
           <a:p>
             <a:fld id="{1BA50D42-C9CD-4801-B293-61D1F53EC57E}" type="datetimeFigureOut">
               <a:rPr lang="de-DE" smtClean="0"/>
-              <a:t>14.09.2014</a:t>
+              <a:t>20.09.2014</a:t>
             </a:fld>
             <a:endParaRPr lang="de-DE"/>
           </a:p>
@@ -826,7 +827,7 @@
           <a:p>
             <a:fld id="{1BA50D42-C9CD-4801-B293-61D1F53EC57E}" type="datetimeFigureOut">
               <a:rPr lang="de-DE" smtClean="0"/>
-              <a:t>14.09.2014</a:t>
+              <a:t>20.09.2014</a:t>
             </a:fld>
             <a:endParaRPr lang="de-DE"/>
           </a:p>
@@ -1067,7 +1068,7 @@
           <a:p>
             <a:fld id="{1BA50D42-C9CD-4801-B293-61D1F53EC57E}" type="datetimeFigureOut">
               <a:rPr lang="de-DE" smtClean="0"/>
-              <a:t>14.09.2014</a:t>
+              <a:t>20.09.2014</a:t>
             </a:fld>
             <a:endParaRPr lang="de-DE"/>
           </a:p>
@@ -1350,7 +1351,7 @@
           <a:p>
             <a:fld id="{1BA50D42-C9CD-4801-B293-61D1F53EC57E}" type="datetimeFigureOut">
               <a:rPr lang="de-DE" smtClean="0"/>
-              <a:t>14.09.2014</a:t>
+              <a:t>20.09.2014</a:t>
             </a:fld>
             <a:endParaRPr lang="de-DE"/>
           </a:p>
@@ -1767,7 +1768,7 @@
           <a:p>
             <a:fld id="{1BA50D42-C9CD-4801-B293-61D1F53EC57E}" type="datetimeFigureOut">
               <a:rPr lang="de-DE" smtClean="0"/>
-              <a:t>14.09.2014</a:t>
+              <a:t>20.09.2014</a:t>
             </a:fld>
             <a:endParaRPr lang="de-DE"/>
           </a:p>
@@ -1880,7 +1881,7 @@
           <a:p>
             <a:fld id="{1BA50D42-C9CD-4801-B293-61D1F53EC57E}" type="datetimeFigureOut">
               <a:rPr lang="de-DE" smtClean="0"/>
-              <a:t>14.09.2014</a:t>
+              <a:t>20.09.2014</a:t>
             </a:fld>
             <a:endParaRPr lang="de-DE"/>
           </a:p>
@@ -1970,7 +1971,7 @@
           <a:p>
             <a:fld id="{1BA50D42-C9CD-4801-B293-61D1F53EC57E}" type="datetimeFigureOut">
               <a:rPr lang="de-DE" smtClean="0"/>
-              <a:t>14.09.2014</a:t>
+              <a:t>20.09.2014</a:t>
             </a:fld>
             <a:endParaRPr lang="de-DE"/>
           </a:p>
@@ -2242,7 +2243,7 @@
           <a:p>
             <a:fld id="{1BA50D42-C9CD-4801-B293-61D1F53EC57E}" type="datetimeFigureOut">
               <a:rPr lang="de-DE" smtClean="0"/>
-              <a:t>14.09.2014</a:t>
+              <a:t>20.09.2014</a:t>
             </a:fld>
             <a:endParaRPr lang="de-DE"/>
           </a:p>
@@ -2490,7 +2491,7 @@
           <a:p>
             <a:fld id="{1BA50D42-C9CD-4801-B293-61D1F53EC57E}" type="datetimeFigureOut">
               <a:rPr lang="de-DE" smtClean="0"/>
-              <a:t>14.09.2014</a:t>
+              <a:t>20.09.2014</a:t>
             </a:fld>
             <a:endParaRPr lang="de-DE"/>
           </a:p>
@@ -2698,7 +2699,7 @@
           <a:p>
             <a:fld id="{1BA50D42-C9CD-4801-B293-61D1F53EC57E}" type="datetimeFigureOut">
               <a:rPr lang="de-DE" smtClean="0"/>
-              <a:t>14.09.2014</a:t>
+              <a:t>20.09.2014</a:t>
             </a:fld>
             <a:endParaRPr lang="de-DE"/>
           </a:p>
@@ -3070,7 +3071,7 @@
       </p:grpSpPr>
       <p:pic>
         <p:nvPicPr>
-          <p:cNvPr id="7" name="Grafik 6"/>
+          <p:cNvPr id="4" name="Grafik 3"/>
           <p:cNvPicPr>
             <a:picLocks noChangeAspect="1"/>
           </p:cNvPicPr>
@@ -3084,8 +3085,8 @@
         </p:blipFill>
         <p:spPr>
           <a:xfrm>
-            <a:off x="5805028" y="3767923"/>
-            <a:ext cx="3219109" cy="2897198"/>
+            <a:off x="5811883" y="3767923"/>
+            <a:ext cx="3212253" cy="2891028"/>
           </a:xfrm>
           <a:prstGeom prst="rect">
             <a:avLst/>
@@ -3118,7 +3119,11 @@
             </a:br>
             <a:r>
               <a:rPr lang="en-US" sz="4000" dirty="0" smtClean="0"/>
-              <a:t>Quick Reference Guide  V 2.4</a:t>
+              <a:t>Quick Reference Guide  V </a:t>
+            </a:r>
+            <a:r>
+              <a:rPr lang="en-US" sz="4000" dirty="0" smtClean="0"/>
+              <a:t>2.5</a:t>
             </a:r>
             <a:endParaRPr lang="en-US" sz="4000" dirty="0"/>
           </a:p>
@@ -3148,7 +3153,11 @@
           <a:p>
             <a:r>
               <a:rPr lang="en-US" sz="900" dirty="0" smtClean="0"/>
-              <a:t>20140914 – Cassini</a:t>
+              <a:t>20140920 </a:t>
+            </a:r>
+            <a:r>
+              <a:rPr lang="en-US" sz="900" dirty="0" smtClean="0"/>
+              <a:t>– Cassini</a:t>
             </a:r>
           </a:p>
           <a:p>
@@ -5506,6 +5515,30 @@
           </a:p>
         </p:txBody>
       </p:sp>
+      <p:pic>
+        <p:nvPicPr>
+          <p:cNvPr id="4" name="Grafik 3"/>
+          <p:cNvPicPr>
+            <a:picLocks noChangeAspect="1"/>
+          </p:cNvPicPr>
+          <p:nvPr/>
+        </p:nvPicPr>
+        <p:blipFill>
+          <a:blip r:embed="rId3"/>
+          <a:stretch>
+            <a:fillRect/>
+          </a:stretch>
+        </p:blipFill>
+        <p:spPr>
+          <a:xfrm>
+            <a:off x="5076056" y="3395631"/>
+            <a:ext cx="3840286" cy="2101867"/>
+          </a:xfrm>
+          <a:prstGeom prst="rect">
+            <a:avLst/>
+          </a:prstGeom>
+        </p:spPr>
+      </p:pic>
       <p:sp>
         <p:nvSpPr>
           <p:cNvPr id="9" name="Pfeil nach rechts 8"/>
@@ -5577,30 +5610,6 @@
           </a:fontRef>
         </p:style>
       </p:cxnSp>
-      <p:pic>
-        <p:nvPicPr>
-          <p:cNvPr id="13" name="Grafik 12"/>
-          <p:cNvPicPr>
-            <a:picLocks noChangeAspect="1"/>
-          </p:cNvPicPr>
-          <p:nvPr/>
-        </p:nvPicPr>
-        <p:blipFill>
-          <a:blip r:embed="rId3"/>
-          <a:stretch>
-            <a:fillRect/>
-          </a:stretch>
-        </p:blipFill>
-        <p:spPr>
-          <a:xfrm>
-            <a:off x="4405016" y="3379755"/>
-            <a:ext cx="4511326" cy="2134778"/>
-          </a:xfrm>
-          <a:prstGeom prst="rect">
-            <a:avLst/>
-          </a:prstGeom>
-        </p:spPr>
-      </p:pic>
       <p:sp>
         <p:nvSpPr>
           <p:cNvPr id="20" name="Pfeil nach rechts 19"/>
@@ -5609,7 +5618,7 @@
         </p:nvSpPr>
         <p:spPr>
           <a:xfrm>
-            <a:off x="4217976" y="3688884"/>
+            <a:off x="4728801" y="3628553"/>
             <a:ext cx="504056" cy="285009"/>
           </a:xfrm>
           <a:prstGeom prst="rightArrow">
@@ -5647,7 +5656,7 @@
         </p:nvSpPr>
         <p:spPr>
           <a:xfrm>
-            <a:off x="4152988" y="4941168"/>
+            <a:off x="4650401" y="4725144"/>
             <a:ext cx="504056" cy="285009"/>
           </a:xfrm>
           <a:prstGeom prst="rightArrow">
@@ -5792,7 +5801,31 @@
                   <a:schemeClr val="accent4"/>
                 </a:solidFill>
               </a:rPr>
-              <a:t>V2.2 – Features</a:t>
+              <a:t>V2.2, </a:t>
+            </a:r>
+            <a:r>
+              <a:rPr lang="en-US" dirty="0" smtClean="0">
+                <a:solidFill>
+                  <a:schemeClr val="accent2"/>
+                </a:solidFill>
+              </a:rPr>
+              <a:t>2.5</a:t>
+            </a:r>
+            <a:r>
+              <a:rPr lang="en-US" dirty="0" smtClean="0">
+                <a:solidFill>
+                  <a:schemeClr val="accent4"/>
+                </a:solidFill>
+              </a:rPr>
+              <a:t> </a:t>
+            </a:r>
+            <a:r>
+              <a:rPr lang="en-US" dirty="0" smtClean="0">
+                <a:solidFill>
+                  <a:schemeClr val="accent4"/>
+                </a:solidFill>
+              </a:rPr>
+              <a:t>– Features</a:t>
             </a:r>
             <a:endParaRPr lang="en-US" dirty="0">
               <a:solidFill>
@@ -6015,23 +6048,183 @@
           <a:p>
             <a:r>
               <a:rPr lang="en-US" sz="1200" dirty="0" smtClean="0"/>
-              <a:t>Just uncheck any to </a:t>
-            </a:r>
-            <a:r>
-              <a:rPr lang="en-US" sz="1200" smtClean="0"/>
-              <a:t>use it again</a:t>
+              <a:t>Just uncheck any to use it again</a:t>
             </a:r>
             <a:r>
               <a:rPr lang="en-US" sz="1200" dirty="0" smtClean="0"/>
               <a:t>.</a:t>
             </a:r>
+          </a:p>
+          <a:p>
+            <a:endParaRPr lang="en-US" sz="1200" dirty="0"/>
+          </a:p>
+          <a:p>
+            <a:r>
+              <a:rPr lang="en-US" sz="1200" dirty="0" smtClean="0">
+                <a:solidFill>
+                  <a:schemeClr val="accent2"/>
+                </a:solidFill>
+              </a:rPr>
+              <a:t>V2.5 New option to force ‘</a:t>
+            </a:r>
+            <a:r>
+              <a:rPr lang="en-US" sz="1200" dirty="0" err="1" smtClean="0">
+                <a:solidFill>
+                  <a:schemeClr val="accent2"/>
+                </a:solidFill>
+              </a:rPr>
+              <a:t>ignoreversion</a:t>
+            </a:r>
+            <a:r>
+              <a:rPr lang="en-US" sz="1200" dirty="0" smtClean="0">
+                <a:solidFill>
+                  <a:schemeClr val="accent2"/>
+                </a:solidFill>
+              </a:rPr>
+              <a:t>=“1”’</a:t>
+            </a:r>
+          </a:p>
+          <a:p>
+            <a:endParaRPr lang="en-US" sz="1200" dirty="0" smtClean="0"/>
+          </a:p>
+          <a:p>
+            <a:r>
+              <a:rPr lang="en-US" sz="1200" dirty="0" smtClean="0"/>
+              <a:t>If you wish to use </a:t>
+            </a:r>
+            <a:r>
+              <a:rPr lang="en-US" sz="1200" dirty="0" smtClean="0"/>
+              <a:t>the </a:t>
+            </a:r>
+            <a:r>
+              <a:rPr lang="en-US" sz="1200" dirty="0" err="1" smtClean="0"/>
+              <a:t>ignoreversion</a:t>
+            </a:r>
+            <a:r>
+              <a:rPr lang="en-US" sz="1200" dirty="0" smtClean="0"/>
+              <a:t> attribute rather</a:t>
+            </a:r>
+          </a:p>
+          <a:p>
+            <a:r>
+              <a:rPr lang="en-US" sz="1200" dirty="0" smtClean="0"/>
+              <a:t>than any version=“n” ..</a:t>
+            </a:r>
+          </a:p>
+          <a:p>
+            <a:r>
+              <a:rPr lang="en-US" sz="1200" dirty="0" smtClean="0"/>
+              <a:t>The </a:t>
+            </a:r>
+            <a:r>
+              <a:rPr lang="en-US" sz="1200" dirty="0" err="1" smtClean="0"/>
+              <a:t>prog</a:t>
+            </a:r>
+            <a:r>
+              <a:rPr lang="en-US" sz="1200" dirty="0" smtClean="0"/>
+              <a:t> is able to handle it now. Either type e.g.</a:t>
+            </a:r>
+          </a:p>
+          <a:p>
+            <a:r>
+              <a:rPr lang="en-US" sz="1200" dirty="0" smtClean="0"/>
+              <a:t>‘version=“0”’ or </a:t>
+            </a:r>
+            <a:r>
+              <a:rPr lang="en-US" sz="1200" dirty="0">
+                <a:solidFill>
+                  <a:schemeClr val="accent2"/>
+                </a:solidFill>
+              </a:rPr>
+              <a:t>‘</a:t>
+            </a:r>
+            <a:r>
+              <a:rPr lang="en-US" sz="1200" dirty="0" err="1">
+                <a:solidFill>
+                  <a:schemeClr val="accent2"/>
+                </a:solidFill>
+              </a:rPr>
+              <a:t>ignoreversion</a:t>
+            </a:r>
+            <a:r>
+              <a:rPr lang="en-US" sz="1200" dirty="0">
+                <a:solidFill>
+                  <a:schemeClr val="accent2"/>
+                </a:solidFill>
+              </a:rPr>
+              <a:t>=“1”’</a:t>
+            </a:r>
+          </a:p>
+          <a:p>
+            <a:r>
+              <a:rPr lang="en-US" sz="1200" dirty="0" smtClean="0"/>
+              <a:t>Into the </a:t>
+            </a:r>
+            <a:r>
+              <a:rPr lang="en-US" sz="1200" dirty="0" err="1" smtClean="0"/>
+              <a:t>ActionMaps</a:t>
+            </a:r>
+            <a:r>
+              <a:rPr lang="en-US" sz="1200" dirty="0" smtClean="0"/>
+              <a:t> Tag and the </a:t>
+            </a:r>
+            <a:r>
+              <a:rPr lang="en-US" sz="1200" dirty="0" err="1" smtClean="0"/>
+              <a:t>prog</a:t>
+            </a:r>
+            <a:r>
+              <a:rPr lang="en-US" sz="1200" dirty="0" smtClean="0"/>
+              <a:t> will maintain </a:t>
+            </a:r>
+          </a:p>
+          <a:p>
+            <a:r>
+              <a:rPr lang="en-US" sz="1200" dirty="0" smtClean="0"/>
+              <a:t>it as you typed it.</a:t>
+            </a:r>
+          </a:p>
+          <a:p>
+            <a:r>
+              <a:rPr lang="en-US" sz="1200" dirty="0" smtClean="0"/>
+              <a:t>Or just force it to use </a:t>
+            </a:r>
+            <a:r>
+              <a:rPr lang="en-US" sz="1200" dirty="0">
+                <a:solidFill>
+                  <a:schemeClr val="accent2"/>
+                </a:solidFill>
+              </a:rPr>
+              <a:t>‘</a:t>
+            </a:r>
+            <a:r>
+              <a:rPr lang="en-US" sz="1200" dirty="0" err="1">
+                <a:solidFill>
+                  <a:schemeClr val="accent2"/>
+                </a:solidFill>
+              </a:rPr>
+              <a:t>ignoreversion</a:t>
+            </a:r>
+            <a:r>
+              <a:rPr lang="en-US" sz="1200" dirty="0">
+                <a:solidFill>
+                  <a:schemeClr val="accent2"/>
+                </a:solidFill>
+              </a:rPr>
+              <a:t>=“1”’</a:t>
+            </a:r>
+          </a:p>
+          <a:p>
+            <a:r>
+              <a:rPr lang="en-US" sz="1200" dirty="0" smtClean="0"/>
+              <a:t>by checking the box here</a:t>
+            </a:r>
             <a:endParaRPr lang="en-US" sz="1200" dirty="0"/>
           </a:p>
         </p:txBody>
       </p:sp>
       <p:pic>
         <p:nvPicPr>
-          <p:cNvPr id="3" name="Grafik 2"/>
+          <p:cNvPr id="11" name="Grafik 10"/>
           <p:cNvPicPr>
             <a:picLocks noChangeAspect="1"/>
           </p:cNvPicPr>
@@ -6045,8 +6238,8 @@
         </p:blipFill>
         <p:spPr>
           <a:xfrm>
-            <a:off x="4093915" y="3558886"/>
-            <a:ext cx="4511326" cy="2134778"/>
+            <a:off x="4072536" y="3187722"/>
+            <a:ext cx="4532705" cy="2480842"/>
           </a:xfrm>
           <a:prstGeom prst="rect">
             <a:avLst/>
@@ -6061,8 +6254,8 @@
         </p:nvSpPr>
         <p:spPr>
           <a:xfrm flipV="1">
-            <a:off x="7020271" y="3717031"/>
-            <a:ext cx="1529743" cy="1729705"/>
+            <a:off x="7020271" y="3283470"/>
+            <a:ext cx="1529743" cy="2161753"/>
           </a:xfrm>
           <a:prstGeom prst="rect">
             <a:avLst/>
@@ -6105,7 +6298,45 @@
         </p:nvSpPr>
         <p:spPr>
           <a:xfrm rot="2892402">
-            <a:off x="6682412" y="3522592"/>
+            <a:off x="6682412" y="3089032"/>
+            <a:ext cx="504056" cy="285009"/>
+          </a:xfrm>
+          <a:prstGeom prst="rightArrow">
+            <a:avLst/>
+          </a:prstGeom>
+        </p:spPr>
+        <p:style>
+          <a:lnRef idx="1">
+            <a:schemeClr val="accent2"/>
+          </a:lnRef>
+          <a:fillRef idx="2">
+            <a:schemeClr val="accent2"/>
+          </a:fillRef>
+          <a:effectRef idx="1">
+            <a:schemeClr val="accent2"/>
+          </a:effectRef>
+          <a:fontRef idx="minor">
+            <a:schemeClr val="dk1"/>
+          </a:fontRef>
+        </p:style>
+        <p:txBody>
+          <a:bodyPr rtlCol="0" anchor="ctr"/>
+          <a:lstStyle/>
+          <a:p>
+            <a:pPr algn="ctr"/>
+            <a:endParaRPr lang="de-CH"/>
+          </a:p>
+        </p:txBody>
+      </p:sp>
+      <p:sp>
+        <p:nvSpPr>
+          <p:cNvPr id="12" name="Pfeil nach rechts 11"/>
+          <p:cNvSpPr/>
+          <p:nvPr/>
+        </p:nvSpPr>
+        <p:spPr>
+          <a:xfrm rot="2892402">
+            <a:off x="3773071" y="4793504"/>
             <a:ext cx="504056" cy="285009"/>
           </a:xfrm>
           <a:prstGeom prst="rightArrow">
@@ -6655,6 +6886,331 @@
           <a:chExt cx="0" cy="0"/>
         </a:xfrm>
       </p:grpSpPr>
+      <p:pic>
+        <p:nvPicPr>
+          <p:cNvPr id="11" name="Grafik 10"/>
+          <p:cNvPicPr>
+            <a:picLocks noChangeAspect="1"/>
+          </p:cNvPicPr>
+          <p:nvPr/>
+        </p:nvPicPr>
+        <p:blipFill>
+          <a:blip r:embed="rId2"/>
+          <a:stretch>
+            <a:fillRect/>
+          </a:stretch>
+        </p:blipFill>
+        <p:spPr>
+          <a:xfrm>
+            <a:off x="1416632" y="1135397"/>
+            <a:ext cx="6184231" cy="5565807"/>
+          </a:xfrm>
+          <a:prstGeom prst="rect">
+            <a:avLst/>
+          </a:prstGeom>
+        </p:spPr>
+      </p:pic>
+      <p:sp>
+        <p:nvSpPr>
+          <p:cNvPr id="2" name="Titel 1"/>
+          <p:cNvSpPr>
+            <a:spLocks noGrp="1"/>
+          </p:cNvSpPr>
+          <p:nvPr>
+            <p:ph type="title"/>
+          </p:nvPr>
+        </p:nvSpPr>
+        <p:spPr/>
+        <p:txBody>
+          <a:bodyPr/>
+          <a:lstStyle/>
+          <a:p>
+            <a:r>
+              <a:rPr lang="en-US" dirty="0" smtClean="0">
+                <a:solidFill>
+                  <a:schemeClr val="accent2"/>
+                </a:solidFill>
+              </a:rPr>
+              <a:t>V2.5 </a:t>
+            </a:r>
+            <a:r>
+              <a:rPr lang="en-US" dirty="0" smtClean="0">
+                <a:solidFill>
+                  <a:schemeClr val="accent2"/>
+                </a:solidFill>
+              </a:rPr>
+              <a:t>– Features</a:t>
+            </a:r>
+            <a:endParaRPr lang="en-US" dirty="0">
+              <a:solidFill>
+                <a:schemeClr val="accent2"/>
+              </a:solidFill>
+            </a:endParaRPr>
+          </a:p>
+        </p:txBody>
+      </p:sp>
+      <p:sp>
+        <p:nvSpPr>
+          <p:cNvPr id="18" name="Rechteck 17"/>
+          <p:cNvSpPr/>
+          <p:nvPr/>
+        </p:nvSpPr>
+        <p:spPr>
+          <a:xfrm>
+            <a:off x="626250" y="1380291"/>
+            <a:ext cx="4541031" cy="4857021"/>
+          </a:xfrm>
+          <a:prstGeom prst="rect">
+            <a:avLst/>
+          </a:prstGeom>
+        </p:spPr>
+        <p:style>
+          <a:lnRef idx="2">
+            <a:schemeClr val="accent5"/>
+          </a:lnRef>
+          <a:fillRef idx="1">
+            <a:schemeClr val="lt1"/>
+          </a:fillRef>
+          <a:effectRef idx="0">
+            <a:schemeClr val="accent5"/>
+          </a:effectRef>
+          <a:fontRef idx="minor">
+            <a:schemeClr val="dk1"/>
+          </a:fontRef>
+        </p:style>
+        <p:txBody>
+          <a:bodyPr rtlCol="0" anchor="t" anchorCtr="0"/>
+          <a:lstStyle/>
+          <a:p>
+            <a:r>
+              <a:rPr lang="en-US" sz="1200" b="1" dirty="0" smtClean="0"/>
+              <a:t>New possibility </a:t>
+            </a:r>
+            <a:r>
+              <a:rPr lang="en-US" sz="1200" b="1" dirty="0" smtClean="0"/>
+              <a:t>– support for options</a:t>
+            </a:r>
+            <a:endParaRPr lang="en-US" sz="1200" b="1" dirty="0" smtClean="0"/>
+          </a:p>
+          <a:p>
+            <a:endParaRPr lang="en-US" sz="1200" dirty="0"/>
+          </a:p>
+          <a:p>
+            <a:r>
+              <a:rPr lang="en-US" sz="1200" dirty="0" smtClean="0"/>
+              <a:t>The </a:t>
+            </a:r>
+            <a:r>
+              <a:rPr lang="en-US" sz="1200" dirty="0" err="1" smtClean="0"/>
+              <a:t>prog</a:t>
+            </a:r>
+            <a:r>
+              <a:rPr lang="en-US" sz="1200" dirty="0" smtClean="0"/>
+              <a:t> will now maintain the following 3 XML tags </a:t>
+            </a:r>
+          </a:p>
+          <a:p>
+            <a:pPr marL="171450" indent="-171450">
+              <a:buFont typeface="Arial" panose="020B0604020202020204" pitchFamily="34" charset="0"/>
+              <a:buChar char="•"/>
+            </a:pPr>
+            <a:r>
+              <a:rPr lang="de-CH" sz="1200" dirty="0" smtClean="0"/>
+              <a:t>&lt;</a:t>
+            </a:r>
+            <a:r>
+              <a:rPr lang="de-CH" sz="1200" dirty="0" err="1" smtClean="0"/>
+              <a:t>CustomisationUIHeader</a:t>
+            </a:r>
+            <a:r>
+              <a:rPr lang="de-CH" sz="1200" dirty="0" smtClean="0"/>
+              <a:t> …&gt;</a:t>
+            </a:r>
+          </a:p>
+          <a:p>
+            <a:pPr marL="171450" indent="-171450">
+              <a:buFont typeface="Arial" panose="020B0604020202020204" pitchFamily="34" charset="0"/>
+              <a:buChar char="•"/>
+            </a:pPr>
+            <a:r>
+              <a:rPr lang="de-CH" sz="1200" dirty="0" smtClean="0"/>
+              <a:t>&lt;</a:t>
+            </a:r>
+            <a:r>
+              <a:rPr lang="de-CH" sz="1200" dirty="0" err="1" smtClean="0"/>
+              <a:t>options</a:t>
+            </a:r>
+            <a:r>
+              <a:rPr lang="de-CH" sz="1200" dirty="0" smtClean="0"/>
+              <a:t> …&gt;</a:t>
+            </a:r>
+          </a:p>
+          <a:p>
+            <a:pPr marL="171450" indent="-171450">
+              <a:buFont typeface="Arial" panose="020B0604020202020204" pitchFamily="34" charset="0"/>
+              <a:buChar char="•"/>
+            </a:pPr>
+            <a:r>
+              <a:rPr lang="de-CH" sz="1200" dirty="0" smtClean="0"/>
+              <a:t>&lt;</a:t>
+            </a:r>
+            <a:r>
+              <a:rPr lang="de-CH" sz="1200" dirty="0" err="1" smtClean="0"/>
+              <a:t>deviceoptions</a:t>
+            </a:r>
+            <a:r>
+              <a:rPr lang="de-CH" sz="1200" dirty="0" smtClean="0"/>
+              <a:t> …&gt;</a:t>
+            </a:r>
+          </a:p>
+          <a:p>
+            <a:endParaRPr lang="en-US" sz="1200" dirty="0"/>
+          </a:p>
+          <a:p>
+            <a:r>
+              <a:rPr lang="en-US" sz="1200" dirty="0" smtClean="0"/>
+              <a:t>You may copy and paste or type whatever of those 3 tags you want to use – the program will maintain your typing and also read it from the mapping file when it is already there.</a:t>
+            </a:r>
+          </a:p>
+          <a:p>
+            <a:endParaRPr lang="en-US" sz="1200" dirty="0"/>
+          </a:p>
+          <a:p>
+            <a:r>
+              <a:rPr lang="en-US" sz="1200" i="1" dirty="0" smtClean="0"/>
+              <a:t>Note: There is no support to get proper options or let you interactively design those tags (sorry I know too little about all useful possibilities)</a:t>
+            </a:r>
+          </a:p>
+          <a:p>
+            <a:endParaRPr lang="en-US" sz="1200" dirty="0" smtClean="0"/>
+          </a:p>
+          <a:p>
+            <a:r>
+              <a:rPr lang="en-US" sz="1200" dirty="0" smtClean="0"/>
+              <a:t>The program stores the tags as plain string and will not do anything but get them in and out again. Some pretty printing is applied.</a:t>
+            </a:r>
+          </a:p>
+          <a:p>
+            <a:endParaRPr lang="en-US" sz="1200" dirty="0"/>
+          </a:p>
+          <a:p>
+            <a:r>
+              <a:rPr lang="en-US" sz="1200" dirty="0" smtClean="0"/>
+              <a:t>Hint: </a:t>
+            </a:r>
+          </a:p>
+          <a:p>
+            <a:r>
+              <a:rPr lang="en-US" sz="1200" dirty="0" smtClean="0"/>
+              <a:t>copy and just paste them into the editor – easy</a:t>
+            </a:r>
+          </a:p>
+          <a:p>
+            <a:r>
+              <a:rPr lang="en-US" sz="1200" dirty="0" smtClean="0"/>
+              <a:t>Or load your modified mapping – the </a:t>
+            </a:r>
+            <a:r>
+              <a:rPr lang="en-US" sz="1200" dirty="0" err="1" smtClean="0"/>
+              <a:t>prog</a:t>
+            </a:r>
+            <a:r>
+              <a:rPr lang="en-US" sz="1200" dirty="0" smtClean="0"/>
+              <a:t> should maintain them</a:t>
+            </a:r>
+          </a:p>
+          <a:p>
+            <a:r>
+              <a:rPr lang="en-US" sz="1200" dirty="0" smtClean="0"/>
+              <a:t>(testing by looking into the file the first time would </a:t>
+            </a:r>
+            <a:r>
+              <a:rPr lang="en-US" sz="1200" smtClean="0"/>
+              <a:t>be sensible…)</a:t>
+            </a:r>
+          </a:p>
+          <a:p>
+            <a:endParaRPr lang="en-US" sz="1200" dirty="0"/>
+          </a:p>
+          <a:p>
+            <a:endParaRPr lang="en-US" sz="1200" dirty="0"/>
+          </a:p>
+        </p:txBody>
+      </p:sp>
+      <p:sp>
+        <p:nvSpPr>
+          <p:cNvPr id="12" name="Rechteck 11"/>
+          <p:cNvSpPr/>
+          <p:nvPr/>
+        </p:nvSpPr>
+        <p:spPr>
+          <a:xfrm flipV="1">
+            <a:off x="5167282" y="2060847"/>
+            <a:ext cx="2357046" cy="576064"/>
+          </a:xfrm>
+          <a:prstGeom prst="rect">
+            <a:avLst/>
+          </a:prstGeom>
+          <a:noFill/>
+          <a:ln w="57150">
+            <a:solidFill>
+              <a:schemeClr val="accent2"/>
+            </a:solidFill>
+          </a:ln>
+        </p:spPr>
+        <p:style>
+          <a:lnRef idx="2">
+            <a:schemeClr val="accent3"/>
+          </a:lnRef>
+          <a:fillRef idx="1">
+            <a:schemeClr val="lt1"/>
+          </a:fillRef>
+          <a:effectRef idx="0">
+            <a:schemeClr val="accent3"/>
+          </a:effectRef>
+          <a:fontRef idx="minor">
+            <a:schemeClr val="dk1"/>
+          </a:fontRef>
+        </p:style>
+        <p:txBody>
+          <a:bodyPr rtlCol="0" anchor="ctr"/>
+          <a:lstStyle/>
+          <a:p>
+            <a:pPr algn="ctr"/>
+            <a:endParaRPr lang="de-CH"/>
+          </a:p>
+        </p:txBody>
+      </p:sp>
+    </p:spTree>
+    <p:extLst>
+      <p:ext uri="{BB962C8B-B14F-4D97-AF65-F5344CB8AC3E}">
+        <p14:creationId xmlns:p14="http://schemas.microsoft.com/office/powerpoint/2010/main" val="427816536"/>
+      </p:ext>
+    </p:extLst>
+  </p:cSld>
+  <p:clrMapOvr>
+    <a:masterClrMapping/>
+  </p:clrMapOvr>
+</p:sld>
+</file>
+
+<file path=ppt/slides/slide19.xml><?xml version="1.0" encoding="utf-8"?>
+<p:sld xmlns:a="http://schemas.openxmlformats.org/drawingml/2006/main" xmlns:r="http://schemas.openxmlformats.org/officeDocument/2006/relationships" xmlns:p="http://schemas.openxmlformats.org/presentationml/2006/main">
+  <p:cSld>
+    <p:spTree>
+      <p:nvGrpSpPr>
+        <p:cNvPr id="1" name=""/>
+        <p:cNvGrpSpPr/>
+        <p:nvPr/>
+      </p:nvGrpSpPr>
+      <p:grpSpPr>
+        <a:xfrm>
+          <a:off x="0" y="0"/>
+          <a:ext cx="0" cy="0"/>
+          <a:chOff x="0" y="0"/>
+          <a:chExt cx="0" cy="0"/>
+        </a:xfrm>
+      </p:grpSpPr>
       <p:sp>
         <p:nvSpPr>
           <p:cNvPr id="4" name="Titel 3"/>
@@ -9390,7 +9946,11 @@
           <a:p>
             <a:r>
               <a:rPr lang="en-US" dirty="0" smtClean="0"/>
-              <a:t>Updating from V 2.x to V 2.4:</a:t>
+              <a:t>Updating from V 2.x to V </a:t>
+            </a:r>
+            <a:r>
+              <a:rPr lang="en-US" dirty="0" smtClean="0"/>
+              <a:t>2.5:</a:t>
             </a:r>
             <a:endParaRPr lang="de-CH" dirty="0"/>
           </a:p>
@@ -9801,8 +10361,45 @@
                   <a:schemeClr val="accent4"/>
                 </a:solidFill>
               </a:rPr>
-              <a:t>V2.2 new features</a:t>
-            </a:r>
+              <a:t>V2.2 new </a:t>
+            </a:r>
+            <a:r>
+              <a:rPr lang="en-US" sz="2400" dirty="0" smtClean="0">
+                <a:solidFill>
+                  <a:schemeClr val="accent4"/>
+                </a:solidFill>
+              </a:rPr>
+              <a:t>features</a:t>
+            </a:r>
+            <a:r>
+              <a:rPr lang="en-US" sz="2400" dirty="0">
+                <a:solidFill>
+                  <a:schemeClr val="accent2"/>
+                </a:solidFill>
+              </a:rPr>
+              <a:t> + </a:t>
+            </a:r>
+            <a:r>
+              <a:rPr lang="en-US" sz="2400" dirty="0" smtClean="0">
+                <a:solidFill>
+                  <a:schemeClr val="accent2"/>
+                </a:solidFill>
+              </a:rPr>
+              <a:t>V2.5 </a:t>
+            </a:r>
+            <a:r>
+              <a:rPr lang="en-US" sz="2400" dirty="0">
+                <a:solidFill>
+                  <a:schemeClr val="accent2"/>
+                </a:solidFill>
+              </a:rPr>
+              <a:t>refinement</a:t>
+            </a:r>
+            <a:endParaRPr lang="en-US" sz="2400" dirty="0">
+              <a:solidFill>
+                <a:schemeClr val="accent2"/>
+              </a:solidFill>
+            </a:endParaRPr>
           </a:p>
           <a:p>
             <a:r>
@@ -9833,13 +10430,59 @@
                   </a:schemeClr>
                 </a:solidFill>
               </a:rPr>
-              <a:t> + V2.4 refinement</a:t>
+              <a:t> + V2.4 </a:t>
+            </a:r>
+            <a:r>
+              <a:rPr lang="en-US" sz="2400" dirty="0" smtClean="0">
+                <a:solidFill>
+                  <a:schemeClr val="accent5">
+                    <a:lumMod val="75000"/>
+                  </a:schemeClr>
+                </a:solidFill>
+              </a:rPr>
+              <a:t>refinement</a:t>
+            </a:r>
+          </a:p>
+          <a:p>
+            <a:r>
+              <a:rPr lang="en-US" sz="2400" dirty="0"/>
+              <a:t>Page </a:t>
+            </a:r>
+            <a:r>
+              <a:rPr lang="en-US" sz="2400" dirty="0" smtClean="0"/>
+              <a:t>18 </a:t>
+            </a:r>
+            <a:r>
+              <a:rPr lang="en-US" sz="2400" dirty="0"/>
+              <a:t>		</a:t>
+            </a:r>
+            <a:r>
+              <a:rPr lang="en-US" sz="2400" dirty="0" smtClean="0">
+                <a:solidFill>
+                  <a:schemeClr val="accent2"/>
+                </a:solidFill>
+              </a:rPr>
+              <a:t>V2.5 </a:t>
+            </a:r>
+            <a:r>
+              <a:rPr lang="en-US" sz="2400" dirty="0">
+                <a:solidFill>
+                  <a:schemeClr val="accent2"/>
+                </a:solidFill>
+              </a:rPr>
+              <a:t>new </a:t>
+            </a:r>
+            <a:r>
+              <a:rPr lang="en-US" sz="2400" dirty="0" smtClean="0">
+                <a:solidFill>
+                  <a:schemeClr val="accent2"/>
+                </a:solidFill>
+              </a:rPr>
+              <a:t>features</a:t>
             </a:r>
             <a:endParaRPr lang="en-US" sz="2400" dirty="0">
               <a:solidFill>
-                <a:schemeClr val="accent5">
-                  <a:lumMod val="75000"/>
-                </a:schemeClr>
+                <a:schemeClr val="accent2"/>
               </a:solidFill>
             </a:endParaRPr>
           </a:p>
@@ -10203,7 +10846,7 @@
       </p:grpSpPr>
       <p:pic>
         <p:nvPicPr>
-          <p:cNvPr id="4" name="Grafik 3"/>
+          <p:cNvPr id="3" name="Grafik 2"/>
           <p:cNvPicPr>
             <a:picLocks noChangeAspect="1"/>
           </p:cNvPicPr>
@@ -10217,8 +10860,8 @@
         </p:blipFill>
         <p:spPr>
           <a:xfrm>
-            <a:off x="1416632" y="1142360"/>
-            <a:ext cx="6184231" cy="5565808"/>
+            <a:off x="1416632" y="1135397"/>
+            <a:ext cx="6184231" cy="5565807"/>
           </a:xfrm>
           <a:prstGeom prst="rect">
             <a:avLst/>
@@ -11072,7 +11715,7 @@
       </p:grpSpPr>
       <p:pic>
         <p:nvPicPr>
-          <p:cNvPr id="10" name="Grafik 9"/>
+          <p:cNvPr id="9" name="Grafik 8"/>
           <p:cNvPicPr>
             <a:picLocks noChangeAspect="1"/>
           </p:cNvPicPr>
@@ -11086,8 +11729,8 @@
         </p:blipFill>
         <p:spPr>
           <a:xfrm>
-            <a:off x="1416632" y="1142360"/>
-            <a:ext cx="6184231" cy="5565808"/>
+            <a:off x="1416632" y="1135397"/>
+            <a:ext cx="6184231" cy="5565807"/>
           </a:xfrm>
           <a:prstGeom prst="rect">
             <a:avLst/>

</xml_diff>